<commit_message>
Update RES source file for tutorials and PNG renders
</commit_message>
<xml_diff>
--- a/tutorial/westeros/_static/westeros_res.pptx
+++ b/tutorial/westeros/_static/westeros_res.pptx
@@ -112,6 +112,11 @@
       </a:defRPr>
     </a:lvl9pPr>
   </p:defaultTextStyle>
+  <p:extLst>
+    <p:ext uri="{EFAFB233-063F-42B5-8137-9DF3F51BA10A}">
+      <p15:sldGuideLst xmlns:p15="http://schemas.microsoft.com/office/powerpoint/2012/main"/>
+    </p:ext>
+  </p:extLst>
 </p:presentation>
 </file>
 
@@ -197,7 +202,7 @@
           <a:p>
             <a:fld id="{2DF20614-5643-4B1F-B495-FEBC66B49245}" type="datetimeFigureOut">
               <a:rPr lang="en-GB" smtClean="0"/>
-              <a:t>24/09/2020</a:t>
+              <a:t>16/04/2021</a:t>
             </a:fld>
             <a:endParaRPr lang="en-GB"/>
           </a:p>
@@ -1266,7 +1271,7 @@
           <a:p>
             <a:fld id="{EE05C8E7-49BF-4F60-9111-00AC92B15D4A}" type="datetimeFigureOut">
               <a:rPr lang="en-GB" smtClean="0"/>
-              <a:t>24/09/2020</a:t>
+              <a:t>16/04/2021</a:t>
             </a:fld>
             <a:endParaRPr lang="en-GB"/>
           </a:p>
@@ -1466,7 +1471,7 @@
           <a:p>
             <a:fld id="{EE05C8E7-49BF-4F60-9111-00AC92B15D4A}" type="datetimeFigureOut">
               <a:rPr lang="en-GB" smtClean="0"/>
-              <a:t>24/09/2020</a:t>
+              <a:t>16/04/2021</a:t>
             </a:fld>
             <a:endParaRPr lang="en-GB"/>
           </a:p>
@@ -1676,7 +1681,7 @@
           <a:p>
             <a:fld id="{EE05C8E7-49BF-4F60-9111-00AC92B15D4A}" type="datetimeFigureOut">
               <a:rPr lang="en-GB" smtClean="0"/>
-              <a:t>24/09/2020</a:t>
+              <a:t>16/04/2021</a:t>
             </a:fld>
             <a:endParaRPr lang="en-GB"/>
           </a:p>
@@ -1876,7 +1881,7 @@
           <a:p>
             <a:fld id="{EE05C8E7-49BF-4F60-9111-00AC92B15D4A}" type="datetimeFigureOut">
               <a:rPr lang="en-GB" smtClean="0"/>
-              <a:t>24/09/2020</a:t>
+              <a:t>16/04/2021</a:t>
             </a:fld>
             <a:endParaRPr lang="en-GB"/>
           </a:p>
@@ -2152,7 +2157,7 @@
           <a:p>
             <a:fld id="{EE05C8E7-49BF-4F60-9111-00AC92B15D4A}" type="datetimeFigureOut">
               <a:rPr lang="en-GB" smtClean="0"/>
-              <a:t>24/09/2020</a:t>
+              <a:t>16/04/2021</a:t>
             </a:fld>
             <a:endParaRPr lang="en-GB"/>
           </a:p>
@@ -2420,7 +2425,7 @@
           <a:p>
             <a:fld id="{EE05C8E7-49BF-4F60-9111-00AC92B15D4A}" type="datetimeFigureOut">
               <a:rPr lang="en-GB" smtClean="0"/>
-              <a:t>24/09/2020</a:t>
+              <a:t>16/04/2021</a:t>
             </a:fld>
             <a:endParaRPr lang="en-GB"/>
           </a:p>
@@ -2835,7 +2840,7 @@
           <a:p>
             <a:fld id="{EE05C8E7-49BF-4F60-9111-00AC92B15D4A}" type="datetimeFigureOut">
               <a:rPr lang="en-GB" smtClean="0"/>
-              <a:t>24/09/2020</a:t>
+              <a:t>16/04/2021</a:t>
             </a:fld>
             <a:endParaRPr lang="en-GB"/>
           </a:p>
@@ -2977,7 +2982,7 @@
           <a:p>
             <a:fld id="{EE05C8E7-49BF-4F60-9111-00AC92B15D4A}" type="datetimeFigureOut">
               <a:rPr lang="en-GB" smtClean="0"/>
-              <a:t>24/09/2020</a:t>
+              <a:t>16/04/2021</a:t>
             </a:fld>
             <a:endParaRPr lang="en-GB"/>
           </a:p>
@@ -3090,7 +3095,7 @@
           <a:p>
             <a:fld id="{EE05C8E7-49BF-4F60-9111-00AC92B15D4A}" type="datetimeFigureOut">
               <a:rPr lang="en-GB" smtClean="0"/>
-              <a:t>24/09/2020</a:t>
+              <a:t>16/04/2021</a:t>
             </a:fld>
             <a:endParaRPr lang="en-GB"/>
           </a:p>
@@ -3403,7 +3408,7 @@
           <a:p>
             <a:fld id="{EE05C8E7-49BF-4F60-9111-00AC92B15D4A}" type="datetimeFigureOut">
               <a:rPr lang="en-GB" smtClean="0"/>
-              <a:t>24/09/2020</a:t>
+              <a:t>16/04/2021</a:t>
             </a:fld>
             <a:endParaRPr lang="en-GB"/>
           </a:p>
@@ -3692,7 +3697,7 @@
           <a:p>
             <a:fld id="{EE05C8E7-49BF-4F60-9111-00AC92B15D4A}" type="datetimeFigureOut">
               <a:rPr lang="en-GB" smtClean="0"/>
-              <a:t>24/09/2020</a:t>
+              <a:t>16/04/2021</a:t>
             </a:fld>
             <a:endParaRPr lang="en-GB"/>
           </a:p>
@@ -3935,7 +3940,7 @@
           <a:p>
             <a:fld id="{EE05C8E7-49BF-4F60-9111-00AC92B15D4A}" type="datetimeFigureOut">
               <a:rPr lang="en-GB" smtClean="0"/>
-              <a:t>24/09/2020</a:t>
+              <a:t>16/04/2021</a:t>
             </a:fld>
             <a:endParaRPr lang="en-GB"/>
           </a:p>
@@ -4595,8 +4600,8 @@
         </p:nvSpPr>
         <p:spPr>
           <a:xfrm>
-            <a:off x="5931201" y="946455"/>
-            <a:ext cx="2052083" cy="369332"/>
+            <a:off x="5655063" y="110830"/>
+            <a:ext cx="2052083" cy="646331"/>
           </a:xfrm>
           <a:prstGeom prst="rect">
             <a:avLst/>
@@ -4609,9 +4614,17 @@
           </a:bodyPr>
           <a:lstStyle/>
           <a:p>
+            <a:pPr algn="ctr"/>
             <a:r>
               <a:rPr lang="en-US" dirty="0"/>
-              <a:t>Secondary Energy</a:t>
+              <a:t>Secondary</a:t>
+            </a:r>
+          </a:p>
+          <a:p>
+            <a:pPr algn="ctr"/>
+            <a:r>
+              <a:rPr lang="en-US" dirty="0"/>
+              <a:t> Energy</a:t>
             </a:r>
             <a:endParaRPr lang="en-GB" dirty="0"/>
           </a:p>
@@ -4814,8 +4827,8 @@
         </p:nvSpPr>
         <p:spPr>
           <a:xfrm>
-            <a:off x="8078099" y="935822"/>
-            <a:ext cx="2052083" cy="369332"/>
+            <a:off x="7864694" y="89549"/>
+            <a:ext cx="2052083" cy="646331"/>
           </a:xfrm>
           <a:prstGeom prst="rect">
             <a:avLst/>
@@ -4828,9 +4841,17 @@
           </a:bodyPr>
           <a:lstStyle/>
           <a:p>
+            <a:pPr algn="ctr"/>
             <a:r>
               <a:rPr lang="en-US" dirty="0"/>
-              <a:t>Final Energy</a:t>
+              <a:t>Final</a:t>
+            </a:r>
+          </a:p>
+          <a:p>
+            <a:pPr algn="ctr"/>
+            <a:r>
+              <a:rPr lang="en-US" dirty="0"/>
+              <a:t> Energy</a:t>
             </a:r>
             <a:endParaRPr lang="en-GB" dirty="0"/>
           </a:p>
@@ -4964,8 +4985,8 @@
         </p:nvSpPr>
         <p:spPr>
           <a:xfrm>
-            <a:off x="10086758" y="946455"/>
-            <a:ext cx="2052083" cy="369332"/>
+            <a:off x="9929948" y="103706"/>
+            <a:ext cx="2052083" cy="646331"/>
           </a:xfrm>
           <a:prstGeom prst="rect">
             <a:avLst/>
@@ -4978,9 +4999,17 @@
           </a:bodyPr>
           <a:lstStyle/>
           <a:p>
+            <a:pPr algn="ctr"/>
             <a:r>
               <a:rPr lang="en-US" dirty="0"/>
-              <a:t>Useful Energy</a:t>
+              <a:t>Useful</a:t>
+            </a:r>
+          </a:p>
+          <a:p>
+            <a:pPr algn="ctr"/>
+            <a:r>
+              <a:rPr lang="en-US" dirty="0"/>
+              <a:t> Energy</a:t>
             </a:r>
             <a:endParaRPr lang="en-GB" dirty="0"/>
           </a:p>
@@ -5752,6 +5781,17 @@
               </a:rPr>
               <a:t>Heating</a:t>
             </a:r>
+          </a:p>
+          <a:p>
+            <a:pPr algn="ctr"/>
+            <a:r>
+              <a:rPr lang="en-US" sz="1400" dirty="0">
+                <a:solidFill>
+                  <a:schemeClr val="tx2"/>
+                </a:solidFill>
+              </a:rPr>
+              <a:t>System</a:t>
+            </a:r>
             <a:endParaRPr lang="en-GB" sz="1400" dirty="0">
               <a:solidFill>
                 <a:schemeClr val="tx2"/>
@@ -5993,8 +6033,8 @@
         </p:nvSpPr>
         <p:spPr>
           <a:xfrm>
-            <a:off x="1902340" y="946455"/>
-            <a:ext cx="2052083" cy="369332"/>
+            <a:off x="1831517" y="110830"/>
+            <a:ext cx="1475862" cy="1200329"/>
           </a:xfrm>
           <a:prstGeom prst="rect">
             <a:avLst/>
@@ -6007,9 +6047,17 @@
           </a:bodyPr>
           <a:lstStyle/>
           <a:p>
+            <a:pPr algn="ctr"/>
             <a:r>
               <a:rPr lang="en-US" dirty="0"/>
-              <a:t>Resource</a:t>
+              <a:t>Resource-volume /</a:t>
+            </a:r>
+          </a:p>
+          <a:p>
+            <a:pPr algn="ctr"/>
+            <a:r>
+              <a:rPr lang="en-US" dirty="0"/>
+              <a:t>Renewable- potential</a:t>
             </a:r>
             <a:endParaRPr lang="en-GB" dirty="0"/>
           </a:p>
@@ -6168,8 +6216,8 @@
         </p:nvSpPr>
         <p:spPr>
           <a:xfrm>
-            <a:off x="3765470" y="933883"/>
-            <a:ext cx="2052083" cy="369332"/>
+            <a:off x="3352475" y="109949"/>
+            <a:ext cx="2052083" cy="646331"/>
           </a:xfrm>
           <a:prstGeom prst="rect">
             <a:avLst/>
@@ -6182,58 +6230,22 @@
           </a:bodyPr>
           <a:lstStyle/>
           <a:p>
+            <a:pPr algn="ctr"/>
             <a:r>
               <a:rPr lang="en-US" dirty="0"/>
-              <a:t>Primary Energy</a:t>
+              <a:t>Primary</a:t>
+            </a:r>
+          </a:p>
+          <a:p>
+            <a:pPr algn="ctr"/>
+            <a:r>
+              <a:rPr lang="en-US" dirty="0"/>
+              <a:t> Energy</a:t>
             </a:r>
             <a:endParaRPr lang="en-GB" dirty="0"/>
           </a:p>
         </p:txBody>
       </p:sp>
-      <p:cxnSp>
-        <p:nvCxnSpPr>
-          <p:cNvPr id="60" name="Straight Arrow Connector 59">
-            <a:extLst>
-              <a:ext uri="{FF2B5EF4-FFF2-40B4-BE49-F238E27FC236}">
-                <a16:creationId xmlns:a16="http://schemas.microsoft.com/office/drawing/2014/main" id="{24743057-8765-4BAD-8164-12A7589C8234}"/>
-              </a:ext>
-            </a:extLst>
-          </p:cNvPr>
-          <p:cNvCxnSpPr>
-            <a:cxnSpLocks/>
-          </p:cNvCxnSpPr>
-          <p:nvPr/>
-        </p:nvCxnSpPr>
-        <p:spPr>
-          <a:xfrm>
-            <a:off x="2215767" y="2500334"/>
-            <a:ext cx="490860" cy="0"/>
-          </a:xfrm>
-          <a:prstGeom prst="straightConnector1">
-            <a:avLst/>
-          </a:prstGeom>
-          <a:ln w="19050">
-            <a:solidFill>
-              <a:srgbClr val="964B00"/>
-            </a:solidFill>
-            <a:tailEnd type="triangle"/>
-          </a:ln>
-        </p:spPr>
-        <p:style>
-          <a:lnRef idx="1">
-            <a:schemeClr val="accent1"/>
-          </a:lnRef>
-          <a:fillRef idx="0">
-            <a:schemeClr val="accent1"/>
-          </a:fillRef>
-          <a:effectRef idx="0">
-            <a:schemeClr val="accent1"/>
-          </a:effectRef>
-          <a:fontRef idx="minor">
-            <a:schemeClr val="tx1"/>
-          </a:fontRef>
-        </p:style>
-      </p:cxnSp>
       <p:cxnSp>
         <p:nvCxnSpPr>
           <p:cNvPr id="61" name="Straight Arrow Connector 60">
@@ -6382,7 +6394,7 @@
           </a:prstGeom>
           <a:ln w="19050">
             <a:solidFill>
-              <a:schemeClr val="accent3"/>
+              <a:schemeClr val="accent6"/>
             </a:solidFill>
           </a:ln>
         </p:spPr>
@@ -6465,7 +6477,51 @@
           </a:prstGeom>
           <a:ln w="19050">
             <a:solidFill>
-              <a:schemeClr val="accent3"/>
+              <a:schemeClr val="accent6"/>
+            </a:solidFill>
+            <a:tailEnd type="triangle"/>
+          </a:ln>
+        </p:spPr>
+        <p:style>
+          <a:lnRef idx="1">
+            <a:schemeClr val="accent1"/>
+          </a:lnRef>
+          <a:fillRef idx="0">
+            <a:schemeClr val="accent1"/>
+          </a:fillRef>
+          <a:effectRef idx="0">
+            <a:schemeClr val="accent1"/>
+          </a:effectRef>
+          <a:fontRef idx="minor">
+            <a:schemeClr val="tx1"/>
+          </a:fontRef>
+        </p:style>
+      </p:cxnSp>
+      <p:cxnSp>
+        <p:nvCxnSpPr>
+          <p:cNvPr id="60" name="Straight Arrow Connector 59">
+            <a:extLst>
+              <a:ext uri="{FF2B5EF4-FFF2-40B4-BE49-F238E27FC236}">
+                <a16:creationId xmlns:a16="http://schemas.microsoft.com/office/drawing/2014/main" id="{24743057-8765-4BAD-8164-12A7589C8234}"/>
+              </a:ext>
+            </a:extLst>
+          </p:cNvPr>
+          <p:cNvCxnSpPr>
+            <a:cxnSpLocks/>
+          </p:cNvCxnSpPr>
+          <p:nvPr/>
+        </p:nvCxnSpPr>
+        <p:spPr>
+          <a:xfrm>
+            <a:off x="2215767" y="2500334"/>
+            <a:ext cx="490860" cy="0"/>
+          </a:xfrm>
+          <a:prstGeom prst="straightConnector1">
+            <a:avLst/>
+          </a:prstGeom>
+          <a:ln w="19050">
+            <a:solidFill>
+              <a:srgbClr val="964B00"/>
             </a:solidFill>
             <a:tailEnd type="triangle"/>
           </a:ln>
@@ -6744,42 +6800,6 @@
           </a:p>
         </p:txBody>
       </p:sp>
-      <p:sp>
-        <p:nvSpPr>
-          <p:cNvPr id="13" name="TextBox 12">
-            <a:extLst>
-              <a:ext uri="{FF2B5EF4-FFF2-40B4-BE49-F238E27FC236}">
-                <a16:creationId xmlns:a16="http://schemas.microsoft.com/office/drawing/2014/main" id="{207E41D4-A6DC-48C5-AAFA-9FB2A2DF6E29}"/>
-              </a:ext>
-            </a:extLst>
-          </p:cNvPr>
-          <p:cNvSpPr txBox="1"/>
-          <p:nvPr/>
-        </p:nvSpPr>
-        <p:spPr>
-          <a:xfrm>
-            <a:off x="5931201" y="946455"/>
-            <a:ext cx="2052083" cy="369332"/>
-          </a:xfrm>
-          <a:prstGeom prst="rect">
-            <a:avLst/>
-          </a:prstGeom>
-          <a:noFill/>
-        </p:spPr>
-        <p:txBody>
-          <a:bodyPr wrap="square" rtlCol="0">
-            <a:spAutoFit/>
-          </a:bodyPr>
-          <a:lstStyle/>
-          <a:p>
-            <a:r>
-              <a:rPr lang="en-US" dirty="0"/>
-              <a:t>Secondary Energy</a:t>
-            </a:r>
-            <a:endParaRPr lang="en-GB" dirty="0"/>
-          </a:p>
-        </p:txBody>
-      </p:sp>
       <p:cxnSp>
         <p:nvCxnSpPr>
           <p:cNvPr id="19" name="Straight Arrow Connector 18">
@@ -6960,42 +6980,6 @@
               <a:t>electricity</a:t>
             </a:r>
             <a:endParaRPr lang="en-GB" sz="1600" i="1" dirty="0"/>
-          </a:p>
-        </p:txBody>
-      </p:sp>
-      <p:sp>
-        <p:nvSpPr>
-          <p:cNvPr id="26" name="TextBox 25">
-            <a:extLst>
-              <a:ext uri="{FF2B5EF4-FFF2-40B4-BE49-F238E27FC236}">
-                <a16:creationId xmlns:a16="http://schemas.microsoft.com/office/drawing/2014/main" id="{B4C0CA25-FADB-488E-92FF-E466AD8BB026}"/>
-              </a:ext>
-            </a:extLst>
-          </p:cNvPr>
-          <p:cNvSpPr txBox="1"/>
-          <p:nvPr/>
-        </p:nvSpPr>
-        <p:spPr>
-          <a:xfrm>
-            <a:off x="8078099" y="935822"/>
-            <a:ext cx="2052083" cy="369332"/>
-          </a:xfrm>
-          <a:prstGeom prst="rect">
-            <a:avLst/>
-          </a:prstGeom>
-          <a:noFill/>
-        </p:spPr>
-        <p:txBody>
-          <a:bodyPr wrap="square" rtlCol="0">
-            <a:spAutoFit/>
-          </a:bodyPr>
-          <a:lstStyle/>
-          <a:p>
-            <a:r>
-              <a:rPr lang="en-US" dirty="0"/>
-              <a:t>Final Energy</a:t>
-            </a:r>
-            <a:endParaRPr lang="en-GB" dirty="0"/>
           </a:p>
         </p:txBody>
       </p:sp>
@@ -7115,42 +7099,6 @@
       </p:cxnSp>
       <p:sp>
         <p:nvSpPr>
-          <p:cNvPr id="32" name="TextBox 31">
-            <a:extLst>
-              <a:ext uri="{FF2B5EF4-FFF2-40B4-BE49-F238E27FC236}">
-                <a16:creationId xmlns:a16="http://schemas.microsoft.com/office/drawing/2014/main" id="{3D398559-E7BD-4F66-BE41-421A43A17432}"/>
-              </a:ext>
-            </a:extLst>
-          </p:cNvPr>
-          <p:cNvSpPr txBox="1"/>
-          <p:nvPr/>
-        </p:nvSpPr>
-        <p:spPr>
-          <a:xfrm>
-            <a:off x="10086758" y="946455"/>
-            <a:ext cx="2052083" cy="369332"/>
-          </a:xfrm>
-          <a:prstGeom prst="rect">
-            <a:avLst/>
-          </a:prstGeom>
-          <a:noFill/>
-        </p:spPr>
-        <p:txBody>
-          <a:bodyPr wrap="square" rtlCol="0">
-            <a:spAutoFit/>
-          </a:bodyPr>
-          <a:lstStyle/>
-          <a:p>
-            <a:r>
-              <a:rPr lang="en-US" dirty="0"/>
-              <a:t>Useful Energy</a:t>
-            </a:r>
-            <a:endParaRPr lang="en-GB" dirty="0"/>
-          </a:p>
-        </p:txBody>
-      </p:sp>
-      <p:sp>
-        <p:nvSpPr>
           <p:cNvPr id="34" name="TextBox 33">
             <a:extLst>
               <a:ext uri="{FF2B5EF4-FFF2-40B4-BE49-F238E27FC236}">
@@ -7405,6 +7353,138 @@
           </a:fontRef>
         </p:style>
       </p:cxnSp>
+      <p:sp>
+        <p:nvSpPr>
+          <p:cNvPr id="22" name="TextBox 21">
+            <a:extLst>
+              <a:ext uri="{FF2B5EF4-FFF2-40B4-BE49-F238E27FC236}">
+                <a16:creationId xmlns:a16="http://schemas.microsoft.com/office/drawing/2014/main" id="{8AC23BFD-ACA5-4230-B8A4-071AB05640A8}"/>
+              </a:ext>
+            </a:extLst>
+          </p:cNvPr>
+          <p:cNvSpPr txBox="1"/>
+          <p:nvPr/>
+        </p:nvSpPr>
+        <p:spPr>
+          <a:xfrm>
+            <a:off x="5655063" y="110830"/>
+            <a:ext cx="2052083" cy="646331"/>
+          </a:xfrm>
+          <a:prstGeom prst="rect">
+            <a:avLst/>
+          </a:prstGeom>
+          <a:noFill/>
+        </p:spPr>
+        <p:txBody>
+          <a:bodyPr wrap="square" rtlCol="0">
+            <a:spAutoFit/>
+          </a:bodyPr>
+          <a:lstStyle/>
+          <a:p>
+            <a:pPr algn="ctr"/>
+            <a:r>
+              <a:rPr lang="en-US" dirty="0"/>
+              <a:t>Secondary</a:t>
+            </a:r>
+          </a:p>
+          <a:p>
+            <a:pPr algn="ctr"/>
+            <a:r>
+              <a:rPr lang="en-US" dirty="0"/>
+              <a:t> Energy</a:t>
+            </a:r>
+            <a:endParaRPr lang="en-GB" dirty="0"/>
+          </a:p>
+        </p:txBody>
+      </p:sp>
+      <p:sp>
+        <p:nvSpPr>
+          <p:cNvPr id="23" name="TextBox 22">
+            <a:extLst>
+              <a:ext uri="{FF2B5EF4-FFF2-40B4-BE49-F238E27FC236}">
+                <a16:creationId xmlns:a16="http://schemas.microsoft.com/office/drawing/2014/main" id="{F9F1E34A-F5B2-49C8-A7E9-B3993E97B46F}"/>
+              </a:ext>
+            </a:extLst>
+          </p:cNvPr>
+          <p:cNvSpPr txBox="1"/>
+          <p:nvPr/>
+        </p:nvSpPr>
+        <p:spPr>
+          <a:xfrm>
+            <a:off x="7864694" y="89549"/>
+            <a:ext cx="2052083" cy="646331"/>
+          </a:xfrm>
+          <a:prstGeom prst="rect">
+            <a:avLst/>
+          </a:prstGeom>
+          <a:noFill/>
+        </p:spPr>
+        <p:txBody>
+          <a:bodyPr wrap="square" rtlCol="0">
+            <a:spAutoFit/>
+          </a:bodyPr>
+          <a:lstStyle/>
+          <a:p>
+            <a:pPr algn="ctr"/>
+            <a:r>
+              <a:rPr lang="en-US" dirty="0"/>
+              <a:t>Final</a:t>
+            </a:r>
+          </a:p>
+          <a:p>
+            <a:pPr algn="ctr"/>
+            <a:r>
+              <a:rPr lang="en-US" dirty="0"/>
+              <a:t> Energy</a:t>
+            </a:r>
+            <a:endParaRPr lang="en-GB" dirty="0"/>
+          </a:p>
+        </p:txBody>
+      </p:sp>
+      <p:sp>
+        <p:nvSpPr>
+          <p:cNvPr id="28" name="TextBox 27">
+            <a:extLst>
+              <a:ext uri="{FF2B5EF4-FFF2-40B4-BE49-F238E27FC236}">
+                <a16:creationId xmlns:a16="http://schemas.microsoft.com/office/drawing/2014/main" id="{C5BB0292-842D-4C6A-9533-C574F0AFA208}"/>
+              </a:ext>
+            </a:extLst>
+          </p:cNvPr>
+          <p:cNvSpPr txBox="1"/>
+          <p:nvPr/>
+        </p:nvSpPr>
+        <p:spPr>
+          <a:xfrm>
+            <a:off x="9929948" y="103706"/>
+            <a:ext cx="2052083" cy="646331"/>
+          </a:xfrm>
+          <a:prstGeom prst="rect">
+            <a:avLst/>
+          </a:prstGeom>
+          <a:noFill/>
+        </p:spPr>
+        <p:txBody>
+          <a:bodyPr wrap="square" rtlCol="0">
+            <a:spAutoFit/>
+          </a:bodyPr>
+          <a:lstStyle/>
+          <a:p>
+            <a:pPr algn="ctr"/>
+            <a:r>
+              <a:rPr lang="en-US" dirty="0"/>
+              <a:t>Useful</a:t>
+            </a:r>
+          </a:p>
+          <a:p>
+            <a:pPr algn="ctr"/>
+            <a:r>
+              <a:rPr lang="en-US" dirty="0"/>
+              <a:t> Energy</a:t>
+            </a:r>
+            <a:endParaRPr lang="en-GB" dirty="0"/>
+          </a:p>
+        </p:txBody>
+      </p:sp>
     </p:spTree>
     <p:extLst>
       <p:ext uri="{BB962C8B-B14F-4D97-AF65-F5344CB8AC3E}">
@@ -7664,42 +7744,6 @@
           </a:p>
         </p:txBody>
       </p:sp>
-      <p:sp>
-        <p:nvSpPr>
-          <p:cNvPr id="13" name="TextBox 12">
-            <a:extLst>
-              <a:ext uri="{FF2B5EF4-FFF2-40B4-BE49-F238E27FC236}">
-                <a16:creationId xmlns:a16="http://schemas.microsoft.com/office/drawing/2014/main" id="{207E41D4-A6DC-48C5-AAFA-9FB2A2DF6E29}"/>
-              </a:ext>
-            </a:extLst>
-          </p:cNvPr>
-          <p:cNvSpPr txBox="1"/>
-          <p:nvPr/>
-        </p:nvSpPr>
-        <p:spPr>
-          <a:xfrm>
-            <a:off x="5931201" y="946455"/>
-            <a:ext cx="2052083" cy="369332"/>
-          </a:xfrm>
-          <a:prstGeom prst="rect">
-            <a:avLst/>
-          </a:prstGeom>
-          <a:noFill/>
-        </p:spPr>
-        <p:txBody>
-          <a:bodyPr wrap="square" rtlCol="0">
-            <a:spAutoFit/>
-          </a:bodyPr>
-          <a:lstStyle/>
-          <a:p>
-            <a:r>
-              <a:rPr lang="en-US" dirty="0"/>
-              <a:t>Secondary Energy</a:t>
-            </a:r>
-            <a:endParaRPr lang="en-GB" dirty="0"/>
-          </a:p>
-        </p:txBody>
-      </p:sp>
       <p:cxnSp>
         <p:nvCxnSpPr>
           <p:cNvPr id="19" name="Straight Arrow Connector 18">
@@ -7880,42 +7924,6 @@
               <a:t>electricity</a:t>
             </a:r>
             <a:endParaRPr lang="en-GB" sz="1600" i="1" dirty="0"/>
-          </a:p>
-        </p:txBody>
-      </p:sp>
-      <p:sp>
-        <p:nvSpPr>
-          <p:cNvPr id="26" name="TextBox 25">
-            <a:extLst>
-              <a:ext uri="{FF2B5EF4-FFF2-40B4-BE49-F238E27FC236}">
-                <a16:creationId xmlns:a16="http://schemas.microsoft.com/office/drawing/2014/main" id="{B4C0CA25-FADB-488E-92FF-E466AD8BB026}"/>
-              </a:ext>
-            </a:extLst>
-          </p:cNvPr>
-          <p:cNvSpPr txBox="1"/>
-          <p:nvPr/>
-        </p:nvSpPr>
-        <p:spPr>
-          <a:xfrm>
-            <a:off x="8078099" y="935822"/>
-            <a:ext cx="2052083" cy="369332"/>
-          </a:xfrm>
-          <a:prstGeom prst="rect">
-            <a:avLst/>
-          </a:prstGeom>
-          <a:noFill/>
-        </p:spPr>
-        <p:txBody>
-          <a:bodyPr wrap="square" rtlCol="0">
-            <a:spAutoFit/>
-          </a:bodyPr>
-          <a:lstStyle/>
-          <a:p>
-            <a:r>
-              <a:rPr lang="en-US" dirty="0"/>
-              <a:t>Final Energy</a:t>
-            </a:r>
-            <a:endParaRPr lang="en-GB" dirty="0"/>
           </a:p>
         </p:txBody>
       </p:sp>
@@ -8035,42 +8043,6 @@
       </p:cxnSp>
       <p:sp>
         <p:nvSpPr>
-          <p:cNvPr id="32" name="TextBox 31">
-            <a:extLst>
-              <a:ext uri="{FF2B5EF4-FFF2-40B4-BE49-F238E27FC236}">
-                <a16:creationId xmlns:a16="http://schemas.microsoft.com/office/drawing/2014/main" id="{3D398559-E7BD-4F66-BE41-421A43A17432}"/>
-              </a:ext>
-            </a:extLst>
-          </p:cNvPr>
-          <p:cNvSpPr txBox="1"/>
-          <p:nvPr/>
-        </p:nvSpPr>
-        <p:spPr>
-          <a:xfrm>
-            <a:off x="10086758" y="946455"/>
-            <a:ext cx="2052083" cy="369332"/>
-          </a:xfrm>
-          <a:prstGeom prst="rect">
-            <a:avLst/>
-          </a:prstGeom>
-          <a:noFill/>
-        </p:spPr>
-        <p:txBody>
-          <a:bodyPr wrap="square" rtlCol="0">
-            <a:spAutoFit/>
-          </a:bodyPr>
-          <a:lstStyle/>
-          <a:p>
-            <a:r>
-              <a:rPr lang="en-US" dirty="0"/>
-              <a:t>Useful Energy</a:t>
-            </a:r>
-            <a:endParaRPr lang="en-GB" dirty="0"/>
-          </a:p>
-        </p:txBody>
-      </p:sp>
-      <p:sp>
-        <p:nvSpPr>
           <p:cNvPr id="34" name="TextBox 33">
             <a:extLst>
               <a:ext uri="{FF2B5EF4-FFF2-40B4-BE49-F238E27FC236}">
@@ -8368,42 +8340,6 @@
           </a:fontRef>
         </p:style>
       </p:cxnSp>
-      <p:sp>
-        <p:nvSpPr>
-          <p:cNvPr id="55" name="TextBox 54">
-            <a:extLst>
-              <a:ext uri="{FF2B5EF4-FFF2-40B4-BE49-F238E27FC236}">
-                <a16:creationId xmlns:a16="http://schemas.microsoft.com/office/drawing/2014/main" id="{3555389D-EF2A-4524-889E-428E6E41D2E2}"/>
-              </a:ext>
-            </a:extLst>
-          </p:cNvPr>
-          <p:cNvSpPr txBox="1"/>
-          <p:nvPr/>
-        </p:nvSpPr>
-        <p:spPr>
-          <a:xfrm>
-            <a:off x="1902340" y="946455"/>
-            <a:ext cx="2052083" cy="369332"/>
-          </a:xfrm>
-          <a:prstGeom prst="rect">
-            <a:avLst/>
-          </a:prstGeom>
-          <a:noFill/>
-        </p:spPr>
-        <p:txBody>
-          <a:bodyPr wrap="square" rtlCol="0">
-            <a:spAutoFit/>
-          </a:bodyPr>
-          <a:lstStyle/>
-          <a:p>
-            <a:r>
-              <a:rPr lang="en-US" dirty="0"/>
-              <a:t>Resource</a:t>
-            </a:r>
-            <a:endParaRPr lang="en-GB" dirty="0"/>
-          </a:p>
-        </p:txBody>
-      </p:sp>
       <p:cxnSp>
         <p:nvCxnSpPr>
           <p:cNvPr id="60" name="Straight Arrow Connector 59">
@@ -8482,6 +8418,219 @@
               <a:t>coal</a:t>
             </a:r>
             <a:endParaRPr lang="en-GB" sz="1600" i="1" dirty="0"/>
+          </a:p>
+        </p:txBody>
+      </p:sp>
+      <p:sp>
+        <p:nvSpPr>
+          <p:cNvPr id="28" name="TextBox 27">
+            <a:extLst>
+              <a:ext uri="{FF2B5EF4-FFF2-40B4-BE49-F238E27FC236}">
+                <a16:creationId xmlns:a16="http://schemas.microsoft.com/office/drawing/2014/main" id="{9FADFD46-BFD2-4AA2-8A5F-C20528684BC4}"/>
+              </a:ext>
+            </a:extLst>
+          </p:cNvPr>
+          <p:cNvSpPr txBox="1"/>
+          <p:nvPr/>
+        </p:nvSpPr>
+        <p:spPr>
+          <a:xfrm>
+            <a:off x="5655063" y="110830"/>
+            <a:ext cx="2052083" cy="646331"/>
+          </a:xfrm>
+          <a:prstGeom prst="rect">
+            <a:avLst/>
+          </a:prstGeom>
+          <a:noFill/>
+        </p:spPr>
+        <p:txBody>
+          <a:bodyPr wrap="square" rtlCol="0">
+            <a:spAutoFit/>
+          </a:bodyPr>
+          <a:lstStyle/>
+          <a:p>
+            <a:pPr algn="ctr"/>
+            <a:r>
+              <a:rPr lang="en-US" dirty="0"/>
+              <a:t>Secondary</a:t>
+            </a:r>
+          </a:p>
+          <a:p>
+            <a:pPr algn="ctr"/>
+            <a:r>
+              <a:rPr lang="en-US" dirty="0"/>
+              <a:t> Energy</a:t>
+            </a:r>
+            <a:endParaRPr lang="en-GB" dirty="0"/>
+          </a:p>
+        </p:txBody>
+      </p:sp>
+      <p:sp>
+        <p:nvSpPr>
+          <p:cNvPr id="29" name="TextBox 28">
+            <a:extLst>
+              <a:ext uri="{FF2B5EF4-FFF2-40B4-BE49-F238E27FC236}">
+                <a16:creationId xmlns:a16="http://schemas.microsoft.com/office/drawing/2014/main" id="{B52E6202-30E1-4246-AA14-C3FF7C2E9B77}"/>
+              </a:ext>
+            </a:extLst>
+          </p:cNvPr>
+          <p:cNvSpPr txBox="1"/>
+          <p:nvPr/>
+        </p:nvSpPr>
+        <p:spPr>
+          <a:xfrm>
+            <a:off x="7864694" y="89549"/>
+            <a:ext cx="2052083" cy="646331"/>
+          </a:xfrm>
+          <a:prstGeom prst="rect">
+            <a:avLst/>
+          </a:prstGeom>
+          <a:noFill/>
+        </p:spPr>
+        <p:txBody>
+          <a:bodyPr wrap="square" rtlCol="0">
+            <a:spAutoFit/>
+          </a:bodyPr>
+          <a:lstStyle/>
+          <a:p>
+            <a:pPr algn="ctr"/>
+            <a:r>
+              <a:rPr lang="en-US" dirty="0"/>
+              <a:t>Final</a:t>
+            </a:r>
+          </a:p>
+          <a:p>
+            <a:pPr algn="ctr"/>
+            <a:r>
+              <a:rPr lang="en-US" dirty="0"/>
+              <a:t> Energy</a:t>
+            </a:r>
+            <a:endParaRPr lang="en-GB" dirty="0"/>
+          </a:p>
+        </p:txBody>
+      </p:sp>
+      <p:sp>
+        <p:nvSpPr>
+          <p:cNvPr id="31" name="TextBox 30">
+            <a:extLst>
+              <a:ext uri="{FF2B5EF4-FFF2-40B4-BE49-F238E27FC236}">
+                <a16:creationId xmlns:a16="http://schemas.microsoft.com/office/drawing/2014/main" id="{67EF1F6C-BA8B-4602-832E-099F55952410}"/>
+              </a:ext>
+            </a:extLst>
+          </p:cNvPr>
+          <p:cNvSpPr txBox="1"/>
+          <p:nvPr/>
+        </p:nvSpPr>
+        <p:spPr>
+          <a:xfrm>
+            <a:off x="9929948" y="103706"/>
+            <a:ext cx="2052083" cy="646331"/>
+          </a:xfrm>
+          <a:prstGeom prst="rect">
+            <a:avLst/>
+          </a:prstGeom>
+          <a:noFill/>
+        </p:spPr>
+        <p:txBody>
+          <a:bodyPr wrap="square" rtlCol="0">
+            <a:spAutoFit/>
+          </a:bodyPr>
+          <a:lstStyle/>
+          <a:p>
+            <a:pPr algn="ctr"/>
+            <a:r>
+              <a:rPr lang="en-US" dirty="0"/>
+              <a:t>Useful</a:t>
+            </a:r>
+          </a:p>
+          <a:p>
+            <a:pPr algn="ctr"/>
+            <a:r>
+              <a:rPr lang="en-US" dirty="0"/>
+              <a:t> Energy</a:t>
+            </a:r>
+            <a:endParaRPr lang="en-GB" dirty="0"/>
+          </a:p>
+        </p:txBody>
+      </p:sp>
+      <p:sp>
+        <p:nvSpPr>
+          <p:cNvPr id="33" name="TextBox 32">
+            <a:extLst>
+              <a:ext uri="{FF2B5EF4-FFF2-40B4-BE49-F238E27FC236}">
+                <a16:creationId xmlns:a16="http://schemas.microsoft.com/office/drawing/2014/main" id="{49638F06-AFCA-4C77-83D4-5621069DCBEF}"/>
+              </a:ext>
+            </a:extLst>
+          </p:cNvPr>
+          <p:cNvSpPr txBox="1"/>
+          <p:nvPr/>
+        </p:nvSpPr>
+        <p:spPr>
+          <a:xfrm>
+            <a:off x="1831517" y="110830"/>
+            <a:ext cx="1475862" cy="646331"/>
+          </a:xfrm>
+          <a:prstGeom prst="rect">
+            <a:avLst/>
+          </a:prstGeom>
+          <a:noFill/>
+        </p:spPr>
+        <p:txBody>
+          <a:bodyPr wrap="square" rtlCol="0">
+            <a:spAutoFit/>
+          </a:bodyPr>
+          <a:lstStyle/>
+          <a:p>
+            <a:pPr algn="ctr"/>
+            <a:r>
+              <a:rPr lang="en-US" dirty="0"/>
+              <a:t>Resource-volume</a:t>
+            </a:r>
+            <a:endParaRPr lang="en-GB" dirty="0"/>
+          </a:p>
+        </p:txBody>
+      </p:sp>
+      <p:sp>
+        <p:nvSpPr>
+          <p:cNvPr id="35" name="TextBox 34">
+            <a:extLst>
+              <a:ext uri="{FF2B5EF4-FFF2-40B4-BE49-F238E27FC236}">
+                <a16:creationId xmlns:a16="http://schemas.microsoft.com/office/drawing/2014/main" id="{3ECBD39A-44AB-43C0-8530-BB051ED9D72E}"/>
+              </a:ext>
+            </a:extLst>
+          </p:cNvPr>
+          <p:cNvSpPr txBox="1"/>
+          <p:nvPr/>
+        </p:nvSpPr>
+        <p:spPr>
+          <a:xfrm>
+            <a:off x="3352475" y="109949"/>
+            <a:ext cx="2052083" cy="646331"/>
+          </a:xfrm>
+          <a:prstGeom prst="rect">
+            <a:avLst/>
+          </a:prstGeom>
+          <a:noFill/>
+        </p:spPr>
+        <p:txBody>
+          <a:bodyPr wrap="square" rtlCol="0">
+            <a:spAutoFit/>
+          </a:bodyPr>
+          <a:lstStyle/>
+          <a:p>
+            <a:pPr algn="ctr"/>
+            <a:r>
+              <a:rPr lang="en-US" dirty="0"/>
+              <a:t>Primary</a:t>
+            </a:r>
+          </a:p>
+          <a:p>
+            <a:pPr algn="ctr"/>
+            <a:r>
+              <a:rPr lang="en-US" dirty="0"/>
+              <a:t> Energy</a:t>
+            </a:r>
+            <a:endParaRPr lang="en-GB" dirty="0"/>
           </a:p>
         </p:txBody>
       </p:sp>
@@ -8744,42 +8893,6 @@
           </a:p>
         </p:txBody>
       </p:sp>
-      <p:sp>
-        <p:nvSpPr>
-          <p:cNvPr id="13" name="TextBox 12">
-            <a:extLst>
-              <a:ext uri="{FF2B5EF4-FFF2-40B4-BE49-F238E27FC236}">
-                <a16:creationId xmlns:a16="http://schemas.microsoft.com/office/drawing/2014/main" id="{207E41D4-A6DC-48C5-AAFA-9FB2A2DF6E29}"/>
-              </a:ext>
-            </a:extLst>
-          </p:cNvPr>
-          <p:cNvSpPr txBox="1"/>
-          <p:nvPr/>
-        </p:nvSpPr>
-        <p:spPr>
-          <a:xfrm>
-            <a:off x="5931201" y="946455"/>
-            <a:ext cx="2052083" cy="369332"/>
-          </a:xfrm>
-          <a:prstGeom prst="rect">
-            <a:avLst/>
-          </a:prstGeom>
-          <a:noFill/>
-        </p:spPr>
-        <p:txBody>
-          <a:bodyPr wrap="square" rtlCol="0">
-            <a:spAutoFit/>
-          </a:bodyPr>
-          <a:lstStyle/>
-          <a:p>
-            <a:r>
-              <a:rPr lang="en-US" dirty="0"/>
-              <a:t>Secondary Energy</a:t>
-            </a:r>
-            <a:endParaRPr lang="en-GB" dirty="0"/>
-          </a:p>
-        </p:txBody>
-      </p:sp>
       <p:cxnSp>
         <p:nvCxnSpPr>
           <p:cNvPr id="19" name="Straight Arrow Connector 18">
@@ -8960,42 +9073,6 @@
               <a:t>electricity</a:t>
             </a:r>
             <a:endParaRPr lang="en-GB" sz="1600" i="1" dirty="0"/>
-          </a:p>
-        </p:txBody>
-      </p:sp>
-      <p:sp>
-        <p:nvSpPr>
-          <p:cNvPr id="26" name="TextBox 25">
-            <a:extLst>
-              <a:ext uri="{FF2B5EF4-FFF2-40B4-BE49-F238E27FC236}">
-                <a16:creationId xmlns:a16="http://schemas.microsoft.com/office/drawing/2014/main" id="{B4C0CA25-FADB-488E-92FF-E466AD8BB026}"/>
-              </a:ext>
-            </a:extLst>
-          </p:cNvPr>
-          <p:cNvSpPr txBox="1"/>
-          <p:nvPr/>
-        </p:nvSpPr>
-        <p:spPr>
-          <a:xfrm>
-            <a:off x="8078099" y="935822"/>
-            <a:ext cx="2052083" cy="369332"/>
-          </a:xfrm>
-          <a:prstGeom prst="rect">
-            <a:avLst/>
-          </a:prstGeom>
-          <a:noFill/>
-        </p:spPr>
-        <p:txBody>
-          <a:bodyPr wrap="square" rtlCol="0">
-            <a:spAutoFit/>
-          </a:bodyPr>
-          <a:lstStyle/>
-          <a:p>
-            <a:r>
-              <a:rPr lang="en-US" dirty="0"/>
-              <a:t>Final Energy</a:t>
-            </a:r>
-            <a:endParaRPr lang="en-GB" dirty="0"/>
           </a:p>
         </p:txBody>
       </p:sp>
@@ -9115,42 +9192,6 @@
       </p:cxnSp>
       <p:sp>
         <p:nvSpPr>
-          <p:cNvPr id="32" name="TextBox 31">
-            <a:extLst>
-              <a:ext uri="{FF2B5EF4-FFF2-40B4-BE49-F238E27FC236}">
-                <a16:creationId xmlns:a16="http://schemas.microsoft.com/office/drawing/2014/main" id="{3D398559-E7BD-4F66-BE41-421A43A17432}"/>
-              </a:ext>
-            </a:extLst>
-          </p:cNvPr>
-          <p:cNvSpPr txBox="1"/>
-          <p:nvPr/>
-        </p:nvSpPr>
-        <p:spPr>
-          <a:xfrm>
-            <a:off x="10086758" y="946455"/>
-            <a:ext cx="2052083" cy="369332"/>
-          </a:xfrm>
-          <a:prstGeom prst="rect">
-            <a:avLst/>
-          </a:prstGeom>
-          <a:noFill/>
-        </p:spPr>
-        <p:txBody>
-          <a:bodyPr wrap="square" rtlCol="0">
-            <a:spAutoFit/>
-          </a:bodyPr>
-          <a:lstStyle/>
-          <a:p>
-            <a:r>
-              <a:rPr lang="en-US" dirty="0"/>
-              <a:t>Useful Energy</a:t>
-            </a:r>
-            <a:endParaRPr lang="en-GB" dirty="0"/>
-          </a:p>
-        </p:txBody>
-      </p:sp>
-      <p:sp>
-        <p:nvSpPr>
           <p:cNvPr id="34" name="TextBox 33">
             <a:extLst>
               <a:ext uri="{FF2B5EF4-FFF2-40B4-BE49-F238E27FC236}">
@@ -9448,42 +9489,6 @@
           </a:fontRef>
         </p:style>
       </p:cxnSp>
-      <p:sp>
-        <p:nvSpPr>
-          <p:cNvPr id="55" name="TextBox 54">
-            <a:extLst>
-              <a:ext uri="{FF2B5EF4-FFF2-40B4-BE49-F238E27FC236}">
-                <a16:creationId xmlns:a16="http://schemas.microsoft.com/office/drawing/2014/main" id="{3555389D-EF2A-4524-889E-428E6E41D2E2}"/>
-              </a:ext>
-            </a:extLst>
-          </p:cNvPr>
-          <p:cNvSpPr txBox="1"/>
-          <p:nvPr/>
-        </p:nvSpPr>
-        <p:spPr>
-          <a:xfrm>
-            <a:off x="1902340" y="946455"/>
-            <a:ext cx="2052083" cy="369332"/>
-          </a:xfrm>
-          <a:prstGeom prst="rect">
-            <a:avLst/>
-          </a:prstGeom>
-          <a:noFill/>
-        </p:spPr>
-        <p:txBody>
-          <a:bodyPr wrap="square" rtlCol="0">
-            <a:spAutoFit/>
-          </a:bodyPr>
-          <a:lstStyle/>
-          <a:p>
-            <a:r>
-              <a:rPr lang="en-US" dirty="0"/>
-              <a:t>Resource</a:t>
-            </a:r>
-            <a:endParaRPr lang="en-GB" dirty="0"/>
-          </a:p>
-        </p:txBody>
-      </p:sp>
       <p:sp>
         <p:nvSpPr>
           <p:cNvPr id="56" name="Rectangle: Rounded Corners 55">
@@ -9623,42 +9628,6 @@
           </a:p>
         </p:txBody>
       </p:sp>
-      <p:sp>
-        <p:nvSpPr>
-          <p:cNvPr id="59" name="TextBox 58">
-            <a:extLst>
-              <a:ext uri="{FF2B5EF4-FFF2-40B4-BE49-F238E27FC236}">
-                <a16:creationId xmlns:a16="http://schemas.microsoft.com/office/drawing/2014/main" id="{26F527F6-F745-45F5-ADE2-5155DC71580D}"/>
-              </a:ext>
-            </a:extLst>
-          </p:cNvPr>
-          <p:cNvSpPr txBox="1"/>
-          <p:nvPr/>
-        </p:nvSpPr>
-        <p:spPr>
-          <a:xfrm>
-            <a:off x="3765470" y="933883"/>
-            <a:ext cx="2052083" cy="369332"/>
-          </a:xfrm>
-          <a:prstGeom prst="rect">
-            <a:avLst/>
-          </a:prstGeom>
-          <a:noFill/>
-        </p:spPr>
-        <p:txBody>
-          <a:bodyPr wrap="square" rtlCol="0">
-            <a:spAutoFit/>
-          </a:bodyPr>
-          <a:lstStyle/>
-          <a:p>
-            <a:r>
-              <a:rPr lang="en-US" dirty="0"/>
-              <a:t>Primary Energy</a:t>
-            </a:r>
-            <a:endParaRPr lang="en-GB" dirty="0"/>
-          </a:p>
-        </p:txBody>
-      </p:sp>
       <p:cxnSp>
         <p:nvCxnSpPr>
           <p:cNvPr id="60" name="Straight Arrow Connector 59">
@@ -9824,6 +9793,219 @@
               <a:t>coal</a:t>
             </a:r>
             <a:endParaRPr lang="en-GB" sz="1600" i="1" dirty="0"/>
+          </a:p>
+        </p:txBody>
+      </p:sp>
+      <p:sp>
+        <p:nvSpPr>
+          <p:cNvPr id="33" name="TextBox 32">
+            <a:extLst>
+              <a:ext uri="{FF2B5EF4-FFF2-40B4-BE49-F238E27FC236}">
+                <a16:creationId xmlns:a16="http://schemas.microsoft.com/office/drawing/2014/main" id="{45156309-6F11-44CD-8F7E-031035D2C950}"/>
+              </a:ext>
+            </a:extLst>
+          </p:cNvPr>
+          <p:cNvSpPr txBox="1"/>
+          <p:nvPr/>
+        </p:nvSpPr>
+        <p:spPr>
+          <a:xfrm>
+            <a:off x="5655063" y="110830"/>
+            <a:ext cx="2052083" cy="646331"/>
+          </a:xfrm>
+          <a:prstGeom prst="rect">
+            <a:avLst/>
+          </a:prstGeom>
+          <a:noFill/>
+        </p:spPr>
+        <p:txBody>
+          <a:bodyPr wrap="square" rtlCol="0">
+            <a:spAutoFit/>
+          </a:bodyPr>
+          <a:lstStyle/>
+          <a:p>
+            <a:pPr algn="ctr"/>
+            <a:r>
+              <a:rPr lang="en-US" dirty="0"/>
+              <a:t>Secondary</a:t>
+            </a:r>
+          </a:p>
+          <a:p>
+            <a:pPr algn="ctr"/>
+            <a:r>
+              <a:rPr lang="en-US" dirty="0"/>
+              <a:t> Energy</a:t>
+            </a:r>
+            <a:endParaRPr lang="en-GB" dirty="0"/>
+          </a:p>
+        </p:txBody>
+      </p:sp>
+      <p:sp>
+        <p:nvSpPr>
+          <p:cNvPr id="35" name="TextBox 34">
+            <a:extLst>
+              <a:ext uri="{FF2B5EF4-FFF2-40B4-BE49-F238E27FC236}">
+                <a16:creationId xmlns:a16="http://schemas.microsoft.com/office/drawing/2014/main" id="{F88B34ED-E646-41FD-927D-4D9F114BF521}"/>
+              </a:ext>
+            </a:extLst>
+          </p:cNvPr>
+          <p:cNvSpPr txBox="1"/>
+          <p:nvPr/>
+        </p:nvSpPr>
+        <p:spPr>
+          <a:xfrm>
+            <a:off x="7864694" y="89549"/>
+            <a:ext cx="2052083" cy="646331"/>
+          </a:xfrm>
+          <a:prstGeom prst="rect">
+            <a:avLst/>
+          </a:prstGeom>
+          <a:noFill/>
+        </p:spPr>
+        <p:txBody>
+          <a:bodyPr wrap="square" rtlCol="0">
+            <a:spAutoFit/>
+          </a:bodyPr>
+          <a:lstStyle/>
+          <a:p>
+            <a:pPr algn="ctr"/>
+            <a:r>
+              <a:rPr lang="en-US" dirty="0"/>
+              <a:t>Final</a:t>
+            </a:r>
+          </a:p>
+          <a:p>
+            <a:pPr algn="ctr"/>
+            <a:r>
+              <a:rPr lang="en-US" dirty="0"/>
+              <a:t> Energy</a:t>
+            </a:r>
+            <a:endParaRPr lang="en-GB" dirty="0"/>
+          </a:p>
+        </p:txBody>
+      </p:sp>
+      <p:sp>
+        <p:nvSpPr>
+          <p:cNvPr id="41" name="TextBox 40">
+            <a:extLst>
+              <a:ext uri="{FF2B5EF4-FFF2-40B4-BE49-F238E27FC236}">
+                <a16:creationId xmlns:a16="http://schemas.microsoft.com/office/drawing/2014/main" id="{61CA34E1-8D0C-4325-A634-FC5DFB824355}"/>
+              </a:ext>
+            </a:extLst>
+          </p:cNvPr>
+          <p:cNvSpPr txBox="1"/>
+          <p:nvPr/>
+        </p:nvSpPr>
+        <p:spPr>
+          <a:xfrm>
+            <a:off x="9929948" y="103706"/>
+            <a:ext cx="2052083" cy="646331"/>
+          </a:xfrm>
+          <a:prstGeom prst="rect">
+            <a:avLst/>
+          </a:prstGeom>
+          <a:noFill/>
+        </p:spPr>
+        <p:txBody>
+          <a:bodyPr wrap="square" rtlCol="0">
+            <a:spAutoFit/>
+          </a:bodyPr>
+          <a:lstStyle/>
+          <a:p>
+            <a:pPr algn="ctr"/>
+            <a:r>
+              <a:rPr lang="en-US" dirty="0"/>
+              <a:t>Useful</a:t>
+            </a:r>
+          </a:p>
+          <a:p>
+            <a:pPr algn="ctr"/>
+            <a:r>
+              <a:rPr lang="en-US" dirty="0"/>
+              <a:t> Energy</a:t>
+            </a:r>
+            <a:endParaRPr lang="en-GB" dirty="0"/>
+          </a:p>
+        </p:txBody>
+      </p:sp>
+      <p:sp>
+        <p:nvSpPr>
+          <p:cNvPr id="42" name="TextBox 41">
+            <a:extLst>
+              <a:ext uri="{FF2B5EF4-FFF2-40B4-BE49-F238E27FC236}">
+                <a16:creationId xmlns:a16="http://schemas.microsoft.com/office/drawing/2014/main" id="{3B848BCB-4076-4A4D-85B3-3D4912CF189B}"/>
+              </a:ext>
+            </a:extLst>
+          </p:cNvPr>
+          <p:cNvSpPr txBox="1"/>
+          <p:nvPr/>
+        </p:nvSpPr>
+        <p:spPr>
+          <a:xfrm>
+            <a:off x="1831517" y="110830"/>
+            <a:ext cx="1475862" cy="646331"/>
+          </a:xfrm>
+          <a:prstGeom prst="rect">
+            <a:avLst/>
+          </a:prstGeom>
+          <a:noFill/>
+        </p:spPr>
+        <p:txBody>
+          <a:bodyPr wrap="square" rtlCol="0">
+            <a:spAutoFit/>
+          </a:bodyPr>
+          <a:lstStyle/>
+          <a:p>
+            <a:pPr algn="ctr"/>
+            <a:r>
+              <a:rPr lang="en-US" dirty="0"/>
+              <a:t>Resource-volume</a:t>
+            </a:r>
+            <a:endParaRPr lang="en-GB" dirty="0"/>
+          </a:p>
+        </p:txBody>
+      </p:sp>
+      <p:sp>
+        <p:nvSpPr>
+          <p:cNvPr id="43" name="TextBox 42">
+            <a:extLst>
+              <a:ext uri="{FF2B5EF4-FFF2-40B4-BE49-F238E27FC236}">
+                <a16:creationId xmlns:a16="http://schemas.microsoft.com/office/drawing/2014/main" id="{BE1F2B85-C010-4347-AE54-82A6FE162CA9}"/>
+              </a:ext>
+            </a:extLst>
+          </p:cNvPr>
+          <p:cNvSpPr txBox="1"/>
+          <p:nvPr/>
+        </p:nvSpPr>
+        <p:spPr>
+          <a:xfrm>
+            <a:off x="3352475" y="109949"/>
+            <a:ext cx="2052083" cy="646331"/>
+          </a:xfrm>
+          <a:prstGeom prst="rect">
+            <a:avLst/>
+          </a:prstGeom>
+          <a:noFill/>
+        </p:spPr>
+        <p:txBody>
+          <a:bodyPr wrap="square" rtlCol="0">
+            <a:spAutoFit/>
+          </a:bodyPr>
+          <a:lstStyle/>
+          <a:p>
+            <a:pPr algn="ctr"/>
+            <a:r>
+              <a:rPr lang="en-US" dirty="0"/>
+              <a:t>Primary</a:t>
+            </a:r>
+          </a:p>
+          <a:p>
+            <a:pPr algn="ctr"/>
+            <a:r>
+              <a:rPr lang="en-US" dirty="0"/>
+              <a:t> Energy</a:t>
+            </a:r>
+            <a:endParaRPr lang="en-GB" dirty="0"/>
           </a:p>
         </p:txBody>
       </p:sp>
@@ -10086,42 +10268,6 @@
           </a:p>
         </p:txBody>
       </p:sp>
-      <p:sp>
-        <p:nvSpPr>
-          <p:cNvPr id="13" name="TextBox 12">
-            <a:extLst>
-              <a:ext uri="{FF2B5EF4-FFF2-40B4-BE49-F238E27FC236}">
-                <a16:creationId xmlns:a16="http://schemas.microsoft.com/office/drawing/2014/main" id="{207E41D4-A6DC-48C5-AAFA-9FB2A2DF6E29}"/>
-              </a:ext>
-            </a:extLst>
-          </p:cNvPr>
-          <p:cNvSpPr txBox="1"/>
-          <p:nvPr/>
-        </p:nvSpPr>
-        <p:spPr>
-          <a:xfrm>
-            <a:off x="5931201" y="946455"/>
-            <a:ext cx="2052083" cy="369332"/>
-          </a:xfrm>
-          <a:prstGeom prst="rect">
-            <a:avLst/>
-          </a:prstGeom>
-          <a:noFill/>
-        </p:spPr>
-        <p:txBody>
-          <a:bodyPr wrap="square" rtlCol="0">
-            <a:spAutoFit/>
-          </a:bodyPr>
-          <a:lstStyle/>
-          <a:p>
-            <a:r>
-              <a:rPr lang="en-US" dirty="0"/>
-              <a:t>Secondary Energy</a:t>
-            </a:r>
-            <a:endParaRPr lang="en-GB" dirty="0"/>
-          </a:p>
-        </p:txBody>
-      </p:sp>
       <p:cxnSp>
         <p:nvCxnSpPr>
           <p:cNvPr id="19" name="Straight Arrow Connector 18">
@@ -10302,42 +10448,6 @@
               <a:t>electricity</a:t>
             </a:r>
             <a:endParaRPr lang="en-GB" sz="1600" i="1" dirty="0"/>
-          </a:p>
-        </p:txBody>
-      </p:sp>
-      <p:sp>
-        <p:nvSpPr>
-          <p:cNvPr id="26" name="TextBox 25">
-            <a:extLst>
-              <a:ext uri="{FF2B5EF4-FFF2-40B4-BE49-F238E27FC236}">
-                <a16:creationId xmlns:a16="http://schemas.microsoft.com/office/drawing/2014/main" id="{B4C0CA25-FADB-488E-92FF-E466AD8BB026}"/>
-              </a:ext>
-            </a:extLst>
-          </p:cNvPr>
-          <p:cNvSpPr txBox="1"/>
-          <p:nvPr/>
-        </p:nvSpPr>
-        <p:spPr>
-          <a:xfrm>
-            <a:off x="8078099" y="935822"/>
-            <a:ext cx="2052083" cy="369332"/>
-          </a:xfrm>
-          <a:prstGeom prst="rect">
-            <a:avLst/>
-          </a:prstGeom>
-          <a:noFill/>
-        </p:spPr>
-        <p:txBody>
-          <a:bodyPr wrap="square" rtlCol="0">
-            <a:spAutoFit/>
-          </a:bodyPr>
-          <a:lstStyle/>
-          <a:p>
-            <a:r>
-              <a:rPr lang="en-US" dirty="0"/>
-              <a:t>Final Energy</a:t>
-            </a:r>
-            <a:endParaRPr lang="en-GB" dirty="0"/>
           </a:p>
         </p:txBody>
       </p:sp>
@@ -10457,42 +10567,6 @@
       </p:cxnSp>
       <p:sp>
         <p:nvSpPr>
-          <p:cNvPr id="32" name="TextBox 31">
-            <a:extLst>
-              <a:ext uri="{FF2B5EF4-FFF2-40B4-BE49-F238E27FC236}">
-                <a16:creationId xmlns:a16="http://schemas.microsoft.com/office/drawing/2014/main" id="{3D398559-E7BD-4F66-BE41-421A43A17432}"/>
-              </a:ext>
-            </a:extLst>
-          </p:cNvPr>
-          <p:cNvSpPr txBox="1"/>
-          <p:nvPr/>
-        </p:nvSpPr>
-        <p:spPr>
-          <a:xfrm>
-            <a:off x="10086758" y="946455"/>
-            <a:ext cx="2052083" cy="369332"/>
-          </a:xfrm>
-          <a:prstGeom prst="rect">
-            <a:avLst/>
-          </a:prstGeom>
-          <a:noFill/>
-        </p:spPr>
-        <p:txBody>
-          <a:bodyPr wrap="square" rtlCol="0">
-            <a:spAutoFit/>
-          </a:bodyPr>
-          <a:lstStyle/>
-          <a:p>
-            <a:r>
-              <a:rPr lang="en-US" dirty="0"/>
-              <a:t>Useful Energy</a:t>
-            </a:r>
-            <a:endParaRPr lang="en-GB" dirty="0"/>
-          </a:p>
-        </p:txBody>
-      </p:sp>
-      <p:sp>
-        <p:nvSpPr>
           <p:cNvPr id="34" name="TextBox 33">
             <a:extLst>
               <a:ext uri="{FF2B5EF4-FFF2-40B4-BE49-F238E27FC236}">
@@ -10747,42 +10821,6 @@
           </a:fontRef>
         </p:style>
       </p:cxnSp>
-      <p:sp>
-        <p:nvSpPr>
-          <p:cNvPr id="55" name="TextBox 54">
-            <a:extLst>
-              <a:ext uri="{FF2B5EF4-FFF2-40B4-BE49-F238E27FC236}">
-                <a16:creationId xmlns:a16="http://schemas.microsoft.com/office/drawing/2014/main" id="{3555389D-EF2A-4524-889E-428E6E41D2E2}"/>
-              </a:ext>
-            </a:extLst>
-          </p:cNvPr>
-          <p:cNvSpPr txBox="1"/>
-          <p:nvPr/>
-        </p:nvSpPr>
-        <p:spPr>
-          <a:xfrm>
-            <a:off x="1902340" y="946455"/>
-            <a:ext cx="2052083" cy="369332"/>
-          </a:xfrm>
-          <a:prstGeom prst="rect">
-            <a:avLst/>
-          </a:prstGeom>
-          <a:noFill/>
-        </p:spPr>
-        <p:txBody>
-          <a:bodyPr wrap="square" rtlCol="0">
-            <a:spAutoFit/>
-          </a:bodyPr>
-          <a:lstStyle/>
-          <a:p>
-            <a:r>
-              <a:rPr lang="en-US" dirty="0"/>
-              <a:t>Resource</a:t>
-            </a:r>
-            <a:endParaRPr lang="en-GB" dirty="0"/>
-          </a:p>
-        </p:txBody>
-      </p:sp>
       <p:cxnSp>
         <p:nvCxnSpPr>
           <p:cNvPr id="64" name="Straight Connector 63">
@@ -10807,7 +10845,7 @@
           </a:prstGeom>
           <a:ln w="19050">
             <a:solidFill>
-              <a:schemeClr val="accent3"/>
+              <a:schemeClr val="accent6"/>
             </a:solidFill>
           </a:ln>
         </p:spPr>
@@ -10890,7 +10928,7 @@
           </a:prstGeom>
           <a:ln w="19050">
             <a:solidFill>
-              <a:schemeClr val="accent3"/>
+              <a:schemeClr val="accent6"/>
             </a:solidFill>
             <a:tailEnd type="triangle"/>
           </a:ln>
@@ -10910,6 +10948,175 @@
           </a:fontRef>
         </p:style>
       </p:cxnSp>
+      <p:sp>
+        <p:nvSpPr>
+          <p:cNvPr id="28" name="TextBox 27">
+            <a:extLst>
+              <a:ext uri="{FF2B5EF4-FFF2-40B4-BE49-F238E27FC236}">
+                <a16:creationId xmlns:a16="http://schemas.microsoft.com/office/drawing/2014/main" id="{7FA2B4AC-AC5D-4F8C-881F-D2242185E20C}"/>
+              </a:ext>
+            </a:extLst>
+          </p:cNvPr>
+          <p:cNvSpPr txBox="1"/>
+          <p:nvPr/>
+        </p:nvSpPr>
+        <p:spPr>
+          <a:xfrm>
+            <a:off x="5655063" y="110830"/>
+            <a:ext cx="2052083" cy="646331"/>
+          </a:xfrm>
+          <a:prstGeom prst="rect">
+            <a:avLst/>
+          </a:prstGeom>
+          <a:noFill/>
+        </p:spPr>
+        <p:txBody>
+          <a:bodyPr wrap="square" rtlCol="0">
+            <a:spAutoFit/>
+          </a:bodyPr>
+          <a:lstStyle/>
+          <a:p>
+            <a:pPr algn="ctr"/>
+            <a:r>
+              <a:rPr lang="en-US" dirty="0"/>
+              <a:t>Secondary</a:t>
+            </a:r>
+          </a:p>
+          <a:p>
+            <a:pPr algn="ctr"/>
+            <a:r>
+              <a:rPr lang="en-US" dirty="0"/>
+              <a:t> Energy</a:t>
+            </a:r>
+            <a:endParaRPr lang="en-GB" dirty="0"/>
+          </a:p>
+        </p:txBody>
+      </p:sp>
+      <p:sp>
+        <p:nvSpPr>
+          <p:cNvPr id="29" name="TextBox 28">
+            <a:extLst>
+              <a:ext uri="{FF2B5EF4-FFF2-40B4-BE49-F238E27FC236}">
+                <a16:creationId xmlns:a16="http://schemas.microsoft.com/office/drawing/2014/main" id="{2F2D98F4-A057-4DB7-A7F6-3AD3B3B9F08F}"/>
+              </a:ext>
+            </a:extLst>
+          </p:cNvPr>
+          <p:cNvSpPr txBox="1"/>
+          <p:nvPr/>
+        </p:nvSpPr>
+        <p:spPr>
+          <a:xfrm>
+            <a:off x="7864694" y="89549"/>
+            <a:ext cx="2052083" cy="646331"/>
+          </a:xfrm>
+          <a:prstGeom prst="rect">
+            <a:avLst/>
+          </a:prstGeom>
+          <a:noFill/>
+        </p:spPr>
+        <p:txBody>
+          <a:bodyPr wrap="square" rtlCol="0">
+            <a:spAutoFit/>
+          </a:bodyPr>
+          <a:lstStyle/>
+          <a:p>
+            <a:pPr algn="ctr"/>
+            <a:r>
+              <a:rPr lang="en-US" dirty="0"/>
+              <a:t>Final</a:t>
+            </a:r>
+          </a:p>
+          <a:p>
+            <a:pPr algn="ctr"/>
+            <a:r>
+              <a:rPr lang="en-US" dirty="0"/>
+              <a:t> Energy</a:t>
+            </a:r>
+            <a:endParaRPr lang="en-GB" dirty="0"/>
+          </a:p>
+        </p:txBody>
+      </p:sp>
+      <p:sp>
+        <p:nvSpPr>
+          <p:cNvPr id="31" name="TextBox 30">
+            <a:extLst>
+              <a:ext uri="{FF2B5EF4-FFF2-40B4-BE49-F238E27FC236}">
+                <a16:creationId xmlns:a16="http://schemas.microsoft.com/office/drawing/2014/main" id="{D3BC4884-A123-4537-80D1-DC5170DDF68B}"/>
+              </a:ext>
+            </a:extLst>
+          </p:cNvPr>
+          <p:cNvSpPr txBox="1"/>
+          <p:nvPr/>
+        </p:nvSpPr>
+        <p:spPr>
+          <a:xfrm>
+            <a:off x="9929948" y="103706"/>
+            <a:ext cx="2052083" cy="646331"/>
+          </a:xfrm>
+          <a:prstGeom prst="rect">
+            <a:avLst/>
+          </a:prstGeom>
+          <a:noFill/>
+        </p:spPr>
+        <p:txBody>
+          <a:bodyPr wrap="square" rtlCol="0">
+            <a:spAutoFit/>
+          </a:bodyPr>
+          <a:lstStyle/>
+          <a:p>
+            <a:pPr algn="ctr"/>
+            <a:r>
+              <a:rPr lang="en-US" dirty="0"/>
+              <a:t>Useful</a:t>
+            </a:r>
+          </a:p>
+          <a:p>
+            <a:pPr algn="ctr"/>
+            <a:r>
+              <a:rPr lang="en-US" dirty="0"/>
+              <a:t> Energy</a:t>
+            </a:r>
+            <a:endParaRPr lang="en-GB" dirty="0"/>
+          </a:p>
+        </p:txBody>
+      </p:sp>
+      <p:sp>
+        <p:nvSpPr>
+          <p:cNvPr id="33" name="TextBox 32">
+            <a:extLst>
+              <a:ext uri="{FF2B5EF4-FFF2-40B4-BE49-F238E27FC236}">
+                <a16:creationId xmlns:a16="http://schemas.microsoft.com/office/drawing/2014/main" id="{A3C928EB-45C0-45A7-84E6-9FE30EFB79E7}"/>
+              </a:ext>
+            </a:extLst>
+          </p:cNvPr>
+          <p:cNvSpPr txBox="1"/>
+          <p:nvPr/>
+        </p:nvSpPr>
+        <p:spPr>
+          <a:xfrm>
+            <a:off x="1831517" y="110830"/>
+            <a:ext cx="1475862" cy="646331"/>
+          </a:xfrm>
+          <a:prstGeom prst="rect">
+            <a:avLst/>
+          </a:prstGeom>
+          <a:noFill/>
+        </p:spPr>
+        <p:txBody>
+          <a:bodyPr wrap="square" rtlCol="0">
+            <a:spAutoFit/>
+          </a:bodyPr>
+          <a:lstStyle/>
+          <a:p>
+            <a:pPr algn="ctr"/>
+            <a:r>
+              <a:rPr lang="en-US" dirty="0"/>
+              <a:t>Renewable- potential</a:t>
+            </a:r>
+            <a:endParaRPr lang="en-GB" dirty="0"/>
+          </a:p>
+        </p:txBody>
+      </p:sp>
     </p:spTree>
     <p:extLst>
       <p:ext uri="{BB962C8B-B14F-4D97-AF65-F5344CB8AC3E}">
@@ -11169,42 +11376,6 @@
           </a:p>
         </p:txBody>
       </p:sp>
-      <p:sp>
-        <p:nvSpPr>
-          <p:cNvPr id="13" name="TextBox 12">
-            <a:extLst>
-              <a:ext uri="{FF2B5EF4-FFF2-40B4-BE49-F238E27FC236}">
-                <a16:creationId xmlns:a16="http://schemas.microsoft.com/office/drawing/2014/main" id="{207E41D4-A6DC-48C5-AAFA-9FB2A2DF6E29}"/>
-              </a:ext>
-            </a:extLst>
-          </p:cNvPr>
-          <p:cNvSpPr txBox="1"/>
-          <p:nvPr/>
-        </p:nvSpPr>
-        <p:spPr>
-          <a:xfrm>
-            <a:off x="5931201" y="946455"/>
-            <a:ext cx="2052083" cy="369332"/>
-          </a:xfrm>
-          <a:prstGeom prst="rect">
-            <a:avLst/>
-          </a:prstGeom>
-          <a:noFill/>
-        </p:spPr>
-        <p:txBody>
-          <a:bodyPr wrap="square" rtlCol="0">
-            <a:spAutoFit/>
-          </a:bodyPr>
-          <a:lstStyle/>
-          <a:p>
-            <a:r>
-              <a:rPr lang="en-US" dirty="0"/>
-              <a:t>Secondary Energy</a:t>
-            </a:r>
-            <a:endParaRPr lang="en-GB" dirty="0"/>
-          </a:p>
-        </p:txBody>
-      </p:sp>
       <p:cxnSp>
         <p:nvCxnSpPr>
           <p:cNvPr id="19" name="Straight Arrow Connector 18">
@@ -11385,42 +11556,6 @@
               <a:t>electricity</a:t>
             </a:r>
             <a:endParaRPr lang="en-GB" sz="1600" i="1" dirty="0"/>
-          </a:p>
-        </p:txBody>
-      </p:sp>
-      <p:sp>
-        <p:nvSpPr>
-          <p:cNvPr id="26" name="TextBox 25">
-            <a:extLst>
-              <a:ext uri="{FF2B5EF4-FFF2-40B4-BE49-F238E27FC236}">
-                <a16:creationId xmlns:a16="http://schemas.microsoft.com/office/drawing/2014/main" id="{B4C0CA25-FADB-488E-92FF-E466AD8BB026}"/>
-              </a:ext>
-            </a:extLst>
-          </p:cNvPr>
-          <p:cNvSpPr txBox="1"/>
-          <p:nvPr/>
-        </p:nvSpPr>
-        <p:spPr>
-          <a:xfrm>
-            <a:off x="8078099" y="935822"/>
-            <a:ext cx="2052083" cy="369332"/>
-          </a:xfrm>
-          <a:prstGeom prst="rect">
-            <a:avLst/>
-          </a:prstGeom>
-          <a:noFill/>
-        </p:spPr>
-        <p:txBody>
-          <a:bodyPr wrap="square" rtlCol="0">
-            <a:spAutoFit/>
-          </a:bodyPr>
-          <a:lstStyle/>
-          <a:p>
-            <a:r>
-              <a:rPr lang="en-US" dirty="0"/>
-              <a:t>Final Energy</a:t>
-            </a:r>
-            <a:endParaRPr lang="en-GB" dirty="0"/>
           </a:p>
         </p:txBody>
       </p:sp>
@@ -11540,42 +11675,6 @@
       </p:cxnSp>
       <p:sp>
         <p:nvSpPr>
-          <p:cNvPr id="32" name="TextBox 31">
-            <a:extLst>
-              <a:ext uri="{FF2B5EF4-FFF2-40B4-BE49-F238E27FC236}">
-                <a16:creationId xmlns:a16="http://schemas.microsoft.com/office/drawing/2014/main" id="{3D398559-E7BD-4F66-BE41-421A43A17432}"/>
-              </a:ext>
-            </a:extLst>
-          </p:cNvPr>
-          <p:cNvSpPr txBox="1"/>
-          <p:nvPr/>
-        </p:nvSpPr>
-        <p:spPr>
-          <a:xfrm>
-            <a:off x="10086758" y="946455"/>
-            <a:ext cx="2052083" cy="369332"/>
-          </a:xfrm>
-          <a:prstGeom prst="rect">
-            <a:avLst/>
-          </a:prstGeom>
-          <a:noFill/>
-        </p:spPr>
-        <p:txBody>
-          <a:bodyPr wrap="square" rtlCol="0">
-            <a:spAutoFit/>
-          </a:bodyPr>
-          <a:lstStyle/>
-          <a:p>
-            <a:r>
-              <a:rPr lang="en-US" dirty="0"/>
-              <a:t>Useful Energy</a:t>
-            </a:r>
-            <a:endParaRPr lang="en-GB" dirty="0"/>
-          </a:p>
-        </p:txBody>
-      </p:sp>
-      <p:sp>
-        <p:nvSpPr>
           <p:cNvPr id="34" name="TextBox 33">
             <a:extLst>
               <a:ext uri="{FF2B5EF4-FFF2-40B4-BE49-F238E27FC236}">
@@ -12338,7 +12437,7 @@
                   <a:schemeClr val="tx2"/>
                 </a:solidFill>
               </a:rPr>
-              <a:t>Heating</a:t>
+              <a:t>Heating System</a:t>
             </a:r>
             <a:endParaRPr lang="en-GB" sz="1400" dirty="0">
               <a:solidFill>
@@ -12524,6 +12623,138 @@
           </a:fontRef>
         </p:style>
       </p:cxnSp>
+      <p:sp>
+        <p:nvSpPr>
+          <p:cNvPr id="41" name="TextBox 40">
+            <a:extLst>
+              <a:ext uri="{FF2B5EF4-FFF2-40B4-BE49-F238E27FC236}">
+                <a16:creationId xmlns:a16="http://schemas.microsoft.com/office/drawing/2014/main" id="{6BF438E3-DABE-4D41-BEEE-1FDD5CC7E673}"/>
+              </a:ext>
+            </a:extLst>
+          </p:cNvPr>
+          <p:cNvSpPr txBox="1"/>
+          <p:nvPr/>
+        </p:nvSpPr>
+        <p:spPr>
+          <a:xfrm>
+            <a:off x="5655063" y="110830"/>
+            <a:ext cx="2052083" cy="646331"/>
+          </a:xfrm>
+          <a:prstGeom prst="rect">
+            <a:avLst/>
+          </a:prstGeom>
+          <a:noFill/>
+        </p:spPr>
+        <p:txBody>
+          <a:bodyPr wrap="square" rtlCol="0">
+            <a:spAutoFit/>
+          </a:bodyPr>
+          <a:lstStyle/>
+          <a:p>
+            <a:pPr algn="ctr"/>
+            <a:r>
+              <a:rPr lang="en-US" dirty="0"/>
+              <a:t>Secondary</a:t>
+            </a:r>
+          </a:p>
+          <a:p>
+            <a:pPr algn="ctr"/>
+            <a:r>
+              <a:rPr lang="en-US" dirty="0"/>
+              <a:t> Energy</a:t>
+            </a:r>
+            <a:endParaRPr lang="en-GB" dirty="0"/>
+          </a:p>
+        </p:txBody>
+      </p:sp>
+      <p:sp>
+        <p:nvSpPr>
+          <p:cNvPr id="49" name="TextBox 48">
+            <a:extLst>
+              <a:ext uri="{FF2B5EF4-FFF2-40B4-BE49-F238E27FC236}">
+                <a16:creationId xmlns:a16="http://schemas.microsoft.com/office/drawing/2014/main" id="{E8816686-1EE9-46F6-8D3D-9428B3CBB8DC}"/>
+              </a:ext>
+            </a:extLst>
+          </p:cNvPr>
+          <p:cNvSpPr txBox="1"/>
+          <p:nvPr/>
+        </p:nvSpPr>
+        <p:spPr>
+          <a:xfrm>
+            <a:off x="7864694" y="89549"/>
+            <a:ext cx="2052083" cy="646331"/>
+          </a:xfrm>
+          <a:prstGeom prst="rect">
+            <a:avLst/>
+          </a:prstGeom>
+          <a:noFill/>
+        </p:spPr>
+        <p:txBody>
+          <a:bodyPr wrap="square" rtlCol="0">
+            <a:spAutoFit/>
+          </a:bodyPr>
+          <a:lstStyle/>
+          <a:p>
+            <a:pPr algn="ctr"/>
+            <a:r>
+              <a:rPr lang="en-US" dirty="0"/>
+              <a:t>Final</a:t>
+            </a:r>
+          </a:p>
+          <a:p>
+            <a:pPr algn="ctr"/>
+            <a:r>
+              <a:rPr lang="en-US" dirty="0"/>
+              <a:t> Energy</a:t>
+            </a:r>
+            <a:endParaRPr lang="en-GB" dirty="0"/>
+          </a:p>
+        </p:txBody>
+      </p:sp>
+      <p:sp>
+        <p:nvSpPr>
+          <p:cNvPr id="54" name="TextBox 53">
+            <a:extLst>
+              <a:ext uri="{FF2B5EF4-FFF2-40B4-BE49-F238E27FC236}">
+                <a16:creationId xmlns:a16="http://schemas.microsoft.com/office/drawing/2014/main" id="{B6BF117F-B0C1-4B53-B64E-3B2CC39419AE}"/>
+              </a:ext>
+            </a:extLst>
+          </p:cNvPr>
+          <p:cNvSpPr txBox="1"/>
+          <p:nvPr/>
+        </p:nvSpPr>
+        <p:spPr>
+          <a:xfrm>
+            <a:off x="9929948" y="103706"/>
+            <a:ext cx="2052083" cy="646331"/>
+          </a:xfrm>
+          <a:prstGeom prst="rect">
+            <a:avLst/>
+          </a:prstGeom>
+          <a:noFill/>
+        </p:spPr>
+        <p:txBody>
+          <a:bodyPr wrap="square" rtlCol="0">
+            <a:spAutoFit/>
+          </a:bodyPr>
+          <a:lstStyle/>
+          <a:p>
+            <a:pPr algn="ctr"/>
+            <a:r>
+              <a:rPr lang="en-US" dirty="0"/>
+              <a:t>Useful</a:t>
+            </a:r>
+          </a:p>
+          <a:p>
+            <a:pPr algn="ctr"/>
+            <a:r>
+              <a:rPr lang="en-US" dirty="0"/>
+              <a:t> Energy</a:t>
+            </a:r>
+            <a:endParaRPr lang="en-GB" dirty="0"/>
+          </a:p>
+        </p:txBody>
+      </p:sp>
     </p:spTree>
     <p:extLst>
       <p:ext uri="{BB962C8B-B14F-4D97-AF65-F5344CB8AC3E}">

</xml_diff>

<commit_message>
Adapt RES image for fossil_resource tutorial
</commit_message>
<xml_diff>
--- a/tutorial/westeros/_static/westeros_res.pptx
+++ b/tutorial/westeros/_static/westeros_res.pptx
@@ -6034,7 +6034,7 @@
         <p:spPr>
           <a:xfrm>
             <a:off x="1831517" y="110830"/>
-            <a:ext cx="1475862" cy="1200329"/>
+            <a:ext cx="1475862" cy="1754326"/>
           </a:xfrm>
           <a:prstGeom prst="rect">
             <a:avLst/>
@@ -6050,7 +6050,22 @@
             <a:pPr algn="ctr"/>
             <a:r>
               <a:rPr lang="en-US" dirty="0"/>
-              <a:t>Resource-volume /</a:t>
+              <a:t>Primary Energy</a:t>
+            </a:r>
+          </a:p>
+          <a:p>
+            <a:pPr algn="ctr"/>
+            <a:r>
+              <a:rPr lang="en-US" dirty="0"/>
+              <a:t>(resources)</a:t>
+            </a:r>
+            <a:endParaRPr lang="en-GB" dirty="0"/>
+          </a:p>
+          <a:p>
+            <a:pPr algn="ctr"/>
+            <a:r>
+              <a:rPr lang="en-US" dirty="0"/>
+              <a:t> /</a:t>
             </a:r>
           </a:p>
           <a:p>
@@ -8356,9 +8371,9 @@
           <p:nvPr/>
         </p:nvCxnSpPr>
         <p:spPr>
-          <a:xfrm flipV="1">
-            <a:off x="2215767" y="2482458"/>
-            <a:ext cx="2643324" cy="17876"/>
+          <a:xfrm>
+            <a:off x="2210679" y="2482458"/>
+            <a:ext cx="2648412" cy="0"/>
           </a:xfrm>
           <a:prstGeom prst="straightConnector1">
             <a:avLst/>
@@ -8568,7 +8583,7 @@
         <p:spPr>
           <a:xfrm>
             <a:off x="1831517" y="110830"/>
-            <a:ext cx="1475862" cy="646331"/>
+            <a:ext cx="1475862" cy="923330"/>
           </a:xfrm>
           <a:prstGeom prst="rect">
             <a:avLst/>
@@ -8584,51 +8599,14 @@
             <a:pPr algn="ctr"/>
             <a:r>
               <a:rPr lang="en-US" dirty="0"/>
-              <a:t>Resource-volume</a:t>
-            </a:r>
-            <a:endParaRPr lang="en-GB" dirty="0"/>
-          </a:p>
-        </p:txBody>
-      </p:sp>
-      <p:sp>
-        <p:nvSpPr>
-          <p:cNvPr id="35" name="TextBox 34">
-            <a:extLst>
-              <a:ext uri="{FF2B5EF4-FFF2-40B4-BE49-F238E27FC236}">
-                <a16:creationId xmlns:a16="http://schemas.microsoft.com/office/drawing/2014/main" id="{3ECBD39A-44AB-43C0-8530-BB051ED9D72E}"/>
-              </a:ext>
-            </a:extLst>
-          </p:cNvPr>
-          <p:cNvSpPr txBox="1"/>
-          <p:nvPr/>
-        </p:nvSpPr>
-        <p:spPr>
-          <a:xfrm>
-            <a:off x="3352475" y="109949"/>
-            <a:ext cx="2052083" cy="646331"/>
-          </a:xfrm>
-          <a:prstGeom prst="rect">
-            <a:avLst/>
-          </a:prstGeom>
-          <a:noFill/>
-        </p:spPr>
-        <p:txBody>
-          <a:bodyPr wrap="square" rtlCol="0">
-            <a:spAutoFit/>
-          </a:bodyPr>
-          <a:lstStyle/>
+              <a:t>Primary Energy</a:t>
+            </a:r>
+          </a:p>
           <a:p>
             <a:pPr algn="ctr"/>
             <a:r>
               <a:rPr lang="en-US" dirty="0"/>
-              <a:t>Primary</a:t>
-            </a:r>
-          </a:p>
-          <a:p>
-            <a:pPr algn="ctr"/>
-            <a:r>
-              <a:rPr lang="en-US" dirty="0"/>
-              <a:t> Energy</a:t>
+              <a:t>(resources)</a:t>
             </a:r>
             <a:endParaRPr lang="en-GB" dirty="0"/>
           </a:p>
@@ -9930,10 +9908,10 @@
       </p:sp>
       <p:sp>
         <p:nvSpPr>
-          <p:cNvPr id="42" name="TextBox 41">
-            <a:extLst>
-              <a:ext uri="{FF2B5EF4-FFF2-40B4-BE49-F238E27FC236}">
-                <a16:creationId xmlns:a16="http://schemas.microsoft.com/office/drawing/2014/main" id="{3B848BCB-4076-4A4D-85B3-3D4912CF189B}"/>
+          <p:cNvPr id="43" name="TextBox 42">
+            <a:extLst>
+              <a:ext uri="{FF2B5EF4-FFF2-40B4-BE49-F238E27FC236}">
+                <a16:creationId xmlns:a16="http://schemas.microsoft.com/office/drawing/2014/main" id="{BE1F2B85-C010-4347-AE54-82A6FE162CA9}"/>
               </a:ext>
             </a:extLst>
           </p:cNvPr>
@@ -9942,8 +9920,8 @@
         </p:nvSpPr>
         <p:spPr>
           <a:xfrm>
-            <a:off x="1831517" y="110830"/>
-            <a:ext cx="1475862" cy="646331"/>
+            <a:off x="3352475" y="109949"/>
+            <a:ext cx="2052083" cy="646331"/>
           </a:xfrm>
           <a:prstGeom prst="rect">
             <a:avLst/>
@@ -9959,7 +9937,14 @@
             <a:pPr algn="ctr"/>
             <a:r>
               <a:rPr lang="en-US" dirty="0"/>
-              <a:t>Resource-volume</a:t>
+              <a:t>Primary</a:t>
+            </a:r>
+          </a:p>
+          <a:p>
+            <a:pPr algn="ctr"/>
+            <a:r>
+              <a:rPr lang="en-US" dirty="0"/>
+              <a:t> Energy</a:t>
             </a:r>
             <a:endParaRPr lang="en-GB" dirty="0"/>
           </a:p>
@@ -9967,10 +9952,10 @@
       </p:sp>
       <p:sp>
         <p:nvSpPr>
-          <p:cNvPr id="43" name="TextBox 42">
-            <a:extLst>
-              <a:ext uri="{FF2B5EF4-FFF2-40B4-BE49-F238E27FC236}">
-                <a16:creationId xmlns:a16="http://schemas.microsoft.com/office/drawing/2014/main" id="{BE1F2B85-C010-4347-AE54-82A6FE162CA9}"/>
+          <p:cNvPr id="32" name="TextBox 31">
+            <a:extLst>
+              <a:ext uri="{FF2B5EF4-FFF2-40B4-BE49-F238E27FC236}">
+                <a16:creationId xmlns:a16="http://schemas.microsoft.com/office/drawing/2014/main" id="{ADFD766D-B6A4-4F9B-AB67-44AF033EA300}"/>
               </a:ext>
             </a:extLst>
           </p:cNvPr>
@@ -9979,8 +9964,8 @@
         </p:nvSpPr>
         <p:spPr>
           <a:xfrm>
-            <a:off x="3352475" y="109949"/>
-            <a:ext cx="2052083" cy="646331"/>
+            <a:off x="1831517" y="110830"/>
+            <a:ext cx="1475862" cy="369332"/>
           </a:xfrm>
           <a:prstGeom prst="rect">
             <a:avLst/>
@@ -9996,14 +9981,7 @@
             <a:pPr algn="ctr"/>
             <a:r>
               <a:rPr lang="en-US" dirty="0"/>
-              <a:t>Primary</a:t>
-            </a:r>
-          </a:p>
-          <a:p>
-            <a:pPr algn="ctr"/>
-            <a:r>
-              <a:rPr lang="en-US" dirty="0"/>
-              <a:t> Energy</a:t>
+              <a:t>Resources</a:t>
             </a:r>
             <a:endParaRPr lang="en-GB" dirty="0"/>
           </a:p>

</xml_diff>

<commit_message>
Address review comments by adding explanatory figures
</commit_message>
<xml_diff>
--- a/tutorial/westeros/_static/westeros_res.pptx
+++ b/tutorial/westeros/_static/westeros_res.pptx
@@ -5,7 +5,7 @@
     <p:sldMasterId id="2147483648" r:id="rId1"/>
   </p:sldMasterIdLst>
   <p:notesMasterIdLst>
-    <p:notesMasterId r:id="rId8"/>
+    <p:notesMasterId r:id="rId9"/>
   </p:notesMasterIdLst>
   <p:sldIdLst>
     <p:sldId id="259" r:id="rId2"/>
@@ -13,7 +13,8 @@
     <p:sldId id="261" r:id="rId4"/>
     <p:sldId id="262" r:id="rId5"/>
     <p:sldId id="263" r:id="rId6"/>
-    <p:sldId id="264" r:id="rId7"/>
+    <p:sldId id="265" r:id="rId7"/>
+    <p:sldId id="264" r:id="rId8"/>
   </p:sldIdLst>
   <p:sldSz cx="12192000" cy="6858000"/>
   <p:notesSz cx="6858000" cy="9144000"/>
@@ -202,7 +203,7 @@
           <a:p>
             <a:fld id="{2DF20614-5643-4B1F-B495-FEBC66B49245}" type="datetimeFigureOut">
               <a:rPr lang="en-GB" smtClean="0"/>
-              <a:t>16/04/2021</a:t>
+              <a:t>25/05/2021</a:t>
             </a:fld>
             <a:endParaRPr lang="en-GB"/>
           </a:p>
@@ -1050,6 +1051,134 @@
                 <a:latin typeface="+mn-lt"/>
                 <a:ea typeface="+mn-ea"/>
                 <a:cs typeface="+mn-cs"/>
+                <a:hlinkClick r:id="rId3" tooltip="westeros_renewable_resource.ipynb">
+                  <a:extLst>
+                    <a:ext uri="{A12FA001-AC4F-418D-AE19-62706E023703}">
+                      <ahyp:hlinkClr xmlns:ahyp="http://schemas.microsoft.com/office/drawing/2018/hyperlinkcolor" val="tx"/>
+                    </a:ext>
+                  </a:extLst>
+                </a:hlinkClick>
+              </a:rPr>
+              <a:t>westeros_renewable_resource.ipynb</a:t>
+            </a:r>
+            <a:r>
+              <a:rPr lang="en-GB" sz="1200" kern="1200" dirty="0">
+                <a:solidFill>
+                  <a:schemeClr val="tx1"/>
+                </a:solidFill>
+                <a:latin typeface="+mn-lt"/>
+                <a:ea typeface="+mn-ea"/>
+                <a:cs typeface="+mn-cs"/>
+              </a:rPr>
+              <a:t> (</a:t>
+            </a:r>
+            <a:r>
+              <a:rPr lang="en-GB" dirty="0"/>
+              <a:t>renewable_resource_res_exercise.png)</a:t>
+            </a:r>
+            <a:endParaRPr lang="en-GB" sz="1200" kern="1200" dirty="0">
+              <a:solidFill>
+                <a:schemeClr val="tx1"/>
+              </a:solidFill>
+              <a:latin typeface="+mn-lt"/>
+              <a:ea typeface="+mn-ea"/>
+              <a:cs typeface="+mn-cs"/>
+            </a:endParaRPr>
+          </a:p>
+        </p:txBody>
+      </p:sp>
+      <p:sp>
+        <p:nvSpPr>
+          <p:cNvPr id="4" name="Slide Number Placeholder 3"/>
+          <p:cNvSpPr>
+            <a:spLocks noGrp="1"/>
+          </p:cNvSpPr>
+          <p:nvPr>
+            <p:ph type="sldNum" sz="quarter" idx="5"/>
+          </p:nvPr>
+        </p:nvSpPr>
+        <p:spPr/>
+        <p:txBody>
+          <a:bodyPr/>
+          <a:lstStyle/>
+          <a:p>
+            <a:fld id="{F13B7C99-D787-4AFE-BD1E-3415CA097FC0}" type="slidenum">
+              <a:rPr lang="en-GB" smtClean="0"/>
+              <a:t>6</a:t>
+            </a:fld>
+            <a:endParaRPr lang="en-GB"/>
+          </a:p>
+        </p:txBody>
+      </p:sp>
+    </p:spTree>
+    <p:extLst>
+      <p:ext uri="{BB962C8B-B14F-4D97-AF65-F5344CB8AC3E}">
+        <p14:creationId xmlns:p14="http://schemas.microsoft.com/office/powerpoint/2010/main" val="1987413493"/>
+      </p:ext>
+    </p:extLst>
+  </p:cSld>
+  <p:clrMapOvr>
+    <a:masterClrMapping/>
+  </p:clrMapOvr>
+</p:notes>
+</file>
+
+<file path=ppt/notesSlides/notesSlide7.xml><?xml version="1.0" encoding="utf-8"?>
+<p:notes xmlns:a="http://schemas.openxmlformats.org/drawingml/2006/main" xmlns:r="http://schemas.openxmlformats.org/officeDocument/2006/relationships" xmlns:p="http://schemas.openxmlformats.org/presentationml/2006/main">
+  <p:cSld>
+    <p:spTree>
+      <p:nvGrpSpPr>
+        <p:cNvPr id="1" name=""/>
+        <p:cNvGrpSpPr/>
+        <p:nvPr/>
+      </p:nvGrpSpPr>
+      <p:grpSpPr>
+        <a:xfrm>
+          <a:off x="0" y="0"/>
+          <a:ext cx="0" cy="0"/>
+          <a:chOff x="0" y="0"/>
+          <a:chExt cx="0" cy="0"/>
+        </a:xfrm>
+      </p:grpSpPr>
+      <p:sp>
+        <p:nvSpPr>
+          <p:cNvPr id="2" name="Slide Image Placeholder 1"/>
+          <p:cNvSpPr>
+            <a:spLocks noGrp="1" noRot="1" noChangeAspect="1"/>
+          </p:cNvSpPr>
+          <p:nvPr>
+            <p:ph type="sldImg"/>
+          </p:nvPr>
+        </p:nvSpPr>
+        <p:spPr/>
+      </p:sp>
+      <p:sp>
+        <p:nvSpPr>
+          <p:cNvPr id="3" name="Notes Placeholder 2"/>
+          <p:cNvSpPr>
+            <a:spLocks noGrp="1"/>
+          </p:cNvSpPr>
+          <p:nvPr>
+            <p:ph type="body" idx="1"/>
+          </p:nvPr>
+        </p:nvSpPr>
+        <p:spPr/>
+        <p:txBody>
+          <a:bodyPr/>
+          <a:lstStyle/>
+          <a:p>
+            <a:r>
+              <a:rPr lang="en-US" dirty="0"/>
+              <a:t>Tutorial: </a:t>
+            </a:r>
+            <a:r>
+              <a:rPr lang="en-GB" sz="1200" kern="1200" dirty="0" err="1">
+                <a:solidFill>
+                  <a:schemeClr val="tx1"/>
+                </a:solidFill>
+                <a:latin typeface="+mn-lt"/>
+                <a:ea typeface="+mn-ea"/>
+                <a:cs typeface="+mn-cs"/>
                 <a:hlinkClick r:id="rId3" tooltip="westeros_addon_technologies.ipynb">
                   <a:extLst>
                     <a:ext uri="{A12FA001-AC4F-418D-AE19-62706E023703}">
@@ -1103,7 +1232,7 @@
           <a:p>
             <a:fld id="{F13B7C99-D787-4AFE-BD1E-3415CA097FC0}" type="slidenum">
               <a:rPr lang="en-GB" smtClean="0"/>
-              <a:t>6</a:t>
+              <a:t>7</a:t>
             </a:fld>
             <a:endParaRPr lang="en-GB"/>
           </a:p>
@@ -1271,7 +1400,7 @@
           <a:p>
             <a:fld id="{EE05C8E7-49BF-4F60-9111-00AC92B15D4A}" type="datetimeFigureOut">
               <a:rPr lang="en-GB" smtClean="0"/>
-              <a:t>16/04/2021</a:t>
+              <a:t>25/05/2021</a:t>
             </a:fld>
             <a:endParaRPr lang="en-GB"/>
           </a:p>
@@ -1471,7 +1600,7 @@
           <a:p>
             <a:fld id="{EE05C8E7-49BF-4F60-9111-00AC92B15D4A}" type="datetimeFigureOut">
               <a:rPr lang="en-GB" smtClean="0"/>
-              <a:t>16/04/2021</a:t>
+              <a:t>25/05/2021</a:t>
             </a:fld>
             <a:endParaRPr lang="en-GB"/>
           </a:p>
@@ -1681,7 +1810,7 @@
           <a:p>
             <a:fld id="{EE05C8E7-49BF-4F60-9111-00AC92B15D4A}" type="datetimeFigureOut">
               <a:rPr lang="en-GB" smtClean="0"/>
-              <a:t>16/04/2021</a:t>
+              <a:t>25/05/2021</a:t>
             </a:fld>
             <a:endParaRPr lang="en-GB"/>
           </a:p>
@@ -1881,7 +2010,7 @@
           <a:p>
             <a:fld id="{EE05C8E7-49BF-4F60-9111-00AC92B15D4A}" type="datetimeFigureOut">
               <a:rPr lang="en-GB" smtClean="0"/>
-              <a:t>16/04/2021</a:t>
+              <a:t>25/05/2021</a:t>
             </a:fld>
             <a:endParaRPr lang="en-GB"/>
           </a:p>
@@ -2157,7 +2286,7 @@
           <a:p>
             <a:fld id="{EE05C8E7-49BF-4F60-9111-00AC92B15D4A}" type="datetimeFigureOut">
               <a:rPr lang="en-GB" smtClean="0"/>
-              <a:t>16/04/2021</a:t>
+              <a:t>25/05/2021</a:t>
             </a:fld>
             <a:endParaRPr lang="en-GB"/>
           </a:p>
@@ -2425,7 +2554,7 @@
           <a:p>
             <a:fld id="{EE05C8E7-49BF-4F60-9111-00AC92B15D4A}" type="datetimeFigureOut">
               <a:rPr lang="en-GB" smtClean="0"/>
-              <a:t>16/04/2021</a:t>
+              <a:t>25/05/2021</a:t>
             </a:fld>
             <a:endParaRPr lang="en-GB"/>
           </a:p>
@@ -2840,7 +2969,7 @@
           <a:p>
             <a:fld id="{EE05C8E7-49BF-4F60-9111-00AC92B15D4A}" type="datetimeFigureOut">
               <a:rPr lang="en-GB" smtClean="0"/>
-              <a:t>16/04/2021</a:t>
+              <a:t>25/05/2021</a:t>
             </a:fld>
             <a:endParaRPr lang="en-GB"/>
           </a:p>
@@ -2982,7 +3111,7 @@
           <a:p>
             <a:fld id="{EE05C8E7-49BF-4F60-9111-00AC92B15D4A}" type="datetimeFigureOut">
               <a:rPr lang="en-GB" smtClean="0"/>
-              <a:t>16/04/2021</a:t>
+              <a:t>25/05/2021</a:t>
             </a:fld>
             <a:endParaRPr lang="en-GB"/>
           </a:p>
@@ -3095,7 +3224,7 @@
           <a:p>
             <a:fld id="{EE05C8E7-49BF-4F60-9111-00AC92B15D4A}" type="datetimeFigureOut">
               <a:rPr lang="en-GB" smtClean="0"/>
-              <a:t>16/04/2021</a:t>
+              <a:t>25/05/2021</a:t>
             </a:fld>
             <a:endParaRPr lang="en-GB"/>
           </a:p>
@@ -3408,7 +3537,7 @@
           <a:p>
             <a:fld id="{EE05C8E7-49BF-4F60-9111-00AC92B15D4A}" type="datetimeFigureOut">
               <a:rPr lang="en-GB" smtClean="0"/>
-              <a:t>16/04/2021</a:t>
+              <a:t>25/05/2021</a:t>
             </a:fld>
             <a:endParaRPr lang="en-GB"/>
           </a:p>
@@ -3697,7 +3826,7 @@
           <a:p>
             <a:fld id="{EE05C8E7-49BF-4F60-9111-00AC92B15D4A}" type="datetimeFigureOut">
               <a:rPr lang="en-GB" smtClean="0"/>
-              <a:t>16/04/2021</a:t>
+              <a:t>25/05/2021</a:t>
             </a:fld>
             <a:endParaRPr lang="en-GB"/>
           </a:p>
@@ -3940,7 +4069,7 @@
           <a:p>
             <a:fld id="{EE05C8E7-49BF-4F60-9111-00AC92B15D4A}" type="datetimeFigureOut">
               <a:rPr lang="en-GB" smtClean="0"/>
-              <a:t>16/04/2021</a:t>
+              <a:t>25/05/2021</a:t>
             </a:fld>
             <a:endParaRPr lang="en-GB"/>
           </a:p>
@@ -11109,6 +11238,2039 @@
 </file>
 
 <file path=ppt/slides/slide6.xml><?xml version="1.0" encoding="utf-8"?>
+<p:sld xmlns:a="http://schemas.openxmlformats.org/drawingml/2006/main" xmlns:r="http://schemas.openxmlformats.org/officeDocument/2006/relationships" xmlns:p="http://schemas.openxmlformats.org/presentationml/2006/main">
+  <p:cSld>
+    <p:spTree>
+      <p:nvGrpSpPr>
+        <p:cNvPr id="1" name=""/>
+        <p:cNvGrpSpPr/>
+        <p:nvPr/>
+      </p:nvGrpSpPr>
+      <p:grpSpPr>
+        <a:xfrm>
+          <a:off x="0" y="0"/>
+          <a:ext cx="0" cy="0"/>
+          <a:chOff x="0" y="0"/>
+          <a:chExt cx="0" cy="0"/>
+        </a:xfrm>
+      </p:grpSpPr>
+      <p:pic>
+        <p:nvPicPr>
+          <p:cNvPr id="5" name="Picture 4" descr="A picture containing tree&#10;&#10;Description automatically generated">
+            <a:extLst>
+              <a:ext uri="{FF2B5EF4-FFF2-40B4-BE49-F238E27FC236}">
+                <a16:creationId xmlns:a16="http://schemas.microsoft.com/office/drawing/2014/main" id="{FC78D001-BA7B-411C-9683-5CBBAC10B0D4}"/>
+              </a:ext>
+            </a:extLst>
+          </p:cNvPr>
+          <p:cNvPicPr>
+            <a:picLocks noChangeAspect="1"/>
+          </p:cNvPicPr>
+          <p:nvPr/>
+        </p:nvPicPr>
+        <p:blipFill>
+          <a:blip r:embed="rId3">
+            <a:extLst>
+              <a:ext uri="{28A0092B-C50C-407E-A947-70E740481C1C}">
+                <a14:useLocalDpi xmlns:a14="http://schemas.microsoft.com/office/drawing/2010/main" val="0"/>
+              </a:ext>
+            </a:extLst>
+          </a:blip>
+          <a:stretch>
+            <a:fillRect/>
+          </a:stretch>
+        </p:blipFill>
+        <p:spPr>
+          <a:xfrm>
+            <a:off x="80282" y="90975"/>
+            <a:ext cx="1748518" cy="6650067"/>
+          </a:xfrm>
+          <a:prstGeom prst="rect">
+            <a:avLst/>
+          </a:prstGeom>
+        </p:spPr>
+      </p:pic>
+      <p:sp>
+        <p:nvSpPr>
+          <p:cNvPr id="6" name="Rectangle: Rounded Corners 5">
+            <a:extLst>
+              <a:ext uri="{FF2B5EF4-FFF2-40B4-BE49-F238E27FC236}">
+                <a16:creationId xmlns:a16="http://schemas.microsoft.com/office/drawing/2014/main" id="{F8633EE9-FEA9-4222-AAD4-B2C6D4256BEB}"/>
+              </a:ext>
+            </a:extLst>
+          </p:cNvPr>
+          <p:cNvSpPr/>
+          <p:nvPr/>
+        </p:nvSpPr>
+        <p:spPr>
+          <a:xfrm>
+            <a:off x="4859091" y="2158409"/>
+            <a:ext cx="1167812" cy="648098"/>
+          </a:xfrm>
+          <a:prstGeom prst="roundRect">
+            <a:avLst/>
+          </a:prstGeom>
+          <a:effectLst>
+            <a:outerShdw blurRad="50800" dist="38100" dir="2700000" algn="tl" rotWithShape="0">
+              <a:prstClr val="black">
+                <a:alpha val="40000"/>
+              </a:prstClr>
+            </a:outerShdw>
+          </a:effectLst>
+        </p:spPr>
+        <p:style>
+          <a:lnRef idx="2">
+            <a:schemeClr val="accent1">
+              <a:shade val="50000"/>
+            </a:schemeClr>
+          </a:lnRef>
+          <a:fillRef idx="1">
+            <a:schemeClr val="accent1"/>
+          </a:fillRef>
+          <a:effectRef idx="0">
+            <a:schemeClr val="accent1"/>
+          </a:effectRef>
+          <a:fontRef idx="minor">
+            <a:schemeClr val="lt1"/>
+          </a:fontRef>
+        </p:style>
+        <p:txBody>
+          <a:bodyPr rtlCol="0" anchor="ctr"/>
+          <a:lstStyle/>
+          <a:p>
+            <a:pPr algn="ctr"/>
+            <a:r>
+              <a:rPr lang="en-US" sz="1400" dirty="0"/>
+              <a:t>Coal Power plant</a:t>
+            </a:r>
+            <a:endParaRPr lang="en-GB" sz="1400" dirty="0"/>
+          </a:p>
+        </p:txBody>
+      </p:sp>
+      <p:sp>
+        <p:nvSpPr>
+          <p:cNvPr id="8" name="Rectangle: Rounded Corners 7">
+            <a:extLst>
+              <a:ext uri="{FF2B5EF4-FFF2-40B4-BE49-F238E27FC236}">
+                <a16:creationId xmlns:a16="http://schemas.microsoft.com/office/drawing/2014/main" id="{3E2ADBF9-1561-42B4-BA48-67BB8BE3BFDE}"/>
+              </a:ext>
+            </a:extLst>
+          </p:cNvPr>
+          <p:cNvSpPr/>
+          <p:nvPr/>
+        </p:nvSpPr>
+        <p:spPr>
+          <a:xfrm>
+            <a:off x="4859091" y="3452194"/>
+            <a:ext cx="1167812" cy="648098"/>
+          </a:xfrm>
+          <a:prstGeom prst="roundRect">
+            <a:avLst/>
+          </a:prstGeom>
+          <a:effectLst>
+            <a:outerShdw blurRad="50800" dist="38100" dir="2700000" algn="tl" rotWithShape="0">
+              <a:prstClr val="black">
+                <a:alpha val="40000"/>
+              </a:prstClr>
+            </a:outerShdw>
+          </a:effectLst>
+        </p:spPr>
+        <p:style>
+          <a:lnRef idx="2">
+            <a:schemeClr val="accent1">
+              <a:shade val="50000"/>
+            </a:schemeClr>
+          </a:lnRef>
+          <a:fillRef idx="1">
+            <a:schemeClr val="accent1"/>
+          </a:fillRef>
+          <a:effectRef idx="0">
+            <a:schemeClr val="accent1"/>
+          </a:effectRef>
+          <a:fontRef idx="minor">
+            <a:schemeClr val="lt1"/>
+          </a:fontRef>
+        </p:style>
+        <p:txBody>
+          <a:bodyPr rtlCol="0" anchor="ctr"/>
+          <a:lstStyle/>
+          <a:p>
+            <a:pPr algn="ctr"/>
+            <a:r>
+              <a:rPr lang="en-US" sz="1400" dirty="0"/>
+              <a:t>Wind Power plant</a:t>
+            </a:r>
+            <a:endParaRPr lang="en-GB" sz="1400" dirty="0"/>
+          </a:p>
+        </p:txBody>
+      </p:sp>
+      <p:cxnSp>
+        <p:nvCxnSpPr>
+          <p:cNvPr id="10" name="Straight Connector 9">
+            <a:extLst>
+              <a:ext uri="{FF2B5EF4-FFF2-40B4-BE49-F238E27FC236}">
+                <a16:creationId xmlns:a16="http://schemas.microsoft.com/office/drawing/2014/main" id="{2F9E68B1-FD81-4783-9940-8BCB1B952402}"/>
+              </a:ext>
+            </a:extLst>
+          </p:cNvPr>
+          <p:cNvCxnSpPr>
+            <a:cxnSpLocks/>
+          </p:cNvCxnSpPr>
+          <p:nvPr/>
+        </p:nvCxnSpPr>
+        <p:spPr>
+          <a:xfrm>
+            <a:off x="6515992" y="1424763"/>
+            <a:ext cx="0" cy="4848446"/>
+          </a:xfrm>
+          <a:prstGeom prst="line">
+            <a:avLst/>
+          </a:prstGeom>
+          <a:ln w="19050">
+            <a:solidFill>
+              <a:schemeClr val="accent3"/>
+            </a:solidFill>
+          </a:ln>
+        </p:spPr>
+        <p:style>
+          <a:lnRef idx="1">
+            <a:schemeClr val="accent1"/>
+          </a:lnRef>
+          <a:fillRef idx="0">
+            <a:schemeClr val="accent1"/>
+          </a:fillRef>
+          <a:effectRef idx="0">
+            <a:schemeClr val="accent1"/>
+          </a:effectRef>
+          <a:fontRef idx="minor">
+            <a:schemeClr val="tx1"/>
+          </a:fontRef>
+        </p:style>
+      </p:cxnSp>
+      <p:sp>
+        <p:nvSpPr>
+          <p:cNvPr id="12" name="TextBox 11">
+            <a:extLst>
+              <a:ext uri="{FF2B5EF4-FFF2-40B4-BE49-F238E27FC236}">
+                <a16:creationId xmlns:a16="http://schemas.microsoft.com/office/drawing/2014/main" id="{0E8B3392-B5A5-4DB3-9CD1-C4E2643543FC}"/>
+              </a:ext>
+            </a:extLst>
+          </p:cNvPr>
+          <p:cNvSpPr txBox="1"/>
+          <p:nvPr/>
+        </p:nvSpPr>
+        <p:spPr>
+          <a:xfrm rot="16200000">
+            <a:off x="5686656" y="5380918"/>
+            <a:ext cx="1446028" cy="338554"/>
+          </a:xfrm>
+          <a:prstGeom prst="rect">
+            <a:avLst/>
+          </a:prstGeom>
+          <a:noFill/>
+        </p:spPr>
+        <p:txBody>
+          <a:bodyPr wrap="square" rtlCol="0">
+            <a:spAutoFit/>
+          </a:bodyPr>
+          <a:lstStyle/>
+          <a:p>
+            <a:r>
+              <a:rPr lang="en-US" sz="1600" i="1" dirty="0"/>
+              <a:t>electricity</a:t>
+            </a:r>
+            <a:endParaRPr lang="en-GB" sz="1600" i="1" dirty="0"/>
+          </a:p>
+        </p:txBody>
+      </p:sp>
+      <p:cxnSp>
+        <p:nvCxnSpPr>
+          <p:cNvPr id="19" name="Straight Arrow Connector 18">
+            <a:extLst>
+              <a:ext uri="{FF2B5EF4-FFF2-40B4-BE49-F238E27FC236}">
+                <a16:creationId xmlns:a16="http://schemas.microsoft.com/office/drawing/2014/main" id="{6D083F21-1F05-47B4-9EEF-49841860D25B}"/>
+              </a:ext>
+            </a:extLst>
+          </p:cNvPr>
+          <p:cNvCxnSpPr>
+            <a:cxnSpLocks/>
+          </p:cNvCxnSpPr>
+          <p:nvPr/>
+        </p:nvCxnSpPr>
+        <p:spPr>
+          <a:xfrm>
+            <a:off x="6037536" y="2463287"/>
+            <a:ext cx="490860" cy="0"/>
+          </a:xfrm>
+          <a:prstGeom prst="straightConnector1">
+            <a:avLst/>
+          </a:prstGeom>
+          <a:ln w="19050">
+            <a:solidFill>
+              <a:schemeClr val="accent3"/>
+            </a:solidFill>
+            <a:tailEnd type="triangle"/>
+          </a:ln>
+        </p:spPr>
+        <p:style>
+          <a:lnRef idx="1">
+            <a:schemeClr val="accent1"/>
+          </a:lnRef>
+          <a:fillRef idx="0">
+            <a:schemeClr val="accent1"/>
+          </a:fillRef>
+          <a:effectRef idx="0">
+            <a:schemeClr val="accent1"/>
+          </a:effectRef>
+          <a:fontRef idx="minor">
+            <a:schemeClr val="tx1"/>
+          </a:fontRef>
+        </p:style>
+      </p:cxnSp>
+      <p:sp>
+        <p:nvSpPr>
+          <p:cNvPr id="21" name="Rectangle: Rounded Corners 20">
+            <a:extLst>
+              <a:ext uri="{FF2B5EF4-FFF2-40B4-BE49-F238E27FC236}">
+                <a16:creationId xmlns:a16="http://schemas.microsoft.com/office/drawing/2014/main" id="{298E4124-6468-4690-8D4B-2CD3E5229B88}"/>
+              </a:ext>
+            </a:extLst>
+          </p:cNvPr>
+          <p:cNvSpPr/>
+          <p:nvPr/>
+        </p:nvSpPr>
+        <p:spPr>
+          <a:xfrm>
+            <a:off x="7016608" y="2701159"/>
+            <a:ext cx="1167812" cy="648098"/>
+          </a:xfrm>
+          <a:prstGeom prst="roundRect">
+            <a:avLst/>
+          </a:prstGeom>
+          <a:solidFill>
+            <a:schemeClr val="accent3"/>
+          </a:solidFill>
+          <a:effectLst>
+            <a:outerShdw blurRad="50800" dist="38100" dir="2700000" algn="tl" rotWithShape="0">
+              <a:prstClr val="black">
+                <a:alpha val="40000"/>
+              </a:prstClr>
+            </a:outerShdw>
+          </a:effectLst>
+        </p:spPr>
+        <p:style>
+          <a:lnRef idx="2">
+            <a:schemeClr val="accent1">
+              <a:shade val="50000"/>
+            </a:schemeClr>
+          </a:lnRef>
+          <a:fillRef idx="1">
+            <a:schemeClr val="accent1"/>
+          </a:fillRef>
+          <a:effectRef idx="0">
+            <a:schemeClr val="accent1"/>
+          </a:effectRef>
+          <a:fontRef idx="minor">
+            <a:schemeClr val="lt1"/>
+          </a:fontRef>
+        </p:style>
+        <p:txBody>
+          <a:bodyPr rtlCol="0" anchor="ctr"/>
+          <a:lstStyle/>
+          <a:p>
+            <a:pPr algn="ctr"/>
+            <a:r>
+              <a:rPr lang="en-US" sz="1400" dirty="0"/>
+              <a:t>Electricity grid</a:t>
+            </a:r>
+            <a:endParaRPr lang="en-GB" sz="1400" dirty="0"/>
+          </a:p>
+        </p:txBody>
+      </p:sp>
+      <p:cxnSp>
+        <p:nvCxnSpPr>
+          <p:cNvPr id="24" name="Straight Connector 23">
+            <a:extLst>
+              <a:ext uri="{FF2B5EF4-FFF2-40B4-BE49-F238E27FC236}">
+                <a16:creationId xmlns:a16="http://schemas.microsoft.com/office/drawing/2014/main" id="{ADBFB2B2-0588-403F-8ABA-38D32C2C704E}"/>
+              </a:ext>
+            </a:extLst>
+          </p:cNvPr>
+          <p:cNvCxnSpPr>
+            <a:cxnSpLocks/>
+          </p:cNvCxnSpPr>
+          <p:nvPr/>
+        </p:nvCxnSpPr>
+        <p:spPr>
+          <a:xfrm>
+            <a:off x="8662890" y="1414130"/>
+            <a:ext cx="0" cy="4848446"/>
+          </a:xfrm>
+          <a:prstGeom prst="line">
+            <a:avLst/>
+          </a:prstGeom>
+          <a:ln w="19050">
+            <a:solidFill>
+              <a:schemeClr val="accent3"/>
+            </a:solidFill>
+          </a:ln>
+        </p:spPr>
+        <p:style>
+          <a:lnRef idx="1">
+            <a:schemeClr val="accent1"/>
+          </a:lnRef>
+          <a:fillRef idx="0">
+            <a:schemeClr val="accent1"/>
+          </a:fillRef>
+          <a:effectRef idx="0">
+            <a:schemeClr val="accent1"/>
+          </a:effectRef>
+          <a:fontRef idx="minor">
+            <a:schemeClr val="tx1"/>
+          </a:fontRef>
+        </p:style>
+      </p:cxnSp>
+      <p:sp>
+        <p:nvSpPr>
+          <p:cNvPr id="25" name="TextBox 24">
+            <a:extLst>
+              <a:ext uri="{FF2B5EF4-FFF2-40B4-BE49-F238E27FC236}">
+                <a16:creationId xmlns:a16="http://schemas.microsoft.com/office/drawing/2014/main" id="{04C8A71D-7E29-449F-9BEB-F12BAEFEC2C6}"/>
+              </a:ext>
+            </a:extLst>
+          </p:cNvPr>
+          <p:cNvSpPr txBox="1"/>
+          <p:nvPr/>
+        </p:nvSpPr>
+        <p:spPr>
+          <a:xfrm rot="16200000">
+            <a:off x="7833554" y="5370285"/>
+            <a:ext cx="1446028" cy="338554"/>
+          </a:xfrm>
+          <a:prstGeom prst="rect">
+            <a:avLst/>
+          </a:prstGeom>
+          <a:noFill/>
+        </p:spPr>
+        <p:txBody>
+          <a:bodyPr wrap="square" rtlCol="0">
+            <a:spAutoFit/>
+          </a:bodyPr>
+          <a:lstStyle/>
+          <a:p>
+            <a:r>
+              <a:rPr lang="en-US" sz="1600" i="1" dirty="0"/>
+              <a:t>electricity</a:t>
+            </a:r>
+            <a:endParaRPr lang="en-GB" sz="1600" i="1" dirty="0"/>
+          </a:p>
+        </p:txBody>
+      </p:sp>
+      <p:sp>
+        <p:nvSpPr>
+          <p:cNvPr id="27" name="Rectangle: Rounded Corners 26">
+            <a:extLst>
+              <a:ext uri="{FF2B5EF4-FFF2-40B4-BE49-F238E27FC236}">
+                <a16:creationId xmlns:a16="http://schemas.microsoft.com/office/drawing/2014/main" id="{B07F9F24-4857-4B65-A14B-B27957460C9D}"/>
+              </a:ext>
+            </a:extLst>
+          </p:cNvPr>
+          <p:cNvSpPr/>
+          <p:nvPr/>
+        </p:nvSpPr>
+        <p:spPr>
+          <a:xfrm>
+            <a:off x="9167896" y="2699220"/>
+            <a:ext cx="1167812" cy="648098"/>
+          </a:xfrm>
+          <a:prstGeom prst="roundRect">
+            <a:avLst/>
+          </a:prstGeom>
+          <a:solidFill>
+            <a:schemeClr val="accent4">
+              <a:lumMod val="60000"/>
+              <a:lumOff val="40000"/>
+            </a:schemeClr>
+          </a:solidFill>
+          <a:effectLst>
+            <a:outerShdw blurRad="50800" dist="38100" dir="2700000" algn="tl" rotWithShape="0">
+              <a:prstClr val="black">
+                <a:alpha val="40000"/>
+              </a:prstClr>
+            </a:outerShdw>
+          </a:effectLst>
+        </p:spPr>
+        <p:style>
+          <a:lnRef idx="2">
+            <a:schemeClr val="accent1">
+              <a:shade val="50000"/>
+            </a:schemeClr>
+          </a:lnRef>
+          <a:fillRef idx="1">
+            <a:schemeClr val="accent1"/>
+          </a:fillRef>
+          <a:effectRef idx="0">
+            <a:schemeClr val="accent1"/>
+          </a:effectRef>
+          <a:fontRef idx="minor">
+            <a:schemeClr val="lt1"/>
+          </a:fontRef>
+        </p:style>
+        <p:txBody>
+          <a:bodyPr rtlCol="0" anchor="ctr"/>
+          <a:lstStyle/>
+          <a:p>
+            <a:pPr algn="ctr"/>
+            <a:r>
+              <a:rPr lang="en-US" sz="1400" dirty="0">
+                <a:solidFill>
+                  <a:schemeClr val="tx2"/>
+                </a:solidFill>
+              </a:rPr>
+              <a:t>Light bulb</a:t>
+            </a:r>
+            <a:endParaRPr lang="en-GB" sz="1400" dirty="0">
+              <a:solidFill>
+                <a:schemeClr val="tx2"/>
+              </a:solidFill>
+            </a:endParaRPr>
+          </a:p>
+        </p:txBody>
+      </p:sp>
+      <p:cxnSp>
+        <p:nvCxnSpPr>
+          <p:cNvPr id="30" name="Straight Connector 29">
+            <a:extLst>
+              <a:ext uri="{FF2B5EF4-FFF2-40B4-BE49-F238E27FC236}">
+                <a16:creationId xmlns:a16="http://schemas.microsoft.com/office/drawing/2014/main" id="{2A7CDF69-8ECC-4089-841A-1C1F528D4591}"/>
+              </a:ext>
+            </a:extLst>
+          </p:cNvPr>
+          <p:cNvCxnSpPr>
+            <a:cxnSpLocks/>
+          </p:cNvCxnSpPr>
+          <p:nvPr/>
+        </p:nvCxnSpPr>
+        <p:spPr>
+          <a:xfrm>
+            <a:off x="10831919" y="1417673"/>
+            <a:ext cx="0" cy="4848446"/>
+          </a:xfrm>
+          <a:prstGeom prst="line">
+            <a:avLst/>
+          </a:prstGeom>
+          <a:ln w="19050">
+            <a:solidFill>
+              <a:schemeClr val="accent3"/>
+            </a:solidFill>
+          </a:ln>
+        </p:spPr>
+        <p:style>
+          <a:lnRef idx="1">
+            <a:schemeClr val="accent1"/>
+          </a:lnRef>
+          <a:fillRef idx="0">
+            <a:schemeClr val="accent1"/>
+          </a:fillRef>
+          <a:effectRef idx="0">
+            <a:schemeClr val="accent1"/>
+          </a:effectRef>
+          <a:fontRef idx="minor">
+            <a:schemeClr val="tx1"/>
+          </a:fontRef>
+        </p:style>
+      </p:cxnSp>
+      <p:sp>
+        <p:nvSpPr>
+          <p:cNvPr id="34" name="TextBox 33">
+            <a:extLst>
+              <a:ext uri="{FF2B5EF4-FFF2-40B4-BE49-F238E27FC236}">
+                <a16:creationId xmlns:a16="http://schemas.microsoft.com/office/drawing/2014/main" id="{2FA4194E-715D-41C7-A8C3-F47E59D77DAF}"/>
+              </a:ext>
+            </a:extLst>
+          </p:cNvPr>
+          <p:cNvSpPr txBox="1"/>
+          <p:nvPr/>
+        </p:nvSpPr>
+        <p:spPr>
+          <a:xfrm rot="16200000">
+            <a:off x="9996825" y="5380918"/>
+            <a:ext cx="1446028" cy="338554"/>
+          </a:xfrm>
+          <a:prstGeom prst="rect">
+            <a:avLst/>
+          </a:prstGeom>
+          <a:noFill/>
+        </p:spPr>
+        <p:txBody>
+          <a:bodyPr wrap="square" rtlCol="0">
+            <a:spAutoFit/>
+          </a:bodyPr>
+          <a:lstStyle/>
+          <a:p>
+            <a:r>
+              <a:rPr lang="en-US" sz="1600" i="1" dirty="0"/>
+              <a:t>light</a:t>
+            </a:r>
+            <a:endParaRPr lang="en-GB" sz="1600" i="1" dirty="0"/>
+          </a:p>
+        </p:txBody>
+      </p:sp>
+      <p:cxnSp>
+        <p:nvCxnSpPr>
+          <p:cNvPr id="36" name="Straight Arrow Connector 35">
+            <a:extLst>
+              <a:ext uri="{FF2B5EF4-FFF2-40B4-BE49-F238E27FC236}">
+                <a16:creationId xmlns:a16="http://schemas.microsoft.com/office/drawing/2014/main" id="{3A4F30B4-AD73-46F9-AE23-F8FF4B4F9BEB}"/>
+              </a:ext>
+            </a:extLst>
+          </p:cNvPr>
+          <p:cNvCxnSpPr>
+            <a:cxnSpLocks/>
+          </p:cNvCxnSpPr>
+          <p:nvPr/>
+        </p:nvCxnSpPr>
+        <p:spPr>
+          <a:xfrm>
+            <a:off x="6026903" y="3817166"/>
+            <a:ext cx="490860" cy="0"/>
+          </a:xfrm>
+          <a:prstGeom prst="straightConnector1">
+            <a:avLst/>
+          </a:prstGeom>
+          <a:ln w="19050">
+            <a:solidFill>
+              <a:schemeClr val="accent3"/>
+            </a:solidFill>
+            <a:tailEnd type="triangle"/>
+          </a:ln>
+        </p:spPr>
+        <p:style>
+          <a:lnRef idx="1">
+            <a:schemeClr val="accent1"/>
+          </a:lnRef>
+          <a:fillRef idx="0">
+            <a:schemeClr val="accent1"/>
+          </a:fillRef>
+          <a:effectRef idx="0">
+            <a:schemeClr val="accent1"/>
+          </a:effectRef>
+          <a:fontRef idx="minor">
+            <a:schemeClr val="tx1"/>
+          </a:fontRef>
+        </p:style>
+      </p:cxnSp>
+      <p:cxnSp>
+        <p:nvCxnSpPr>
+          <p:cNvPr id="37" name="Straight Arrow Connector 36">
+            <a:extLst>
+              <a:ext uri="{FF2B5EF4-FFF2-40B4-BE49-F238E27FC236}">
+                <a16:creationId xmlns:a16="http://schemas.microsoft.com/office/drawing/2014/main" id="{C148FF27-B077-46C7-A5CA-2916CF619CD0}"/>
+              </a:ext>
+            </a:extLst>
+          </p:cNvPr>
+          <p:cNvCxnSpPr>
+            <a:cxnSpLocks/>
+          </p:cNvCxnSpPr>
+          <p:nvPr/>
+        </p:nvCxnSpPr>
+        <p:spPr>
+          <a:xfrm>
+            <a:off x="6528396" y="3023269"/>
+            <a:ext cx="490860" cy="0"/>
+          </a:xfrm>
+          <a:prstGeom prst="straightConnector1">
+            <a:avLst/>
+          </a:prstGeom>
+          <a:ln w="19050">
+            <a:solidFill>
+              <a:schemeClr val="accent3"/>
+            </a:solidFill>
+            <a:tailEnd type="triangle"/>
+          </a:ln>
+        </p:spPr>
+        <p:style>
+          <a:lnRef idx="1">
+            <a:schemeClr val="accent1"/>
+          </a:lnRef>
+          <a:fillRef idx="0">
+            <a:schemeClr val="accent1"/>
+          </a:fillRef>
+          <a:effectRef idx="0">
+            <a:schemeClr val="accent1"/>
+          </a:effectRef>
+          <a:fontRef idx="minor">
+            <a:schemeClr val="tx1"/>
+          </a:fontRef>
+        </p:style>
+      </p:cxnSp>
+      <p:cxnSp>
+        <p:nvCxnSpPr>
+          <p:cNvPr id="38" name="Straight Arrow Connector 37">
+            <a:extLst>
+              <a:ext uri="{FF2B5EF4-FFF2-40B4-BE49-F238E27FC236}">
+                <a16:creationId xmlns:a16="http://schemas.microsoft.com/office/drawing/2014/main" id="{71AAD4D5-8896-495F-A137-08F0F223FBB2}"/>
+              </a:ext>
+            </a:extLst>
+          </p:cNvPr>
+          <p:cNvCxnSpPr>
+            <a:cxnSpLocks/>
+          </p:cNvCxnSpPr>
+          <p:nvPr/>
+        </p:nvCxnSpPr>
+        <p:spPr>
+          <a:xfrm>
+            <a:off x="8184420" y="3023269"/>
+            <a:ext cx="490860" cy="0"/>
+          </a:xfrm>
+          <a:prstGeom prst="straightConnector1">
+            <a:avLst/>
+          </a:prstGeom>
+          <a:ln w="19050">
+            <a:solidFill>
+              <a:schemeClr val="accent3"/>
+            </a:solidFill>
+            <a:tailEnd type="triangle"/>
+          </a:ln>
+        </p:spPr>
+        <p:style>
+          <a:lnRef idx="1">
+            <a:schemeClr val="accent1"/>
+          </a:lnRef>
+          <a:fillRef idx="0">
+            <a:schemeClr val="accent1"/>
+          </a:fillRef>
+          <a:effectRef idx="0">
+            <a:schemeClr val="accent1"/>
+          </a:effectRef>
+          <a:fontRef idx="minor">
+            <a:schemeClr val="tx1"/>
+          </a:fontRef>
+        </p:style>
+      </p:cxnSp>
+      <p:cxnSp>
+        <p:nvCxnSpPr>
+          <p:cNvPr id="39" name="Straight Arrow Connector 38">
+            <a:extLst>
+              <a:ext uri="{FF2B5EF4-FFF2-40B4-BE49-F238E27FC236}">
+                <a16:creationId xmlns:a16="http://schemas.microsoft.com/office/drawing/2014/main" id="{EF0D3E1E-6E0C-43C4-BFB4-20BDA4FFA4F9}"/>
+              </a:ext>
+            </a:extLst>
+          </p:cNvPr>
+          <p:cNvCxnSpPr>
+            <a:cxnSpLocks/>
+          </p:cNvCxnSpPr>
+          <p:nvPr/>
+        </p:nvCxnSpPr>
+        <p:spPr>
+          <a:xfrm>
+            <a:off x="8675280" y="3023269"/>
+            <a:ext cx="490860" cy="0"/>
+          </a:xfrm>
+          <a:prstGeom prst="straightConnector1">
+            <a:avLst/>
+          </a:prstGeom>
+          <a:ln w="19050">
+            <a:solidFill>
+              <a:schemeClr val="accent3"/>
+            </a:solidFill>
+            <a:tailEnd type="triangle"/>
+          </a:ln>
+        </p:spPr>
+        <p:style>
+          <a:lnRef idx="1">
+            <a:schemeClr val="accent1"/>
+          </a:lnRef>
+          <a:fillRef idx="0">
+            <a:schemeClr val="accent1"/>
+          </a:fillRef>
+          <a:effectRef idx="0">
+            <a:schemeClr val="accent1"/>
+          </a:effectRef>
+          <a:fontRef idx="minor">
+            <a:schemeClr val="tx1"/>
+          </a:fontRef>
+        </p:style>
+      </p:cxnSp>
+      <p:cxnSp>
+        <p:nvCxnSpPr>
+          <p:cNvPr id="40" name="Straight Arrow Connector 39">
+            <a:extLst>
+              <a:ext uri="{FF2B5EF4-FFF2-40B4-BE49-F238E27FC236}">
+                <a16:creationId xmlns:a16="http://schemas.microsoft.com/office/drawing/2014/main" id="{35659653-296B-4240-9A23-B5656089DF19}"/>
+              </a:ext>
+            </a:extLst>
+          </p:cNvPr>
+          <p:cNvCxnSpPr>
+            <a:cxnSpLocks/>
+          </p:cNvCxnSpPr>
+          <p:nvPr/>
+        </p:nvCxnSpPr>
+        <p:spPr>
+          <a:xfrm>
+            <a:off x="10335708" y="3023269"/>
+            <a:ext cx="490860" cy="0"/>
+          </a:xfrm>
+          <a:prstGeom prst="straightConnector1">
+            <a:avLst/>
+          </a:prstGeom>
+          <a:ln w="19050">
+            <a:solidFill>
+              <a:schemeClr val="accent3"/>
+            </a:solidFill>
+            <a:tailEnd type="triangle"/>
+          </a:ln>
+        </p:spPr>
+        <p:style>
+          <a:lnRef idx="1">
+            <a:schemeClr val="accent1"/>
+          </a:lnRef>
+          <a:fillRef idx="0">
+            <a:schemeClr val="accent1"/>
+          </a:fillRef>
+          <a:effectRef idx="0">
+            <a:schemeClr val="accent1"/>
+          </a:effectRef>
+          <a:fontRef idx="minor">
+            <a:schemeClr val="tx1"/>
+          </a:fontRef>
+        </p:style>
+      </p:cxnSp>
+      <p:cxnSp>
+        <p:nvCxnSpPr>
+          <p:cNvPr id="64" name="Straight Connector 63">
+            <a:extLst>
+              <a:ext uri="{FF2B5EF4-FFF2-40B4-BE49-F238E27FC236}">
+                <a16:creationId xmlns:a16="http://schemas.microsoft.com/office/drawing/2014/main" id="{823FF5C7-8B2C-490C-AAFF-6C865A0C39EF}"/>
+              </a:ext>
+            </a:extLst>
+          </p:cNvPr>
+          <p:cNvCxnSpPr>
+            <a:cxnSpLocks/>
+          </p:cNvCxnSpPr>
+          <p:nvPr/>
+        </p:nvCxnSpPr>
+        <p:spPr>
+          <a:xfrm>
+            <a:off x="2543840" y="1428301"/>
+            <a:ext cx="0" cy="4848446"/>
+          </a:xfrm>
+          <a:prstGeom prst="line">
+            <a:avLst/>
+          </a:prstGeom>
+          <a:ln w="19050">
+            <a:solidFill>
+              <a:schemeClr val="accent6"/>
+            </a:solidFill>
+          </a:ln>
+        </p:spPr>
+        <p:style>
+          <a:lnRef idx="1">
+            <a:schemeClr val="accent1"/>
+          </a:lnRef>
+          <a:fillRef idx="0">
+            <a:schemeClr val="accent1"/>
+          </a:fillRef>
+          <a:effectRef idx="0">
+            <a:schemeClr val="accent1"/>
+          </a:effectRef>
+          <a:fontRef idx="minor">
+            <a:schemeClr val="tx1"/>
+          </a:fontRef>
+        </p:style>
+      </p:cxnSp>
+      <p:sp>
+        <p:nvSpPr>
+          <p:cNvPr id="71" name="TextBox 70">
+            <a:extLst>
+              <a:ext uri="{FF2B5EF4-FFF2-40B4-BE49-F238E27FC236}">
+                <a16:creationId xmlns:a16="http://schemas.microsoft.com/office/drawing/2014/main" id="{2BEA6F66-910C-4F31-9255-F20EBA820F0C}"/>
+              </a:ext>
+            </a:extLst>
+          </p:cNvPr>
+          <p:cNvSpPr txBox="1"/>
+          <p:nvPr/>
+        </p:nvSpPr>
+        <p:spPr>
+          <a:xfrm rot="16200000">
+            <a:off x="1492438" y="5144055"/>
+            <a:ext cx="1901686" cy="338554"/>
+          </a:xfrm>
+          <a:prstGeom prst="rect">
+            <a:avLst/>
+          </a:prstGeom>
+          <a:noFill/>
+          <a:ln>
+            <a:noFill/>
+          </a:ln>
+        </p:spPr>
+        <p:txBody>
+          <a:bodyPr wrap="square" rtlCol="0">
+            <a:spAutoFit/>
+          </a:bodyPr>
+          <a:lstStyle/>
+          <a:p>
+            <a:r>
+              <a:rPr lang="en-US" sz="1600" i="1" dirty="0"/>
+              <a:t>Wind potential “c3”</a:t>
+            </a:r>
+            <a:endParaRPr lang="en-GB" sz="1600" i="1" dirty="0"/>
+          </a:p>
+        </p:txBody>
+      </p:sp>
+      <p:sp>
+        <p:nvSpPr>
+          <p:cNvPr id="28" name="TextBox 27">
+            <a:extLst>
+              <a:ext uri="{FF2B5EF4-FFF2-40B4-BE49-F238E27FC236}">
+                <a16:creationId xmlns:a16="http://schemas.microsoft.com/office/drawing/2014/main" id="{7FA2B4AC-AC5D-4F8C-881F-D2242185E20C}"/>
+              </a:ext>
+            </a:extLst>
+          </p:cNvPr>
+          <p:cNvSpPr txBox="1"/>
+          <p:nvPr/>
+        </p:nvSpPr>
+        <p:spPr>
+          <a:xfrm>
+            <a:off x="5655063" y="110830"/>
+            <a:ext cx="2052083" cy="646331"/>
+          </a:xfrm>
+          <a:prstGeom prst="rect">
+            <a:avLst/>
+          </a:prstGeom>
+          <a:noFill/>
+        </p:spPr>
+        <p:txBody>
+          <a:bodyPr wrap="square" rtlCol="0">
+            <a:spAutoFit/>
+          </a:bodyPr>
+          <a:lstStyle/>
+          <a:p>
+            <a:pPr algn="ctr"/>
+            <a:r>
+              <a:rPr lang="en-US" dirty="0"/>
+              <a:t>Secondary</a:t>
+            </a:r>
+          </a:p>
+          <a:p>
+            <a:pPr algn="ctr"/>
+            <a:r>
+              <a:rPr lang="en-US" dirty="0"/>
+              <a:t> Energy</a:t>
+            </a:r>
+            <a:endParaRPr lang="en-GB" dirty="0"/>
+          </a:p>
+        </p:txBody>
+      </p:sp>
+      <p:sp>
+        <p:nvSpPr>
+          <p:cNvPr id="29" name="TextBox 28">
+            <a:extLst>
+              <a:ext uri="{FF2B5EF4-FFF2-40B4-BE49-F238E27FC236}">
+                <a16:creationId xmlns:a16="http://schemas.microsoft.com/office/drawing/2014/main" id="{2F2D98F4-A057-4DB7-A7F6-3AD3B3B9F08F}"/>
+              </a:ext>
+            </a:extLst>
+          </p:cNvPr>
+          <p:cNvSpPr txBox="1"/>
+          <p:nvPr/>
+        </p:nvSpPr>
+        <p:spPr>
+          <a:xfrm>
+            <a:off x="7864694" y="89549"/>
+            <a:ext cx="2052083" cy="646331"/>
+          </a:xfrm>
+          <a:prstGeom prst="rect">
+            <a:avLst/>
+          </a:prstGeom>
+          <a:noFill/>
+        </p:spPr>
+        <p:txBody>
+          <a:bodyPr wrap="square" rtlCol="0">
+            <a:spAutoFit/>
+          </a:bodyPr>
+          <a:lstStyle/>
+          <a:p>
+            <a:pPr algn="ctr"/>
+            <a:r>
+              <a:rPr lang="en-US" dirty="0"/>
+              <a:t>Final</a:t>
+            </a:r>
+          </a:p>
+          <a:p>
+            <a:pPr algn="ctr"/>
+            <a:r>
+              <a:rPr lang="en-US" dirty="0"/>
+              <a:t> Energy</a:t>
+            </a:r>
+            <a:endParaRPr lang="en-GB" dirty="0"/>
+          </a:p>
+        </p:txBody>
+      </p:sp>
+      <p:sp>
+        <p:nvSpPr>
+          <p:cNvPr id="31" name="TextBox 30">
+            <a:extLst>
+              <a:ext uri="{FF2B5EF4-FFF2-40B4-BE49-F238E27FC236}">
+                <a16:creationId xmlns:a16="http://schemas.microsoft.com/office/drawing/2014/main" id="{D3BC4884-A123-4537-80D1-DC5170DDF68B}"/>
+              </a:ext>
+            </a:extLst>
+          </p:cNvPr>
+          <p:cNvSpPr txBox="1"/>
+          <p:nvPr/>
+        </p:nvSpPr>
+        <p:spPr>
+          <a:xfrm>
+            <a:off x="9929948" y="103706"/>
+            <a:ext cx="2052083" cy="646331"/>
+          </a:xfrm>
+          <a:prstGeom prst="rect">
+            <a:avLst/>
+          </a:prstGeom>
+          <a:noFill/>
+        </p:spPr>
+        <p:txBody>
+          <a:bodyPr wrap="square" rtlCol="0">
+            <a:spAutoFit/>
+          </a:bodyPr>
+          <a:lstStyle/>
+          <a:p>
+            <a:pPr algn="ctr"/>
+            <a:r>
+              <a:rPr lang="en-US" dirty="0"/>
+              <a:t>Useful</a:t>
+            </a:r>
+          </a:p>
+          <a:p>
+            <a:pPr algn="ctr"/>
+            <a:r>
+              <a:rPr lang="en-US" dirty="0"/>
+              <a:t> Energy</a:t>
+            </a:r>
+            <a:endParaRPr lang="en-GB" dirty="0"/>
+          </a:p>
+        </p:txBody>
+      </p:sp>
+      <p:sp>
+        <p:nvSpPr>
+          <p:cNvPr id="33" name="TextBox 32">
+            <a:extLst>
+              <a:ext uri="{FF2B5EF4-FFF2-40B4-BE49-F238E27FC236}">
+                <a16:creationId xmlns:a16="http://schemas.microsoft.com/office/drawing/2014/main" id="{A3C928EB-45C0-45A7-84E6-9FE30EFB79E7}"/>
+              </a:ext>
+            </a:extLst>
+          </p:cNvPr>
+          <p:cNvSpPr txBox="1"/>
+          <p:nvPr/>
+        </p:nvSpPr>
+        <p:spPr>
+          <a:xfrm>
+            <a:off x="1831517" y="110830"/>
+            <a:ext cx="1475862" cy="646331"/>
+          </a:xfrm>
+          <a:prstGeom prst="rect">
+            <a:avLst/>
+          </a:prstGeom>
+          <a:noFill/>
+        </p:spPr>
+        <p:txBody>
+          <a:bodyPr wrap="square" rtlCol="0">
+            <a:spAutoFit/>
+          </a:bodyPr>
+          <a:lstStyle/>
+          <a:p>
+            <a:pPr algn="ctr"/>
+            <a:r>
+              <a:rPr lang="en-US" dirty="0"/>
+              <a:t>Renewable- potential</a:t>
+            </a:r>
+            <a:endParaRPr lang="en-GB" dirty="0"/>
+          </a:p>
+        </p:txBody>
+      </p:sp>
+      <p:sp>
+        <p:nvSpPr>
+          <p:cNvPr id="32" name="Rectangle: Rounded Corners 31">
+            <a:extLst>
+              <a:ext uri="{FF2B5EF4-FFF2-40B4-BE49-F238E27FC236}">
+                <a16:creationId xmlns:a16="http://schemas.microsoft.com/office/drawing/2014/main" id="{BE2BDE03-64E5-4C55-8730-D7A6C2EE9A9E}"/>
+              </a:ext>
+            </a:extLst>
+          </p:cNvPr>
+          <p:cNvSpPr/>
+          <p:nvPr/>
+        </p:nvSpPr>
+        <p:spPr>
+          <a:xfrm>
+            <a:off x="2985331" y="2178224"/>
+            <a:ext cx="1167812" cy="648098"/>
+          </a:xfrm>
+          <a:prstGeom prst="roundRect">
+            <a:avLst/>
+          </a:prstGeom>
+          <a:solidFill>
+            <a:schemeClr val="accent6"/>
+          </a:solidFill>
+          <a:effectLst>
+            <a:outerShdw blurRad="50800" dist="38100" dir="2700000" algn="tl" rotWithShape="0">
+              <a:prstClr val="black">
+                <a:alpha val="40000"/>
+              </a:prstClr>
+            </a:outerShdw>
+          </a:effectLst>
+        </p:spPr>
+        <p:style>
+          <a:lnRef idx="2">
+            <a:schemeClr val="accent1">
+              <a:shade val="50000"/>
+            </a:schemeClr>
+          </a:lnRef>
+          <a:fillRef idx="1">
+            <a:schemeClr val="accent1"/>
+          </a:fillRef>
+          <a:effectRef idx="0">
+            <a:schemeClr val="accent1"/>
+          </a:effectRef>
+          <a:fontRef idx="minor">
+            <a:schemeClr val="lt1"/>
+          </a:fontRef>
+        </p:style>
+        <p:txBody>
+          <a:bodyPr rtlCol="0" anchor="ctr"/>
+          <a:lstStyle/>
+          <a:p>
+            <a:pPr algn="ctr"/>
+            <a:r>
+              <a:rPr lang="en-US" sz="1400" dirty="0"/>
+              <a:t>connection_to_grid_c1</a:t>
+            </a:r>
+            <a:endParaRPr lang="en-GB" sz="1400" dirty="0"/>
+          </a:p>
+        </p:txBody>
+      </p:sp>
+      <p:cxnSp>
+        <p:nvCxnSpPr>
+          <p:cNvPr id="35" name="Straight Connector 34">
+            <a:extLst>
+              <a:ext uri="{FF2B5EF4-FFF2-40B4-BE49-F238E27FC236}">
+                <a16:creationId xmlns:a16="http://schemas.microsoft.com/office/drawing/2014/main" id="{1A7D132F-16A3-48C0-AAB3-853E794AD858}"/>
+              </a:ext>
+            </a:extLst>
+          </p:cNvPr>
+          <p:cNvCxnSpPr>
+            <a:cxnSpLocks/>
+          </p:cNvCxnSpPr>
+          <p:nvPr/>
+        </p:nvCxnSpPr>
+        <p:spPr>
+          <a:xfrm>
+            <a:off x="4350261" y="1412191"/>
+            <a:ext cx="0" cy="4848446"/>
+          </a:xfrm>
+          <a:prstGeom prst="line">
+            <a:avLst/>
+          </a:prstGeom>
+          <a:ln w="19050">
+            <a:solidFill>
+              <a:schemeClr val="accent6"/>
+            </a:solidFill>
+          </a:ln>
+        </p:spPr>
+        <p:style>
+          <a:lnRef idx="1">
+            <a:schemeClr val="accent1"/>
+          </a:lnRef>
+          <a:fillRef idx="0">
+            <a:schemeClr val="accent1"/>
+          </a:fillRef>
+          <a:effectRef idx="0">
+            <a:schemeClr val="accent1"/>
+          </a:effectRef>
+          <a:fontRef idx="minor">
+            <a:schemeClr val="tx1"/>
+          </a:fontRef>
+        </p:style>
+      </p:cxnSp>
+      <p:cxnSp>
+        <p:nvCxnSpPr>
+          <p:cNvPr id="42" name="Straight Arrow Connector 41">
+            <a:extLst>
+              <a:ext uri="{FF2B5EF4-FFF2-40B4-BE49-F238E27FC236}">
+                <a16:creationId xmlns:a16="http://schemas.microsoft.com/office/drawing/2014/main" id="{F20225D8-6760-4CD4-840C-18A5934D87A9}"/>
+              </a:ext>
+            </a:extLst>
+          </p:cNvPr>
+          <p:cNvCxnSpPr>
+            <a:cxnSpLocks/>
+          </p:cNvCxnSpPr>
+          <p:nvPr/>
+        </p:nvCxnSpPr>
+        <p:spPr>
+          <a:xfrm>
+            <a:off x="4160018" y="2500334"/>
+            <a:ext cx="202633" cy="0"/>
+          </a:xfrm>
+          <a:prstGeom prst="straightConnector1">
+            <a:avLst/>
+          </a:prstGeom>
+          <a:ln w="19050">
+            <a:solidFill>
+              <a:schemeClr val="accent6"/>
+            </a:solidFill>
+            <a:tailEnd type="triangle"/>
+          </a:ln>
+        </p:spPr>
+        <p:style>
+          <a:lnRef idx="1">
+            <a:schemeClr val="accent1"/>
+          </a:lnRef>
+          <a:fillRef idx="0">
+            <a:schemeClr val="accent1"/>
+          </a:fillRef>
+          <a:effectRef idx="0">
+            <a:schemeClr val="accent1"/>
+          </a:effectRef>
+          <a:fontRef idx="minor">
+            <a:schemeClr val="tx1"/>
+          </a:fontRef>
+        </p:style>
+      </p:cxnSp>
+      <p:cxnSp>
+        <p:nvCxnSpPr>
+          <p:cNvPr id="43" name="Straight Arrow Connector 42">
+            <a:extLst>
+              <a:ext uri="{FF2B5EF4-FFF2-40B4-BE49-F238E27FC236}">
+                <a16:creationId xmlns:a16="http://schemas.microsoft.com/office/drawing/2014/main" id="{A72C8E12-466E-4B19-A2F8-7923FE7F7D05}"/>
+              </a:ext>
+            </a:extLst>
+          </p:cNvPr>
+          <p:cNvCxnSpPr>
+            <a:cxnSpLocks/>
+          </p:cNvCxnSpPr>
+          <p:nvPr/>
+        </p:nvCxnSpPr>
+        <p:spPr>
+          <a:xfrm>
+            <a:off x="4362651" y="3796571"/>
+            <a:ext cx="490860" cy="0"/>
+          </a:xfrm>
+          <a:prstGeom prst="straightConnector1">
+            <a:avLst/>
+          </a:prstGeom>
+          <a:ln w="19050">
+            <a:solidFill>
+              <a:schemeClr val="accent6"/>
+            </a:solidFill>
+            <a:tailEnd type="triangle"/>
+          </a:ln>
+        </p:spPr>
+        <p:style>
+          <a:lnRef idx="1">
+            <a:schemeClr val="accent1"/>
+          </a:lnRef>
+          <a:fillRef idx="0">
+            <a:schemeClr val="accent1"/>
+          </a:fillRef>
+          <a:effectRef idx="0">
+            <a:schemeClr val="accent1"/>
+          </a:effectRef>
+          <a:fontRef idx="minor">
+            <a:schemeClr val="tx1"/>
+          </a:fontRef>
+        </p:style>
+      </p:cxnSp>
+      <p:sp>
+        <p:nvSpPr>
+          <p:cNvPr id="44" name="TextBox 43">
+            <a:extLst>
+              <a:ext uri="{FF2B5EF4-FFF2-40B4-BE49-F238E27FC236}">
+                <a16:creationId xmlns:a16="http://schemas.microsoft.com/office/drawing/2014/main" id="{7BEF0DBB-3462-4795-B6A3-9D508DEB9A65}"/>
+              </a:ext>
+            </a:extLst>
+          </p:cNvPr>
+          <p:cNvSpPr txBox="1"/>
+          <p:nvPr/>
+        </p:nvSpPr>
+        <p:spPr>
+          <a:xfrm>
+            <a:off x="3352475" y="109949"/>
+            <a:ext cx="2052083" cy="646331"/>
+          </a:xfrm>
+          <a:prstGeom prst="rect">
+            <a:avLst/>
+          </a:prstGeom>
+          <a:noFill/>
+        </p:spPr>
+        <p:txBody>
+          <a:bodyPr wrap="square" rtlCol="0">
+            <a:spAutoFit/>
+          </a:bodyPr>
+          <a:lstStyle/>
+          <a:p>
+            <a:pPr algn="ctr"/>
+            <a:r>
+              <a:rPr lang="en-US" dirty="0"/>
+              <a:t>Primary</a:t>
+            </a:r>
+          </a:p>
+          <a:p>
+            <a:pPr algn="ctr"/>
+            <a:r>
+              <a:rPr lang="en-US" dirty="0"/>
+              <a:t> Energy</a:t>
+            </a:r>
+            <a:endParaRPr lang="en-GB" dirty="0"/>
+          </a:p>
+        </p:txBody>
+      </p:sp>
+      <p:sp>
+        <p:nvSpPr>
+          <p:cNvPr id="45" name="Rectangle: Rounded Corners 44">
+            <a:extLst>
+              <a:ext uri="{FF2B5EF4-FFF2-40B4-BE49-F238E27FC236}">
+                <a16:creationId xmlns:a16="http://schemas.microsoft.com/office/drawing/2014/main" id="{556A5AD0-8B75-43CF-953C-3A9C09588FDF}"/>
+              </a:ext>
+            </a:extLst>
+          </p:cNvPr>
+          <p:cNvSpPr/>
+          <p:nvPr/>
+        </p:nvSpPr>
+        <p:spPr>
+          <a:xfrm>
+            <a:off x="2983916" y="2940380"/>
+            <a:ext cx="1167812" cy="648098"/>
+          </a:xfrm>
+          <a:prstGeom prst="roundRect">
+            <a:avLst/>
+          </a:prstGeom>
+          <a:solidFill>
+            <a:schemeClr val="accent6"/>
+          </a:solidFill>
+          <a:effectLst>
+            <a:outerShdw blurRad="50800" dist="38100" dir="2700000" algn="tl" rotWithShape="0">
+              <a:prstClr val="black">
+                <a:alpha val="40000"/>
+              </a:prstClr>
+            </a:outerShdw>
+          </a:effectLst>
+        </p:spPr>
+        <p:style>
+          <a:lnRef idx="2">
+            <a:schemeClr val="accent1">
+              <a:shade val="50000"/>
+            </a:schemeClr>
+          </a:lnRef>
+          <a:fillRef idx="1">
+            <a:schemeClr val="accent1"/>
+          </a:fillRef>
+          <a:effectRef idx="0">
+            <a:schemeClr val="accent1"/>
+          </a:effectRef>
+          <a:fontRef idx="minor">
+            <a:schemeClr val="lt1"/>
+          </a:fontRef>
+        </p:style>
+        <p:txBody>
+          <a:bodyPr rtlCol="0" anchor="ctr"/>
+          <a:lstStyle/>
+          <a:p>
+            <a:pPr algn="ctr"/>
+            <a:r>
+              <a:rPr lang="en-US" sz="1400" dirty="0"/>
+              <a:t>connection_to_grid_c2</a:t>
+            </a:r>
+            <a:endParaRPr lang="en-GB" sz="1400" dirty="0"/>
+          </a:p>
+        </p:txBody>
+      </p:sp>
+      <p:cxnSp>
+        <p:nvCxnSpPr>
+          <p:cNvPr id="46" name="Straight Arrow Connector 45">
+            <a:extLst>
+              <a:ext uri="{FF2B5EF4-FFF2-40B4-BE49-F238E27FC236}">
+                <a16:creationId xmlns:a16="http://schemas.microsoft.com/office/drawing/2014/main" id="{F82DE8CB-4CEA-42A2-92F9-A7836982317B}"/>
+              </a:ext>
+            </a:extLst>
+          </p:cNvPr>
+          <p:cNvCxnSpPr>
+            <a:cxnSpLocks/>
+          </p:cNvCxnSpPr>
+          <p:nvPr/>
+        </p:nvCxnSpPr>
+        <p:spPr>
+          <a:xfrm>
+            <a:off x="4158603" y="3262490"/>
+            <a:ext cx="202633" cy="0"/>
+          </a:xfrm>
+          <a:prstGeom prst="straightConnector1">
+            <a:avLst/>
+          </a:prstGeom>
+          <a:ln w="19050">
+            <a:solidFill>
+              <a:schemeClr val="accent6"/>
+            </a:solidFill>
+            <a:tailEnd type="triangle"/>
+          </a:ln>
+        </p:spPr>
+        <p:style>
+          <a:lnRef idx="1">
+            <a:schemeClr val="accent1"/>
+          </a:lnRef>
+          <a:fillRef idx="0">
+            <a:schemeClr val="accent1"/>
+          </a:fillRef>
+          <a:effectRef idx="0">
+            <a:schemeClr val="accent1"/>
+          </a:effectRef>
+          <a:fontRef idx="minor">
+            <a:schemeClr val="tx1"/>
+          </a:fontRef>
+        </p:style>
+      </p:cxnSp>
+      <p:sp>
+        <p:nvSpPr>
+          <p:cNvPr id="47" name="Rectangle: Rounded Corners 46">
+            <a:extLst>
+              <a:ext uri="{FF2B5EF4-FFF2-40B4-BE49-F238E27FC236}">
+                <a16:creationId xmlns:a16="http://schemas.microsoft.com/office/drawing/2014/main" id="{0B820E0E-1CCA-46A3-8400-5883B2608BDD}"/>
+              </a:ext>
+            </a:extLst>
+          </p:cNvPr>
+          <p:cNvSpPr/>
+          <p:nvPr/>
+        </p:nvSpPr>
+        <p:spPr>
+          <a:xfrm>
+            <a:off x="2986792" y="3702536"/>
+            <a:ext cx="1167812" cy="648098"/>
+          </a:xfrm>
+          <a:prstGeom prst="roundRect">
+            <a:avLst/>
+          </a:prstGeom>
+          <a:solidFill>
+            <a:schemeClr val="accent6"/>
+          </a:solidFill>
+          <a:effectLst>
+            <a:outerShdw blurRad="50800" dist="38100" dir="2700000" algn="tl" rotWithShape="0">
+              <a:prstClr val="black">
+                <a:alpha val="40000"/>
+              </a:prstClr>
+            </a:outerShdw>
+          </a:effectLst>
+        </p:spPr>
+        <p:style>
+          <a:lnRef idx="2">
+            <a:schemeClr val="accent1">
+              <a:shade val="50000"/>
+            </a:schemeClr>
+          </a:lnRef>
+          <a:fillRef idx="1">
+            <a:schemeClr val="accent1"/>
+          </a:fillRef>
+          <a:effectRef idx="0">
+            <a:schemeClr val="accent1"/>
+          </a:effectRef>
+          <a:fontRef idx="minor">
+            <a:schemeClr val="lt1"/>
+          </a:fontRef>
+        </p:style>
+        <p:txBody>
+          <a:bodyPr rtlCol="0" anchor="ctr"/>
+          <a:lstStyle/>
+          <a:p>
+            <a:pPr algn="ctr"/>
+            <a:r>
+              <a:rPr lang="en-US" sz="1400" dirty="0"/>
+              <a:t>connection_to_grid_c3</a:t>
+            </a:r>
+            <a:endParaRPr lang="en-GB" sz="1400" dirty="0"/>
+          </a:p>
+        </p:txBody>
+      </p:sp>
+      <p:cxnSp>
+        <p:nvCxnSpPr>
+          <p:cNvPr id="48" name="Straight Arrow Connector 47">
+            <a:extLst>
+              <a:ext uri="{FF2B5EF4-FFF2-40B4-BE49-F238E27FC236}">
+                <a16:creationId xmlns:a16="http://schemas.microsoft.com/office/drawing/2014/main" id="{86D1C336-1540-4A53-8E05-D6479F417DF0}"/>
+              </a:ext>
+            </a:extLst>
+          </p:cNvPr>
+          <p:cNvCxnSpPr>
+            <a:cxnSpLocks/>
+          </p:cNvCxnSpPr>
+          <p:nvPr/>
+        </p:nvCxnSpPr>
+        <p:spPr>
+          <a:xfrm>
+            <a:off x="4161479" y="4024646"/>
+            <a:ext cx="202633" cy="0"/>
+          </a:xfrm>
+          <a:prstGeom prst="straightConnector1">
+            <a:avLst/>
+          </a:prstGeom>
+          <a:ln w="19050">
+            <a:solidFill>
+              <a:schemeClr val="accent6"/>
+            </a:solidFill>
+            <a:tailEnd type="triangle"/>
+          </a:ln>
+        </p:spPr>
+        <p:style>
+          <a:lnRef idx="1">
+            <a:schemeClr val="accent1"/>
+          </a:lnRef>
+          <a:fillRef idx="0">
+            <a:schemeClr val="accent1"/>
+          </a:fillRef>
+          <a:effectRef idx="0">
+            <a:schemeClr val="accent1"/>
+          </a:effectRef>
+          <a:fontRef idx="minor">
+            <a:schemeClr val="tx1"/>
+          </a:fontRef>
+        </p:style>
+      </p:cxnSp>
+      <p:sp>
+        <p:nvSpPr>
+          <p:cNvPr id="49" name="Rectangle: Rounded Corners 48">
+            <a:extLst>
+              <a:ext uri="{FF2B5EF4-FFF2-40B4-BE49-F238E27FC236}">
+                <a16:creationId xmlns:a16="http://schemas.microsoft.com/office/drawing/2014/main" id="{327E9E3F-EB08-4CC6-8C66-7D333E54D0C2}"/>
+              </a:ext>
+            </a:extLst>
+          </p:cNvPr>
+          <p:cNvSpPr/>
+          <p:nvPr/>
+        </p:nvSpPr>
+        <p:spPr>
+          <a:xfrm>
+            <a:off x="2985331" y="4466630"/>
+            <a:ext cx="1167812" cy="648098"/>
+          </a:xfrm>
+          <a:prstGeom prst="roundRect">
+            <a:avLst/>
+          </a:prstGeom>
+          <a:solidFill>
+            <a:schemeClr val="accent6"/>
+          </a:solidFill>
+          <a:effectLst>
+            <a:outerShdw blurRad="50800" dist="38100" dir="2700000" algn="tl" rotWithShape="0">
+              <a:prstClr val="black">
+                <a:alpha val="40000"/>
+              </a:prstClr>
+            </a:outerShdw>
+          </a:effectLst>
+        </p:spPr>
+        <p:style>
+          <a:lnRef idx="2">
+            <a:schemeClr val="accent1">
+              <a:shade val="50000"/>
+            </a:schemeClr>
+          </a:lnRef>
+          <a:fillRef idx="1">
+            <a:schemeClr val="accent1"/>
+          </a:fillRef>
+          <a:effectRef idx="0">
+            <a:schemeClr val="accent1"/>
+          </a:effectRef>
+          <a:fontRef idx="minor">
+            <a:schemeClr val="lt1"/>
+          </a:fontRef>
+        </p:style>
+        <p:txBody>
+          <a:bodyPr rtlCol="0" anchor="ctr"/>
+          <a:lstStyle/>
+          <a:p>
+            <a:pPr algn="ctr"/>
+            <a:r>
+              <a:rPr lang="en-US" sz="1400" dirty="0"/>
+              <a:t>connection_to_grid_c4</a:t>
+            </a:r>
+            <a:endParaRPr lang="en-GB" sz="1400" dirty="0"/>
+          </a:p>
+        </p:txBody>
+      </p:sp>
+      <p:cxnSp>
+        <p:nvCxnSpPr>
+          <p:cNvPr id="50" name="Straight Arrow Connector 49">
+            <a:extLst>
+              <a:ext uri="{FF2B5EF4-FFF2-40B4-BE49-F238E27FC236}">
+                <a16:creationId xmlns:a16="http://schemas.microsoft.com/office/drawing/2014/main" id="{25DC8605-CBB3-4E27-8E13-B96DEC655F73}"/>
+              </a:ext>
+            </a:extLst>
+          </p:cNvPr>
+          <p:cNvCxnSpPr>
+            <a:cxnSpLocks/>
+          </p:cNvCxnSpPr>
+          <p:nvPr/>
+        </p:nvCxnSpPr>
+        <p:spPr>
+          <a:xfrm>
+            <a:off x="4160018" y="4788740"/>
+            <a:ext cx="202633" cy="0"/>
+          </a:xfrm>
+          <a:prstGeom prst="straightConnector1">
+            <a:avLst/>
+          </a:prstGeom>
+          <a:ln w="19050">
+            <a:solidFill>
+              <a:schemeClr val="accent6"/>
+            </a:solidFill>
+            <a:tailEnd type="triangle"/>
+          </a:ln>
+        </p:spPr>
+        <p:style>
+          <a:lnRef idx="1">
+            <a:schemeClr val="accent1"/>
+          </a:lnRef>
+          <a:fillRef idx="0">
+            <a:schemeClr val="accent1"/>
+          </a:fillRef>
+          <a:effectRef idx="0">
+            <a:schemeClr val="accent1"/>
+          </a:effectRef>
+          <a:fontRef idx="minor">
+            <a:schemeClr val="tx1"/>
+          </a:fontRef>
+        </p:style>
+      </p:cxnSp>
+      <p:cxnSp>
+        <p:nvCxnSpPr>
+          <p:cNvPr id="51" name="Straight Connector 50">
+            <a:extLst>
+              <a:ext uri="{FF2B5EF4-FFF2-40B4-BE49-F238E27FC236}">
+                <a16:creationId xmlns:a16="http://schemas.microsoft.com/office/drawing/2014/main" id="{957F6B35-8AF2-49C9-B1C5-2E82C8EA86BC}"/>
+              </a:ext>
+            </a:extLst>
+          </p:cNvPr>
+          <p:cNvCxnSpPr>
+            <a:cxnSpLocks/>
+          </p:cNvCxnSpPr>
+          <p:nvPr/>
+        </p:nvCxnSpPr>
+        <p:spPr>
+          <a:xfrm>
+            <a:off x="2774470" y="1423478"/>
+            <a:ext cx="0" cy="4848446"/>
+          </a:xfrm>
+          <a:prstGeom prst="line">
+            <a:avLst/>
+          </a:prstGeom>
+          <a:ln w="19050">
+            <a:solidFill>
+              <a:schemeClr val="accent6"/>
+            </a:solidFill>
+          </a:ln>
+        </p:spPr>
+        <p:style>
+          <a:lnRef idx="1">
+            <a:schemeClr val="accent1"/>
+          </a:lnRef>
+          <a:fillRef idx="0">
+            <a:schemeClr val="accent1"/>
+          </a:fillRef>
+          <a:effectRef idx="0">
+            <a:schemeClr val="accent1"/>
+          </a:effectRef>
+          <a:fontRef idx="minor">
+            <a:schemeClr val="tx1"/>
+          </a:fontRef>
+        </p:style>
+      </p:cxnSp>
+      <p:sp>
+        <p:nvSpPr>
+          <p:cNvPr id="52" name="TextBox 51">
+            <a:extLst>
+              <a:ext uri="{FF2B5EF4-FFF2-40B4-BE49-F238E27FC236}">
+                <a16:creationId xmlns:a16="http://schemas.microsoft.com/office/drawing/2014/main" id="{9AE3279D-B9FB-4BD5-AABF-6EB2E31D5D84}"/>
+              </a:ext>
+            </a:extLst>
+          </p:cNvPr>
+          <p:cNvSpPr txBox="1"/>
+          <p:nvPr/>
+        </p:nvSpPr>
+        <p:spPr>
+          <a:xfrm rot="16200000">
+            <a:off x="1723068" y="5139232"/>
+            <a:ext cx="1901686" cy="338554"/>
+          </a:xfrm>
+          <a:prstGeom prst="rect">
+            <a:avLst/>
+          </a:prstGeom>
+          <a:noFill/>
+          <a:ln>
+            <a:noFill/>
+          </a:ln>
+        </p:spPr>
+        <p:txBody>
+          <a:bodyPr wrap="square" rtlCol="0">
+            <a:spAutoFit/>
+          </a:bodyPr>
+          <a:lstStyle/>
+          <a:p>
+            <a:r>
+              <a:rPr lang="en-US" sz="1600" i="1" dirty="0"/>
+              <a:t>Wind potential “c4”</a:t>
+            </a:r>
+            <a:endParaRPr lang="en-GB" sz="1600" i="1" dirty="0"/>
+          </a:p>
+        </p:txBody>
+      </p:sp>
+      <p:cxnSp>
+        <p:nvCxnSpPr>
+          <p:cNvPr id="53" name="Straight Connector 52">
+            <a:extLst>
+              <a:ext uri="{FF2B5EF4-FFF2-40B4-BE49-F238E27FC236}">
+                <a16:creationId xmlns:a16="http://schemas.microsoft.com/office/drawing/2014/main" id="{24ABECAE-7837-452D-9D5A-28AED43E177D}"/>
+              </a:ext>
+            </a:extLst>
+          </p:cNvPr>
+          <p:cNvCxnSpPr>
+            <a:cxnSpLocks/>
+          </p:cNvCxnSpPr>
+          <p:nvPr/>
+        </p:nvCxnSpPr>
+        <p:spPr>
+          <a:xfrm>
+            <a:off x="2313211" y="1424763"/>
+            <a:ext cx="0" cy="4848446"/>
+          </a:xfrm>
+          <a:prstGeom prst="line">
+            <a:avLst/>
+          </a:prstGeom>
+          <a:ln w="19050">
+            <a:solidFill>
+              <a:schemeClr val="accent6"/>
+            </a:solidFill>
+          </a:ln>
+        </p:spPr>
+        <p:style>
+          <a:lnRef idx="1">
+            <a:schemeClr val="accent1"/>
+          </a:lnRef>
+          <a:fillRef idx="0">
+            <a:schemeClr val="accent1"/>
+          </a:fillRef>
+          <a:effectRef idx="0">
+            <a:schemeClr val="accent1"/>
+          </a:effectRef>
+          <a:fontRef idx="minor">
+            <a:schemeClr val="tx1"/>
+          </a:fontRef>
+        </p:style>
+      </p:cxnSp>
+      <p:sp>
+        <p:nvSpPr>
+          <p:cNvPr id="54" name="TextBox 53">
+            <a:extLst>
+              <a:ext uri="{FF2B5EF4-FFF2-40B4-BE49-F238E27FC236}">
+                <a16:creationId xmlns:a16="http://schemas.microsoft.com/office/drawing/2014/main" id="{CEA41436-611C-40DC-9393-FCF47E40E28D}"/>
+              </a:ext>
+            </a:extLst>
+          </p:cNvPr>
+          <p:cNvSpPr txBox="1"/>
+          <p:nvPr/>
+        </p:nvSpPr>
+        <p:spPr>
+          <a:xfrm rot="16200000">
+            <a:off x="1261809" y="5140517"/>
+            <a:ext cx="1901686" cy="338554"/>
+          </a:xfrm>
+          <a:prstGeom prst="rect">
+            <a:avLst/>
+          </a:prstGeom>
+          <a:noFill/>
+          <a:ln>
+            <a:noFill/>
+          </a:ln>
+        </p:spPr>
+        <p:txBody>
+          <a:bodyPr wrap="square" rtlCol="0">
+            <a:spAutoFit/>
+          </a:bodyPr>
+          <a:lstStyle/>
+          <a:p>
+            <a:r>
+              <a:rPr lang="en-US" sz="1600" i="1" dirty="0"/>
+              <a:t>Wind potential “c2”</a:t>
+            </a:r>
+            <a:endParaRPr lang="en-GB" sz="1600" i="1" dirty="0"/>
+          </a:p>
+        </p:txBody>
+      </p:sp>
+      <p:cxnSp>
+        <p:nvCxnSpPr>
+          <p:cNvPr id="55" name="Straight Connector 54">
+            <a:extLst>
+              <a:ext uri="{FF2B5EF4-FFF2-40B4-BE49-F238E27FC236}">
+                <a16:creationId xmlns:a16="http://schemas.microsoft.com/office/drawing/2014/main" id="{CE86C38C-BE81-40E5-B842-F4F4099FB4F6}"/>
+              </a:ext>
+            </a:extLst>
+          </p:cNvPr>
+          <p:cNvCxnSpPr>
+            <a:cxnSpLocks/>
+          </p:cNvCxnSpPr>
+          <p:nvPr/>
+        </p:nvCxnSpPr>
+        <p:spPr>
+          <a:xfrm>
+            <a:off x="2090813" y="1424763"/>
+            <a:ext cx="0" cy="4848446"/>
+          </a:xfrm>
+          <a:prstGeom prst="line">
+            <a:avLst/>
+          </a:prstGeom>
+          <a:ln w="19050">
+            <a:solidFill>
+              <a:schemeClr val="accent6"/>
+            </a:solidFill>
+          </a:ln>
+        </p:spPr>
+        <p:style>
+          <a:lnRef idx="1">
+            <a:schemeClr val="accent1"/>
+          </a:lnRef>
+          <a:fillRef idx="0">
+            <a:schemeClr val="accent1"/>
+          </a:fillRef>
+          <a:effectRef idx="0">
+            <a:schemeClr val="accent1"/>
+          </a:effectRef>
+          <a:fontRef idx="minor">
+            <a:schemeClr val="tx1"/>
+          </a:fontRef>
+        </p:style>
+      </p:cxnSp>
+      <p:sp>
+        <p:nvSpPr>
+          <p:cNvPr id="56" name="TextBox 55">
+            <a:extLst>
+              <a:ext uri="{FF2B5EF4-FFF2-40B4-BE49-F238E27FC236}">
+                <a16:creationId xmlns:a16="http://schemas.microsoft.com/office/drawing/2014/main" id="{C6DF8817-C911-446E-91EF-355E075DF93E}"/>
+              </a:ext>
+            </a:extLst>
+          </p:cNvPr>
+          <p:cNvSpPr txBox="1"/>
+          <p:nvPr/>
+        </p:nvSpPr>
+        <p:spPr>
+          <a:xfrm rot="16200000">
+            <a:off x="1035253" y="5136358"/>
+            <a:ext cx="1910004" cy="338554"/>
+          </a:xfrm>
+          <a:prstGeom prst="rect">
+            <a:avLst/>
+          </a:prstGeom>
+          <a:noFill/>
+          <a:ln>
+            <a:noFill/>
+          </a:ln>
+        </p:spPr>
+        <p:txBody>
+          <a:bodyPr wrap="square" rtlCol="0">
+            <a:spAutoFit/>
+          </a:bodyPr>
+          <a:lstStyle/>
+          <a:p>
+            <a:r>
+              <a:rPr lang="en-US" sz="1600" i="1" dirty="0"/>
+              <a:t>Wind potential “c1”</a:t>
+            </a:r>
+            <a:endParaRPr lang="en-GB" sz="1600" i="1" dirty="0"/>
+          </a:p>
+        </p:txBody>
+      </p:sp>
+      <p:cxnSp>
+        <p:nvCxnSpPr>
+          <p:cNvPr id="41" name="Straight Arrow Connector 40">
+            <a:extLst>
+              <a:ext uri="{FF2B5EF4-FFF2-40B4-BE49-F238E27FC236}">
+                <a16:creationId xmlns:a16="http://schemas.microsoft.com/office/drawing/2014/main" id="{D97AC178-986D-4DE1-B8AF-0D6E8792FEDD}"/>
+              </a:ext>
+            </a:extLst>
+          </p:cNvPr>
+          <p:cNvCxnSpPr>
+            <a:cxnSpLocks/>
+            <a:endCxn id="32" idx="1"/>
+          </p:cNvCxnSpPr>
+          <p:nvPr/>
+        </p:nvCxnSpPr>
+        <p:spPr>
+          <a:xfrm>
+            <a:off x="2090801" y="2502273"/>
+            <a:ext cx="894530" cy="0"/>
+          </a:xfrm>
+          <a:prstGeom prst="straightConnector1">
+            <a:avLst/>
+          </a:prstGeom>
+          <a:ln w="19050">
+            <a:solidFill>
+              <a:schemeClr val="accent6"/>
+            </a:solidFill>
+            <a:tailEnd type="triangle"/>
+          </a:ln>
+        </p:spPr>
+        <p:style>
+          <a:lnRef idx="1">
+            <a:schemeClr val="accent1"/>
+          </a:lnRef>
+          <a:fillRef idx="0">
+            <a:schemeClr val="accent1"/>
+          </a:fillRef>
+          <a:effectRef idx="0">
+            <a:schemeClr val="accent1"/>
+          </a:effectRef>
+          <a:fontRef idx="minor">
+            <a:schemeClr val="tx1"/>
+          </a:fontRef>
+        </p:style>
+      </p:cxnSp>
+      <p:cxnSp>
+        <p:nvCxnSpPr>
+          <p:cNvPr id="57" name="Straight Arrow Connector 56">
+            <a:extLst>
+              <a:ext uri="{FF2B5EF4-FFF2-40B4-BE49-F238E27FC236}">
+                <a16:creationId xmlns:a16="http://schemas.microsoft.com/office/drawing/2014/main" id="{89235731-A7A5-4B7D-BDD9-0E20DF42A8EE}"/>
+              </a:ext>
+            </a:extLst>
+          </p:cNvPr>
+          <p:cNvCxnSpPr>
+            <a:cxnSpLocks/>
+          </p:cNvCxnSpPr>
+          <p:nvPr/>
+        </p:nvCxnSpPr>
+        <p:spPr>
+          <a:xfrm>
+            <a:off x="2313211" y="3244301"/>
+            <a:ext cx="677894" cy="0"/>
+          </a:xfrm>
+          <a:prstGeom prst="straightConnector1">
+            <a:avLst/>
+          </a:prstGeom>
+          <a:ln w="19050">
+            <a:solidFill>
+              <a:schemeClr val="accent6"/>
+            </a:solidFill>
+            <a:tailEnd type="triangle"/>
+          </a:ln>
+        </p:spPr>
+        <p:style>
+          <a:lnRef idx="1">
+            <a:schemeClr val="accent1"/>
+          </a:lnRef>
+          <a:fillRef idx="0">
+            <a:schemeClr val="accent1"/>
+          </a:fillRef>
+          <a:effectRef idx="0">
+            <a:schemeClr val="accent1"/>
+          </a:effectRef>
+          <a:fontRef idx="minor">
+            <a:schemeClr val="tx1"/>
+          </a:fontRef>
+        </p:style>
+      </p:cxnSp>
+      <p:cxnSp>
+        <p:nvCxnSpPr>
+          <p:cNvPr id="58" name="Straight Arrow Connector 57">
+            <a:extLst>
+              <a:ext uri="{FF2B5EF4-FFF2-40B4-BE49-F238E27FC236}">
+                <a16:creationId xmlns:a16="http://schemas.microsoft.com/office/drawing/2014/main" id="{DE005AB9-32B9-4261-A3EF-D2A36D83199B}"/>
+              </a:ext>
+            </a:extLst>
+          </p:cNvPr>
+          <p:cNvCxnSpPr>
+            <a:cxnSpLocks/>
+          </p:cNvCxnSpPr>
+          <p:nvPr/>
+        </p:nvCxnSpPr>
+        <p:spPr>
+          <a:xfrm>
+            <a:off x="2543840" y="4014956"/>
+            <a:ext cx="437217" cy="0"/>
+          </a:xfrm>
+          <a:prstGeom prst="straightConnector1">
+            <a:avLst/>
+          </a:prstGeom>
+          <a:ln w="19050">
+            <a:solidFill>
+              <a:schemeClr val="accent6"/>
+            </a:solidFill>
+            <a:tailEnd type="triangle"/>
+          </a:ln>
+        </p:spPr>
+        <p:style>
+          <a:lnRef idx="1">
+            <a:schemeClr val="accent1"/>
+          </a:lnRef>
+          <a:fillRef idx="0">
+            <a:schemeClr val="accent1"/>
+          </a:fillRef>
+          <a:effectRef idx="0">
+            <a:schemeClr val="accent1"/>
+          </a:effectRef>
+          <a:fontRef idx="minor">
+            <a:schemeClr val="tx1"/>
+          </a:fontRef>
+        </p:style>
+      </p:cxnSp>
+      <p:cxnSp>
+        <p:nvCxnSpPr>
+          <p:cNvPr id="59" name="Straight Arrow Connector 58">
+            <a:extLst>
+              <a:ext uri="{FF2B5EF4-FFF2-40B4-BE49-F238E27FC236}">
+                <a16:creationId xmlns:a16="http://schemas.microsoft.com/office/drawing/2014/main" id="{B0A344E9-0346-4F2D-A22D-07E2631BFE0A}"/>
+              </a:ext>
+            </a:extLst>
+          </p:cNvPr>
+          <p:cNvCxnSpPr>
+            <a:cxnSpLocks/>
+          </p:cNvCxnSpPr>
+          <p:nvPr/>
+        </p:nvCxnSpPr>
+        <p:spPr>
+          <a:xfrm>
+            <a:off x="2774470" y="4803790"/>
+            <a:ext cx="218608" cy="0"/>
+          </a:xfrm>
+          <a:prstGeom prst="straightConnector1">
+            <a:avLst/>
+          </a:prstGeom>
+          <a:ln w="19050">
+            <a:solidFill>
+              <a:schemeClr val="accent6"/>
+            </a:solidFill>
+            <a:tailEnd type="triangle"/>
+          </a:ln>
+        </p:spPr>
+        <p:style>
+          <a:lnRef idx="1">
+            <a:schemeClr val="accent1"/>
+          </a:lnRef>
+          <a:fillRef idx="0">
+            <a:schemeClr val="accent1"/>
+          </a:fillRef>
+          <a:effectRef idx="0">
+            <a:schemeClr val="accent1"/>
+          </a:effectRef>
+          <a:fontRef idx="minor">
+            <a:schemeClr val="tx1"/>
+          </a:fontRef>
+        </p:style>
+      </p:cxnSp>
+    </p:spTree>
+    <p:extLst>
+      <p:ext uri="{BB962C8B-B14F-4D97-AF65-F5344CB8AC3E}">
+        <p14:creationId xmlns:p14="http://schemas.microsoft.com/office/powerpoint/2010/main" val="4099012541"/>
+      </p:ext>
+    </p:extLst>
+  </p:cSld>
+  <p:clrMapOvr>
+    <a:masterClrMapping/>
+  </p:clrMapOvr>
+</p:sld>
+</file>
+
+<file path=ppt/slides/slide7.xml><?xml version="1.0" encoding="utf-8"?>
 <p:sld xmlns:a="http://schemas.openxmlformats.org/drawingml/2006/main" xmlns:r="http://schemas.openxmlformats.org/officeDocument/2006/relationships" xmlns:p="http://schemas.openxmlformats.org/presentationml/2006/main">
   <p:cSld>
     <p:spTree>

</xml_diff>

<commit_message>
Tutorial explaining historical parameters (#478)
* Add tutorial for historical parameters
* Update README
* Update release notes
</commit_message>
<xml_diff>
--- a/tutorial/westeros/_static/westeros_res.pptx
+++ b/tutorial/westeros/_static/westeros_res.pptx
@@ -5,7 +5,7 @@
     <p:sldMasterId id="2147483648" r:id="rId1"/>
   </p:sldMasterIdLst>
   <p:notesMasterIdLst>
-    <p:notesMasterId r:id="rId9"/>
+    <p:notesMasterId r:id="rId10"/>
   </p:notesMasterIdLst>
   <p:sldIdLst>
     <p:sldId id="259" r:id="rId2"/>
@@ -15,6 +15,7 @@
     <p:sldId id="263" r:id="rId6"/>
     <p:sldId id="265" r:id="rId7"/>
     <p:sldId id="264" r:id="rId8"/>
+    <p:sldId id="266" r:id="rId9"/>
   </p:sldIdLst>
   <p:sldSz cx="12192000" cy="6858000"/>
   <p:notesSz cx="6858000" cy="9144000"/>
@@ -203,7 +204,7 @@
           <a:p>
             <a:fld id="{2DF20614-5643-4B1F-B495-FEBC66B49245}" type="datetimeFigureOut">
               <a:rPr lang="en-GB" smtClean="0"/>
-              <a:t>25/05/2021</a:t>
+              <a:t>31/05/2021</a:t>
             </a:fld>
             <a:endParaRPr lang="en-GB"/>
           </a:p>
@@ -1251,6 +1252,102 @@
 </p:notes>
 </file>
 
+<file path=ppt/notesSlides/notesSlide8.xml><?xml version="1.0" encoding="utf-8"?>
+<p:notes xmlns:a="http://schemas.openxmlformats.org/drawingml/2006/main" xmlns:r="http://schemas.openxmlformats.org/officeDocument/2006/relationships" xmlns:p="http://schemas.openxmlformats.org/presentationml/2006/main">
+  <p:cSld>
+    <p:spTree>
+      <p:nvGrpSpPr>
+        <p:cNvPr id="1" name=""/>
+        <p:cNvGrpSpPr/>
+        <p:nvPr/>
+      </p:nvGrpSpPr>
+      <p:grpSpPr>
+        <a:xfrm>
+          <a:off x="0" y="0"/>
+          <a:ext cx="0" cy="0"/>
+          <a:chOff x="0" y="0"/>
+          <a:chExt cx="0" cy="0"/>
+        </a:xfrm>
+      </p:grpSpPr>
+      <p:sp>
+        <p:nvSpPr>
+          <p:cNvPr id="2" name="Slide Image Placeholder 1"/>
+          <p:cNvSpPr>
+            <a:spLocks noGrp="1" noRot="1" noChangeAspect="1"/>
+          </p:cNvSpPr>
+          <p:nvPr>
+            <p:ph type="sldImg"/>
+          </p:nvPr>
+        </p:nvSpPr>
+        <p:spPr/>
+      </p:sp>
+      <p:sp>
+        <p:nvSpPr>
+          <p:cNvPr id="3" name="Notes Placeholder 2"/>
+          <p:cNvSpPr>
+            <a:spLocks noGrp="1"/>
+          </p:cNvSpPr>
+          <p:nvPr>
+            <p:ph type="body" idx="1"/>
+          </p:nvPr>
+        </p:nvSpPr>
+        <p:spPr/>
+        <p:txBody>
+          <a:bodyPr/>
+          <a:lstStyle/>
+          <a:p>
+            <a:r>
+              <a:rPr lang="en-US" dirty="0"/>
+              <a:t>Tutorial: </a:t>
+            </a:r>
+            <a:r>
+              <a:rPr lang="en-US" dirty="0" err="1"/>
+              <a:t>westeros_historical_new_capacity.ipynb</a:t>
+            </a:r>
+            <a:r>
+              <a:rPr lang="en-US" dirty="0"/>
+              <a:t> (historical_new_capacity_res.png)</a:t>
+            </a:r>
+            <a:endParaRPr lang="en-GB" dirty="0"/>
+          </a:p>
+        </p:txBody>
+      </p:sp>
+      <p:sp>
+        <p:nvSpPr>
+          <p:cNvPr id="4" name="Slide Number Placeholder 3"/>
+          <p:cNvSpPr>
+            <a:spLocks noGrp="1"/>
+          </p:cNvSpPr>
+          <p:nvPr>
+            <p:ph type="sldNum" sz="quarter" idx="5"/>
+          </p:nvPr>
+        </p:nvSpPr>
+        <p:spPr/>
+        <p:txBody>
+          <a:bodyPr/>
+          <a:lstStyle/>
+          <a:p>
+            <a:fld id="{F13B7C99-D787-4AFE-BD1E-3415CA097FC0}" type="slidenum">
+              <a:rPr lang="en-GB" smtClean="0"/>
+              <a:t>8</a:t>
+            </a:fld>
+            <a:endParaRPr lang="en-GB"/>
+          </a:p>
+        </p:txBody>
+      </p:sp>
+    </p:spTree>
+    <p:extLst>
+      <p:ext uri="{BB962C8B-B14F-4D97-AF65-F5344CB8AC3E}">
+        <p14:creationId xmlns:p14="http://schemas.microsoft.com/office/powerpoint/2010/main" val="1119358379"/>
+      </p:ext>
+    </p:extLst>
+  </p:cSld>
+  <p:clrMapOvr>
+    <a:masterClrMapping/>
+  </p:clrMapOvr>
+</p:notes>
+</file>
+
 <file path=ppt/slideLayouts/slideLayout1.xml><?xml version="1.0" encoding="utf-8"?>
 <p:sldLayout xmlns:a="http://schemas.openxmlformats.org/drawingml/2006/main" xmlns:r="http://schemas.openxmlformats.org/officeDocument/2006/relationships" xmlns:p="http://schemas.openxmlformats.org/presentationml/2006/main" type="title" preserve="1">
   <p:cSld name="Title Slide">
@@ -1400,7 +1497,7 @@
           <a:p>
             <a:fld id="{EE05C8E7-49BF-4F60-9111-00AC92B15D4A}" type="datetimeFigureOut">
               <a:rPr lang="en-GB" smtClean="0"/>
-              <a:t>25/05/2021</a:t>
+              <a:t>31/05/2021</a:t>
             </a:fld>
             <a:endParaRPr lang="en-GB"/>
           </a:p>
@@ -1600,7 +1697,7 @@
           <a:p>
             <a:fld id="{EE05C8E7-49BF-4F60-9111-00AC92B15D4A}" type="datetimeFigureOut">
               <a:rPr lang="en-GB" smtClean="0"/>
-              <a:t>25/05/2021</a:t>
+              <a:t>31/05/2021</a:t>
             </a:fld>
             <a:endParaRPr lang="en-GB"/>
           </a:p>
@@ -1810,7 +1907,7 @@
           <a:p>
             <a:fld id="{EE05C8E7-49BF-4F60-9111-00AC92B15D4A}" type="datetimeFigureOut">
               <a:rPr lang="en-GB" smtClean="0"/>
-              <a:t>25/05/2021</a:t>
+              <a:t>31/05/2021</a:t>
             </a:fld>
             <a:endParaRPr lang="en-GB"/>
           </a:p>
@@ -2010,7 +2107,7 @@
           <a:p>
             <a:fld id="{EE05C8E7-49BF-4F60-9111-00AC92B15D4A}" type="datetimeFigureOut">
               <a:rPr lang="en-GB" smtClean="0"/>
-              <a:t>25/05/2021</a:t>
+              <a:t>31/05/2021</a:t>
             </a:fld>
             <a:endParaRPr lang="en-GB"/>
           </a:p>
@@ -2286,7 +2383,7 @@
           <a:p>
             <a:fld id="{EE05C8E7-49BF-4F60-9111-00AC92B15D4A}" type="datetimeFigureOut">
               <a:rPr lang="en-GB" smtClean="0"/>
-              <a:t>25/05/2021</a:t>
+              <a:t>31/05/2021</a:t>
             </a:fld>
             <a:endParaRPr lang="en-GB"/>
           </a:p>
@@ -2554,7 +2651,7 @@
           <a:p>
             <a:fld id="{EE05C8E7-49BF-4F60-9111-00AC92B15D4A}" type="datetimeFigureOut">
               <a:rPr lang="en-GB" smtClean="0"/>
-              <a:t>25/05/2021</a:t>
+              <a:t>31/05/2021</a:t>
             </a:fld>
             <a:endParaRPr lang="en-GB"/>
           </a:p>
@@ -2969,7 +3066,7 @@
           <a:p>
             <a:fld id="{EE05C8E7-49BF-4F60-9111-00AC92B15D4A}" type="datetimeFigureOut">
               <a:rPr lang="en-GB" smtClean="0"/>
-              <a:t>25/05/2021</a:t>
+              <a:t>31/05/2021</a:t>
             </a:fld>
             <a:endParaRPr lang="en-GB"/>
           </a:p>
@@ -3111,7 +3208,7 @@
           <a:p>
             <a:fld id="{EE05C8E7-49BF-4F60-9111-00AC92B15D4A}" type="datetimeFigureOut">
               <a:rPr lang="en-GB" smtClean="0"/>
-              <a:t>25/05/2021</a:t>
+              <a:t>31/05/2021</a:t>
             </a:fld>
             <a:endParaRPr lang="en-GB"/>
           </a:p>
@@ -3224,7 +3321,7 @@
           <a:p>
             <a:fld id="{EE05C8E7-49BF-4F60-9111-00AC92B15D4A}" type="datetimeFigureOut">
               <a:rPr lang="en-GB" smtClean="0"/>
-              <a:t>25/05/2021</a:t>
+              <a:t>31/05/2021</a:t>
             </a:fld>
             <a:endParaRPr lang="en-GB"/>
           </a:p>
@@ -3537,7 +3634,7 @@
           <a:p>
             <a:fld id="{EE05C8E7-49BF-4F60-9111-00AC92B15D4A}" type="datetimeFigureOut">
               <a:rPr lang="en-GB" smtClean="0"/>
-              <a:t>25/05/2021</a:t>
+              <a:t>31/05/2021</a:t>
             </a:fld>
             <a:endParaRPr lang="en-GB"/>
           </a:p>
@@ -3826,7 +3923,7 @@
           <a:p>
             <a:fld id="{EE05C8E7-49BF-4F60-9111-00AC92B15D4A}" type="datetimeFigureOut">
               <a:rPr lang="en-GB" smtClean="0"/>
-              <a:t>25/05/2021</a:t>
+              <a:t>31/05/2021</a:t>
             </a:fld>
             <a:endParaRPr lang="en-GB"/>
           </a:p>
@@ -4069,7 +4166,7 @@
           <a:p>
             <a:fld id="{EE05C8E7-49BF-4F60-9111-00AC92B15D4A}" type="datetimeFigureOut">
               <a:rPr lang="en-GB" smtClean="0"/>
-              <a:t>25/05/2021</a:t>
+              <a:t>31/05/2021</a:t>
             </a:fld>
             <a:endParaRPr lang="en-GB"/>
           </a:p>
@@ -14899,6 +14996,1044 @@
     <p:extLst>
       <p:ext uri="{BB962C8B-B14F-4D97-AF65-F5344CB8AC3E}">
         <p14:creationId xmlns:p14="http://schemas.microsoft.com/office/powerpoint/2010/main" val="3369051767"/>
+      </p:ext>
+    </p:extLst>
+  </p:cSld>
+  <p:clrMapOvr>
+    <a:masterClrMapping/>
+  </p:clrMapOvr>
+</p:sld>
+</file>
+
+<file path=ppt/slides/slide8.xml><?xml version="1.0" encoding="utf-8"?>
+<p:sld xmlns:a="http://schemas.openxmlformats.org/drawingml/2006/main" xmlns:r="http://schemas.openxmlformats.org/officeDocument/2006/relationships" xmlns:p="http://schemas.openxmlformats.org/presentationml/2006/main">
+  <p:cSld>
+    <p:spTree>
+      <p:nvGrpSpPr>
+        <p:cNvPr id="1" name=""/>
+        <p:cNvGrpSpPr/>
+        <p:nvPr/>
+      </p:nvGrpSpPr>
+      <p:grpSpPr>
+        <a:xfrm>
+          <a:off x="0" y="0"/>
+          <a:ext cx="0" cy="0"/>
+          <a:chOff x="0" y="0"/>
+          <a:chExt cx="0" cy="0"/>
+        </a:xfrm>
+      </p:grpSpPr>
+      <p:pic>
+        <p:nvPicPr>
+          <p:cNvPr id="5" name="Picture 4" descr="A picture containing tree&#10;&#10;Description automatically generated">
+            <a:extLst>
+              <a:ext uri="{FF2B5EF4-FFF2-40B4-BE49-F238E27FC236}">
+                <a16:creationId xmlns:a16="http://schemas.microsoft.com/office/drawing/2014/main" id="{FC78D001-BA7B-411C-9683-5CBBAC10B0D4}"/>
+              </a:ext>
+            </a:extLst>
+          </p:cNvPr>
+          <p:cNvPicPr>
+            <a:picLocks noChangeAspect="1"/>
+          </p:cNvPicPr>
+          <p:nvPr/>
+        </p:nvPicPr>
+        <p:blipFill>
+          <a:blip r:embed="rId3">
+            <a:extLst>
+              <a:ext uri="{28A0092B-C50C-407E-A947-70E740481C1C}">
+                <a14:useLocalDpi xmlns:a14="http://schemas.microsoft.com/office/drawing/2010/main" val="0"/>
+              </a:ext>
+            </a:extLst>
+          </a:blip>
+          <a:stretch>
+            <a:fillRect/>
+          </a:stretch>
+        </p:blipFill>
+        <p:spPr>
+          <a:xfrm>
+            <a:off x="80282" y="90975"/>
+            <a:ext cx="1748518" cy="6650067"/>
+          </a:xfrm>
+          <a:prstGeom prst="rect">
+            <a:avLst/>
+          </a:prstGeom>
+        </p:spPr>
+      </p:pic>
+      <p:sp>
+        <p:nvSpPr>
+          <p:cNvPr id="6" name="Rectangle: Rounded Corners 5">
+            <a:extLst>
+              <a:ext uri="{FF2B5EF4-FFF2-40B4-BE49-F238E27FC236}">
+                <a16:creationId xmlns:a16="http://schemas.microsoft.com/office/drawing/2014/main" id="{F8633EE9-FEA9-4222-AAD4-B2C6D4256BEB}"/>
+              </a:ext>
+            </a:extLst>
+          </p:cNvPr>
+          <p:cNvSpPr/>
+          <p:nvPr/>
+        </p:nvSpPr>
+        <p:spPr>
+          <a:xfrm>
+            <a:off x="4859091" y="2158409"/>
+            <a:ext cx="1167812" cy="648098"/>
+          </a:xfrm>
+          <a:prstGeom prst="roundRect">
+            <a:avLst/>
+          </a:prstGeom>
+          <a:effectLst>
+            <a:outerShdw blurRad="50800" dist="38100" dir="2700000" algn="tl" rotWithShape="0">
+              <a:prstClr val="black">
+                <a:alpha val="40000"/>
+              </a:prstClr>
+            </a:outerShdw>
+          </a:effectLst>
+        </p:spPr>
+        <p:style>
+          <a:lnRef idx="2">
+            <a:schemeClr val="accent1">
+              <a:shade val="50000"/>
+            </a:schemeClr>
+          </a:lnRef>
+          <a:fillRef idx="1">
+            <a:schemeClr val="accent1"/>
+          </a:fillRef>
+          <a:effectRef idx="0">
+            <a:schemeClr val="accent1"/>
+          </a:effectRef>
+          <a:fontRef idx="minor">
+            <a:schemeClr val="lt1"/>
+          </a:fontRef>
+        </p:style>
+        <p:txBody>
+          <a:bodyPr rtlCol="0" anchor="ctr"/>
+          <a:lstStyle/>
+          <a:p>
+            <a:pPr algn="ctr"/>
+            <a:r>
+              <a:rPr lang="en-US" sz="1400" dirty="0"/>
+              <a:t>Coal Power plant</a:t>
+            </a:r>
+            <a:endParaRPr lang="en-GB" sz="1400" dirty="0"/>
+          </a:p>
+        </p:txBody>
+      </p:sp>
+      <p:sp>
+        <p:nvSpPr>
+          <p:cNvPr id="8" name="Rectangle: Rounded Corners 7">
+            <a:extLst>
+              <a:ext uri="{FF2B5EF4-FFF2-40B4-BE49-F238E27FC236}">
+                <a16:creationId xmlns:a16="http://schemas.microsoft.com/office/drawing/2014/main" id="{3E2ADBF9-1561-42B4-BA48-67BB8BE3BFDE}"/>
+              </a:ext>
+            </a:extLst>
+          </p:cNvPr>
+          <p:cNvSpPr/>
+          <p:nvPr/>
+        </p:nvSpPr>
+        <p:spPr>
+          <a:xfrm>
+            <a:off x="4859091" y="3452194"/>
+            <a:ext cx="1167812" cy="648098"/>
+          </a:xfrm>
+          <a:prstGeom prst="roundRect">
+            <a:avLst/>
+          </a:prstGeom>
+          <a:effectLst>
+            <a:outerShdw blurRad="50800" dist="38100" dir="2700000" algn="tl" rotWithShape="0">
+              <a:prstClr val="black">
+                <a:alpha val="40000"/>
+              </a:prstClr>
+            </a:outerShdw>
+          </a:effectLst>
+        </p:spPr>
+        <p:style>
+          <a:lnRef idx="2">
+            <a:schemeClr val="accent1">
+              <a:shade val="50000"/>
+            </a:schemeClr>
+          </a:lnRef>
+          <a:fillRef idx="1">
+            <a:schemeClr val="accent1"/>
+          </a:fillRef>
+          <a:effectRef idx="0">
+            <a:schemeClr val="accent1"/>
+          </a:effectRef>
+          <a:fontRef idx="minor">
+            <a:schemeClr val="lt1"/>
+          </a:fontRef>
+        </p:style>
+        <p:txBody>
+          <a:bodyPr rtlCol="0" anchor="ctr"/>
+          <a:lstStyle/>
+          <a:p>
+            <a:pPr algn="ctr"/>
+            <a:r>
+              <a:rPr lang="en-US" sz="1400" dirty="0"/>
+              <a:t>Gas Power plant</a:t>
+            </a:r>
+            <a:endParaRPr lang="en-GB" sz="1400" dirty="0"/>
+          </a:p>
+        </p:txBody>
+      </p:sp>
+      <p:cxnSp>
+        <p:nvCxnSpPr>
+          <p:cNvPr id="10" name="Straight Connector 9">
+            <a:extLst>
+              <a:ext uri="{FF2B5EF4-FFF2-40B4-BE49-F238E27FC236}">
+                <a16:creationId xmlns:a16="http://schemas.microsoft.com/office/drawing/2014/main" id="{2F9E68B1-FD81-4783-9940-8BCB1B952402}"/>
+              </a:ext>
+            </a:extLst>
+          </p:cNvPr>
+          <p:cNvCxnSpPr>
+            <a:cxnSpLocks/>
+          </p:cNvCxnSpPr>
+          <p:nvPr/>
+        </p:nvCxnSpPr>
+        <p:spPr>
+          <a:xfrm>
+            <a:off x="6515992" y="1424763"/>
+            <a:ext cx="0" cy="4848446"/>
+          </a:xfrm>
+          <a:prstGeom prst="line">
+            <a:avLst/>
+          </a:prstGeom>
+          <a:ln w="19050">
+            <a:solidFill>
+              <a:schemeClr val="accent3"/>
+            </a:solidFill>
+          </a:ln>
+        </p:spPr>
+        <p:style>
+          <a:lnRef idx="1">
+            <a:schemeClr val="accent1"/>
+          </a:lnRef>
+          <a:fillRef idx="0">
+            <a:schemeClr val="accent1"/>
+          </a:fillRef>
+          <a:effectRef idx="0">
+            <a:schemeClr val="accent1"/>
+          </a:effectRef>
+          <a:fontRef idx="minor">
+            <a:schemeClr val="tx1"/>
+          </a:fontRef>
+        </p:style>
+      </p:cxnSp>
+      <p:sp>
+        <p:nvSpPr>
+          <p:cNvPr id="12" name="TextBox 11">
+            <a:extLst>
+              <a:ext uri="{FF2B5EF4-FFF2-40B4-BE49-F238E27FC236}">
+                <a16:creationId xmlns:a16="http://schemas.microsoft.com/office/drawing/2014/main" id="{0E8B3392-B5A5-4DB3-9CD1-C4E2643543FC}"/>
+              </a:ext>
+            </a:extLst>
+          </p:cNvPr>
+          <p:cNvSpPr txBox="1"/>
+          <p:nvPr/>
+        </p:nvSpPr>
+        <p:spPr>
+          <a:xfrm rot="16200000">
+            <a:off x="5686656" y="5380918"/>
+            <a:ext cx="1446028" cy="338554"/>
+          </a:xfrm>
+          <a:prstGeom prst="rect">
+            <a:avLst/>
+          </a:prstGeom>
+          <a:noFill/>
+        </p:spPr>
+        <p:txBody>
+          <a:bodyPr wrap="square" rtlCol="0">
+            <a:spAutoFit/>
+          </a:bodyPr>
+          <a:lstStyle/>
+          <a:p>
+            <a:r>
+              <a:rPr lang="en-US" sz="1600" i="1" dirty="0"/>
+              <a:t>electricity</a:t>
+            </a:r>
+            <a:endParaRPr lang="en-GB" sz="1600" i="1" dirty="0"/>
+          </a:p>
+        </p:txBody>
+      </p:sp>
+      <p:cxnSp>
+        <p:nvCxnSpPr>
+          <p:cNvPr id="19" name="Straight Arrow Connector 18">
+            <a:extLst>
+              <a:ext uri="{FF2B5EF4-FFF2-40B4-BE49-F238E27FC236}">
+                <a16:creationId xmlns:a16="http://schemas.microsoft.com/office/drawing/2014/main" id="{6D083F21-1F05-47B4-9EEF-49841860D25B}"/>
+              </a:ext>
+            </a:extLst>
+          </p:cNvPr>
+          <p:cNvCxnSpPr>
+            <a:cxnSpLocks/>
+          </p:cNvCxnSpPr>
+          <p:nvPr/>
+        </p:nvCxnSpPr>
+        <p:spPr>
+          <a:xfrm>
+            <a:off x="6037536" y="2463287"/>
+            <a:ext cx="490860" cy="0"/>
+          </a:xfrm>
+          <a:prstGeom prst="straightConnector1">
+            <a:avLst/>
+          </a:prstGeom>
+          <a:ln w="19050">
+            <a:solidFill>
+              <a:schemeClr val="accent3"/>
+            </a:solidFill>
+            <a:tailEnd type="triangle"/>
+          </a:ln>
+        </p:spPr>
+        <p:style>
+          <a:lnRef idx="1">
+            <a:schemeClr val="accent1"/>
+          </a:lnRef>
+          <a:fillRef idx="0">
+            <a:schemeClr val="accent1"/>
+          </a:fillRef>
+          <a:effectRef idx="0">
+            <a:schemeClr val="accent1"/>
+          </a:effectRef>
+          <a:fontRef idx="minor">
+            <a:schemeClr val="tx1"/>
+          </a:fontRef>
+        </p:style>
+      </p:cxnSp>
+      <p:sp>
+        <p:nvSpPr>
+          <p:cNvPr id="21" name="Rectangle: Rounded Corners 20">
+            <a:extLst>
+              <a:ext uri="{FF2B5EF4-FFF2-40B4-BE49-F238E27FC236}">
+                <a16:creationId xmlns:a16="http://schemas.microsoft.com/office/drawing/2014/main" id="{298E4124-6468-4690-8D4B-2CD3E5229B88}"/>
+              </a:ext>
+            </a:extLst>
+          </p:cNvPr>
+          <p:cNvSpPr/>
+          <p:nvPr/>
+        </p:nvSpPr>
+        <p:spPr>
+          <a:xfrm>
+            <a:off x="7016608" y="2701159"/>
+            <a:ext cx="1167812" cy="648098"/>
+          </a:xfrm>
+          <a:prstGeom prst="roundRect">
+            <a:avLst/>
+          </a:prstGeom>
+          <a:solidFill>
+            <a:schemeClr val="accent3"/>
+          </a:solidFill>
+          <a:effectLst>
+            <a:outerShdw blurRad="50800" dist="38100" dir="2700000" algn="tl" rotWithShape="0">
+              <a:prstClr val="black">
+                <a:alpha val="40000"/>
+              </a:prstClr>
+            </a:outerShdw>
+          </a:effectLst>
+        </p:spPr>
+        <p:style>
+          <a:lnRef idx="2">
+            <a:schemeClr val="accent1">
+              <a:shade val="50000"/>
+            </a:schemeClr>
+          </a:lnRef>
+          <a:fillRef idx="1">
+            <a:schemeClr val="accent1"/>
+          </a:fillRef>
+          <a:effectRef idx="0">
+            <a:schemeClr val="accent1"/>
+          </a:effectRef>
+          <a:fontRef idx="minor">
+            <a:schemeClr val="lt1"/>
+          </a:fontRef>
+        </p:style>
+        <p:txBody>
+          <a:bodyPr rtlCol="0" anchor="ctr"/>
+          <a:lstStyle/>
+          <a:p>
+            <a:pPr algn="ctr"/>
+            <a:r>
+              <a:rPr lang="en-US" sz="1400" dirty="0"/>
+              <a:t>Electricity grid</a:t>
+            </a:r>
+            <a:endParaRPr lang="en-GB" sz="1400" dirty="0"/>
+          </a:p>
+        </p:txBody>
+      </p:sp>
+      <p:cxnSp>
+        <p:nvCxnSpPr>
+          <p:cNvPr id="24" name="Straight Connector 23">
+            <a:extLst>
+              <a:ext uri="{FF2B5EF4-FFF2-40B4-BE49-F238E27FC236}">
+                <a16:creationId xmlns:a16="http://schemas.microsoft.com/office/drawing/2014/main" id="{ADBFB2B2-0588-403F-8ABA-38D32C2C704E}"/>
+              </a:ext>
+            </a:extLst>
+          </p:cNvPr>
+          <p:cNvCxnSpPr>
+            <a:cxnSpLocks/>
+          </p:cNvCxnSpPr>
+          <p:nvPr/>
+        </p:nvCxnSpPr>
+        <p:spPr>
+          <a:xfrm>
+            <a:off x="8662890" y="1414130"/>
+            <a:ext cx="0" cy="4848446"/>
+          </a:xfrm>
+          <a:prstGeom prst="line">
+            <a:avLst/>
+          </a:prstGeom>
+          <a:ln w="19050">
+            <a:solidFill>
+              <a:schemeClr val="accent3"/>
+            </a:solidFill>
+          </a:ln>
+        </p:spPr>
+        <p:style>
+          <a:lnRef idx="1">
+            <a:schemeClr val="accent1"/>
+          </a:lnRef>
+          <a:fillRef idx="0">
+            <a:schemeClr val="accent1"/>
+          </a:fillRef>
+          <a:effectRef idx="0">
+            <a:schemeClr val="accent1"/>
+          </a:effectRef>
+          <a:fontRef idx="minor">
+            <a:schemeClr val="tx1"/>
+          </a:fontRef>
+        </p:style>
+      </p:cxnSp>
+      <p:sp>
+        <p:nvSpPr>
+          <p:cNvPr id="25" name="TextBox 24">
+            <a:extLst>
+              <a:ext uri="{FF2B5EF4-FFF2-40B4-BE49-F238E27FC236}">
+                <a16:creationId xmlns:a16="http://schemas.microsoft.com/office/drawing/2014/main" id="{04C8A71D-7E29-449F-9BEB-F12BAEFEC2C6}"/>
+              </a:ext>
+            </a:extLst>
+          </p:cNvPr>
+          <p:cNvSpPr txBox="1"/>
+          <p:nvPr/>
+        </p:nvSpPr>
+        <p:spPr>
+          <a:xfrm rot="16200000">
+            <a:off x="7833554" y="5370285"/>
+            <a:ext cx="1446028" cy="338554"/>
+          </a:xfrm>
+          <a:prstGeom prst="rect">
+            <a:avLst/>
+          </a:prstGeom>
+          <a:noFill/>
+        </p:spPr>
+        <p:txBody>
+          <a:bodyPr wrap="square" rtlCol="0">
+            <a:spAutoFit/>
+          </a:bodyPr>
+          <a:lstStyle/>
+          <a:p>
+            <a:r>
+              <a:rPr lang="en-US" sz="1600" i="1" dirty="0"/>
+              <a:t>electricity</a:t>
+            </a:r>
+            <a:endParaRPr lang="en-GB" sz="1600" i="1" dirty="0"/>
+          </a:p>
+        </p:txBody>
+      </p:sp>
+      <p:sp>
+        <p:nvSpPr>
+          <p:cNvPr id="27" name="Rectangle: Rounded Corners 26">
+            <a:extLst>
+              <a:ext uri="{FF2B5EF4-FFF2-40B4-BE49-F238E27FC236}">
+                <a16:creationId xmlns:a16="http://schemas.microsoft.com/office/drawing/2014/main" id="{B07F9F24-4857-4B65-A14B-B27957460C9D}"/>
+              </a:ext>
+            </a:extLst>
+          </p:cNvPr>
+          <p:cNvSpPr/>
+          <p:nvPr/>
+        </p:nvSpPr>
+        <p:spPr>
+          <a:xfrm>
+            <a:off x="9167896" y="2699220"/>
+            <a:ext cx="1167812" cy="648098"/>
+          </a:xfrm>
+          <a:prstGeom prst="roundRect">
+            <a:avLst/>
+          </a:prstGeom>
+          <a:solidFill>
+            <a:schemeClr val="accent4">
+              <a:lumMod val="60000"/>
+              <a:lumOff val="40000"/>
+            </a:schemeClr>
+          </a:solidFill>
+          <a:effectLst>
+            <a:outerShdw blurRad="50800" dist="38100" dir="2700000" algn="tl" rotWithShape="0">
+              <a:prstClr val="black">
+                <a:alpha val="40000"/>
+              </a:prstClr>
+            </a:outerShdw>
+          </a:effectLst>
+        </p:spPr>
+        <p:style>
+          <a:lnRef idx="2">
+            <a:schemeClr val="accent1">
+              <a:shade val="50000"/>
+            </a:schemeClr>
+          </a:lnRef>
+          <a:fillRef idx="1">
+            <a:schemeClr val="accent1"/>
+          </a:fillRef>
+          <a:effectRef idx="0">
+            <a:schemeClr val="accent1"/>
+          </a:effectRef>
+          <a:fontRef idx="minor">
+            <a:schemeClr val="lt1"/>
+          </a:fontRef>
+        </p:style>
+        <p:txBody>
+          <a:bodyPr rtlCol="0" anchor="ctr"/>
+          <a:lstStyle/>
+          <a:p>
+            <a:pPr algn="ctr"/>
+            <a:r>
+              <a:rPr lang="en-US" sz="1400" dirty="0">
+                <a:solidFill>
+                  <a:schemeClr val="tx2"/>
+                </a:solidFill>
+              </a:rPr>
+              <a:t>Light bulb</a:t>
+            </a:r>
+            <a:endParaRPr lang="en-GB" sz="1400" dirty="0">
+              <a:solidFill>
+                <a:schemeClr val="tx2"/>
+              </a:solidFill>
+            </a:endParaRPr>
+          </a:p>
+        </p:txBody>
+      </p:sp>
+      <p:cxnSp>
+        <p:nvCxnSpPr>
+          <p:cNvPr id="30" name="Straight Connector 29">
+            <a:extLst>
+              <a:ext uri="{FF2B5EF4-FFF2-40B4-BE49-F238E27FC236}">
+                <a16:creationId xmlns:a16="http://schemas.microsoft.com/office/drawing/2014/main" id="{2A7CDF69-8ECC-4089-841A-1C1F528D4591}"/>
+              </a:ext>
+            </a:extLst>
+          </p:cNvPr>
+          <p:cNvCxnSpPr>
+            <a:cxnSpLocks/>
+          </p:cNvCxnSpPr>
+          <p:nvPr/>
+        </p:nvCxnSpPr>
+        <p:spPr>
+          <a:xfrm>
+            <a:off x="10831919" y="1417673"/>
+            <a:ext cx="0" cy="4848446"/>
+          </a:xfrm>
+          <a:prstGeom prst="line">
+            <a:avLst/>
+          </a:prstGeom>
+          <a:ln w="19050">
+            <a:solidFill>
+              <a:schemeClr val="accent3"/>
+            </a:solidFill>
+          </a:ln>
+        </p:spPr>
+        <p:style>
+          <a:lnRef idx="1">
+            <a:schemeClr val="accent1"/>
+          </a:lnRef>
+          <a:fillRef idx="0">
+            <a:schemeClr val="accent1"/>
+          </a:fillRef>
+          <a:effectRef idx="0">
+            <a:schemeClr val="accent1"/>
+          </a:effectRef>
+          <a:fontRef idx="minor">
+            <a:schemeClr val="tx1"/>
+          </a:fontRef>
+        </p:style>
+      </p:cxnSp>
+      <p:sp>
+        <p:nvSpPr>
+          <p:cNvPr id="34" name="TextBox 33">
+            <a:extLst>
+              <a:ext uri="{FF2B5EF4-FFF2-40B4-BE49-F238E27FC236}">
+                <a16:creationId xmlns:a16="http://schemas.microsoft.com/office/drawing/2014/main" id="{2FA4194E-715D-41C7-A8C3-F47E59D77DAF}"/>
+              </a:ext>
+            </a:extLst>
+          </p:cNvPr>
+          <p:cNvSpPr txBox="1"/>
+          <p:nvPr/>
+        </p:nvSpPr>
+        <p:spPr>
+          <a:xfrm rot="16200000">
+            <a:off x="9996825" y="5380918"/>
+            <a:ext cx="1446028" cy="338554"/>
+          </a:xfrm>
+          <a:prstGeom prst="rect">
+            <a:avLst/>
+          </a:prstGeom>
+          <a:noFill/>
+        </p:spPr>
+        <p:txBody>
+          <a:bodyPr wrap="square" rtlCol="0">
+            <a:spAutoFit/>
+          </a:bodyPr>
+          <a:lstStyle/>
+          <a:p>
+            <a:r>
+              <a:rPr lang="en-US" sz="1600" i="1" dirty="0"/>
+              <a:t>light</a:t>
+            </a:r>
+            <a:endParaRPr lang="en-GB" sz="1600" i="1" dirty="0"/>
+          </a:p>
+        </p:txBody>
+      </p:sp>
+      <p:cxnSp>
+        <p:nvCxnSpPr>
+          <p:cNvPr id="36" name="Straight Arrow Connector 35">
+            <a:extLst>
+              <a:ext uri="{FF2B5EF4-FFF2-40B4-BE49-F238E27FC236}">
+                <a16:creationId xmlns:a16="http://schemas.microsoft.com/office/drawing/2014/main" id="{3A4F30B4-AD73-46F9-AE23-F8FF4B4F9BEB}"/>
+              </a:ext>
+            </a:extLst>
+          </p:cNvPr>
+          <p:cNvCxnSpPr>
+            <a:cxnSpLocks/>
+          </p:cNvCxnSpPr>
+          <p:nvPr/>
+        </p:nvCxnSpPr>
+        <p:spPr>
+          <a:xfrm>
+            <a:off x="6026903" y="3817166"/>
+            <a:ext cx="490860" cy="0"/>
+          </a:xfrm>
+          <a:prstGeom prst="straightConnector1">
+            <a:avLst/>
+          </a:prstGeom>
+          <a:ln w="19050">
+            <a:solidFill>
+              <a:schemeClr val="accent3"/>
+            </a:solidFill>
+            <a:tailEnd type="triangle"/>
+          </a:ln>
+        </p:spPr>
+        <p:style>
+          <a:lnRef idx="1">
+            <a:schemeClr val="accent1"/>
+          </a:lnRef>
+          <a:fillRef idx="0">
+            <a:schemeClr val="accent1"/>
+          </a:fillRef>
+          <a:effectRef idx="0">
+            <a:schemeClr val="accent1"/>
+          </a:effectRef>
+          <a:fontRef idx="minor">
+            <a:schemeClr val="tx1"/>
+          </a:fontRef>
+        </p:style>
+      </p:cxnSp>
+      <p:cxnSp>
+        <p:nvCxnSpPr>
+          <p:cNvPr id="37" name="Straight Arrow Connector 36">
+            <a:extLst>
+              <a:ext uri="{FF2B5EF4-FFF2-40B4-BE49-F238E27FC236}">
+                <a16:creationId xmlns:a16="http://schemas.microsoft.com/office/drawing/2014/main" id="{C148FF27-B077-46C7-A5CA-2916CF619CD0}"/>
+              </a:ext>
+            </a:extLst>
+          </p:cNvPr>
+          <p:cNvCxnSpPr>
+            <a:cxnSpLocks/>
+          </p:cNvCxnSpPr>
+          <p:nvPr/>
+        </p:nvCxnSpPr>
+        <p:spPr>
+          <a:xfrm>
+            <a:off x="6528396" y="3023269"/>
+            <a:ext cx="490860" cy="0"/>
+          </a:xfrm>
+          <a:prstGeom prst="straightConnector1">
+            <a:avLst/>
+          </a:prstGeom>
+          <a:ln w="19050">
+            <a:solidFill>
+              <a:schemeClr val="accent3"/>
+            </a:solidFill>
+            <a:tailEnd type="triangle"/>
+          </a:ln>
+        </p:spPr>
+        <p:style>
+          <a:lnRef idx="1">
+            <a:schemeClr val="accent1"/>
+          </a:lnRef>
+          <a:fillRef idx="0">
+            <a:schemeClr val="accent1"/>
+          </a:fillRef>
+          <a:effectRef idx="0">
+            <a:schemeClr val="accent1"/>
+          </a:effectRef>
+          <a:fontRef idx="minor">
+            <a:schemeClr val="tx1"/>
+          </a:fontRef>
+        </p:style>
+      </p:cxnSp>
+      <p:cxnSp>
+        <p:nvCxnSpPr>
+          <p:cNvPr id="38" name="Straight Arrow Connector 37">
+            <a:extLst>
+              <a:ext uri="{FF2B5EF4-FFF2-40B4-BE49-F238E27FC236}">
+                <a16:creationId xmlns:a16="http://schemas.microsoft.com/office/drawing/2014/main" id="{71AAD4D5-8896-495F-A137-08F0F223FBB2}"/>
+              </a:ext>
+            </a:extLst>
+          </p:cNvPr>
+          <p:cNvCxnSpPr>
+            <a:cxnSpLocks/>
+          </p:cNvCxnSpPr>
+          <p:nvPr/>
+        </p:nvCxnSpPr>
+        <p:spPr>
+          <a:xfrm>
+            <a:off x="8184420" y="3023269"/>
+            <a:ext cx="490860" cy="0"/>
+          </a:xfrm>
+          <a:prstGeom prst="straightConnector1">
+            <a:avLst/>
+          </a:prstGeom>
+          <a:ln w="19050">
+            <a:solidFill>
+              <a:schemeClr val="accent3"/>
+            </a:solidFill>
+            <a:tailEnd type="triangle"/>
+          </a:ln>
+        </p:spPr>
+        <p:style>
+          <a:lnRef idx="1">
+            <a:schemeClr val="accent1"/>
+          </a:lnRef>
+          <a:fillRef idx="0">
+            <a:schemeClr val="accent1"/>
+          </a:fillRef>
+          <a:effectRef idx="0">
+            <a:schemeClr val="accent1"/>
+          </a:effectRef>
+          <a:fontRef idx="minor">
+            <a:schemeClr val="tx1"/>
+          </a:fontRef>
+        </p:style>
+      </p:cxnSp>
+      <p:cxnSp>
+        <p:nvCxnSpPr>
+          <p:cNvPr id="39" name="Straight Arrow Connector 38">
+            <a:extLst>
+              <a:ext uri="{FF2B5EF4-FFF2-40B4-BE49-F238E27FC236}">
+                <a16:creationId xmlns:a16="http://schemas.microsoft.com/office/drawing/2014/main" id="{EF0D3E1E-6E0C-43C4-BFB4-20BDA4FFA4F9}"/>
+              </a:ext>
+            </a:extLst>
+          </p:cNvPr>
+          <p:cNvCxnSpPr>
+            <a:cxnSpLocks/>
+          </p:cNvCxnSpPr>
+          <p:nvPr/>
+        </p:nvCxnSpPr>
+        <p:spPr>
+          <a:xfrm>
+            <a:off x="8675280" y="3023269"/>
+            <a:ext cx="490860" cy="0"/>
+          </a:xfrm>
+          <a:prstGeom prst="straightConnector1">
+            <a:avLst/>
+          </a:prstGeom>
+          <a:ln w="19050">
+            <a:solidFill>
+              <a:schemeClr val="accent3"/>
+            </a:solidFill>
+            <a:tailEnd type="triangle"/>
+          </a:ln>
+        </p:spPr>
+        <p:style>
+          <a:lnRef idx="1">
+            <a:schemeClr val="accent1"/>
+          </a:lnRef>
+          <a:fillRef idx="0">
+            <a:schemeClr val="accent1"/>
+          </a:fillRef>
+          <a:effectRef idx="0">
+            <a:schemeClr val="accent1"/>
+          </a:effectRef>
+          <a:fontRef idx="minor">
+            <a:schemeClr val="tx1"/>
+          </a:fontRef>
+        </p:style>
+      </p:cxnSp>
+      <p:cxnSp>
+        <p:nvCxnSpPr>
+          <p:cNvPr id="40" name="Straight Arrow Connector 39">
+            <a:extLst>
+              <a:ext uri="{FF2B5EF4-FFF2-40B4-BE49-F238E27FC236}">
+                <a16:creationId xmlns:a16="http://schemas.microsoft.com/office/drawing/2014/main" id="{35659653-296B-4240-9A23-B5656089DF19}"/>
+              </a:ext>
+            </a:extLst>
+          </p:cNvPr>
+          <p:cNvCxnSpPr>
+            <a:cxnSpLocks/>
+          </p:cNvCxnSpPr>
+          <p:nvPr/>
+        </p:nvCxnSpPr>
+        <p:spPr>
+          <a:xfrm>
+            <a:off x="10335708" y="3023269"/>
+            <a:ext cx="490860" cy="0"/>
+          </a:xfrm>
+          <a:prstGeom prst="straightConnector1">
+            <a:avLst/>
+          </a:prstGeom>
+          <a:ln w="19050">
+            <a:solidFill>
+              <a:schemeClr val="accent3"/>
+            </a:solidFill>
+            <a:tailEnd type="triangle"/>
+          </a:ln>
+        </p:spPr>
+        <p:style>
+          <a:lnRef idx="1">
+            <a:schemeClr val="accent1"/>
+          </a:lnRef>
+          <a:fillRef idx="0">
+            <a:schemeClr val="accent1"/>
+          </a:fillRef>
+          <a:effectRef idx="0">
+            <a:schemeClr val="accent1"/>
+          </a:effectRef>
+          <a:fontRef idx="minor">
+            <a:schemeClr val="tx1"/>
+          </a:fontRef>
+        </p:style>
+      </p:cxnSp>
+      <p:sp>
+        <p:nvSpPr>
+          <p:cNvPr id="22" name="TextBox 21">
+            <a:extLst>
+              <a:ext uri="{FF2B5EF4-FFF2-40B4-BE49-F238E27FC236}">
+                <a16:creationId xmlns:a16="http://schemas.microsoft.com/office/drawing/2014/main" id="{8AC23BFD-ACA5-4230-B8A4-071AB05640A8}"/>
+              </a:ext>
+            </a:extLst>
+          </p:cNvPr>
+          <p:cNvSpPr txBox="1"/>
+          <p:nvPr/>
+        </p:nvSpPr>
+        <p:spPr>
+          <a:xfrm>
+            <a:off x="5655063" y="110830"/>
+            <a:ext cx="2052083" cy="646331"/>
+          </a:xfrm>
+          <a:prstGeom prst="rect">
+            <a:avLst/>
+          </a:prstGeom>
+          <a:noFill/>
+        </p:spPr>
+        <p:txBody>
+          <a:bodyPr wrap="square" rtlCol="0">
+            <a:spAutoFit/>
+          </a:bodyPr>
+          <a:lstStyle/>
+          <a:p>
+            <a:pPr algn="ctr"/>
+            <a:r>
+              <a:rPr lang="en-US" dirty="0"/>
+              <a:t>Secondary</a:t>
+            </a:r>
+          </a:p>
+          <a:p>
+            <a:pPr algn="ctr"/>
+            <a:r>
+              <a:rPr lang="en-US" dirty="0"/>
+              <a:t> Energy</a:t>
+            </a:r>
+            <a:endParaRPr lang="en-GB" dirty="0"/>
+          </a:p>
+        </p:txBody>
+      </p:sp>
+      <p:sp>
+        <p:nvSpPr>
+          <p:cNvPr id="23" name="TextBox 22">
+            <a:extLst>
+              <a:ext uri="{FF2B5EF4-FFF2-40B4-BE49-F238E27FC236}">
+                <a16:creationId xmlns:a16="http://schemas.microsoft.com/office/drawing/2014/main" id="{F9F1E34A-F5B2-49C8-A7E9-B3993E97B46F}"/>
+              </a:ext>
+            </a:extLst>
+          </p:cNvPr>
+          <p:cNvSpPr txBox="1"/>
+          <p:nvPr/>
+        </p:nvSpPr>
+        <p:spPr>
+          <a:xfrm>
+            <a:off x="7864694" y="89549"/>
+            <a:ext cx="2052083" cy="646331"/>
+          </a:xfrm>
+          <a:prstGeom prst="rect">
+            <a:avLst/>
+          </a:prstGeom>
+          <a:noFill/>
+        </p:spPr>
+        <p:txBody>
+          <a:bodyPr wrap="square" rtlCol="0">
+            <a:spAutoFit/>
+          </a:bodyPr>
+          <a:lstStyle/>
+          <a:p>
+            <a:pPr algn="ctr"/>
+            <a:r>
+              <a:rPr lang="en-US" dirty="0"/>
+              <a:t>Final</a:t>
+            </a:r>
+          </a:p>
+          <a:p>
+            <a:pPr algn="ctr"/>
+            <a:r>
+              <a:rPr lang="en-US" dirty="0"/>
+              <a:t> Energy</a:t>
+            </a:r>
+            <a:endParaRPr lang="en-GB" dirty="0"/>
+          </a:p>
+        </p:txBody>
+      </p:sp>
+      <p:sp>
+        <p:nvSpPr>
+          <p:cNvPr id="28" name="TextBox 27">
+            <a:extLst>
+              <a:ext uri="{FF2B5EF4-FFF2-40B4-BE49-F238E27FC236}">
+                <a16:creationId xmlns:a16="http://schemas.microsoft.com/office/drawing/2014/main" id="{C5BB0292-842D-4C6A-9533-C574F0AFA208}"/>
+              </a:ext>
+            </a:extLst>
+          </p:cNvPr>
+          <p:cNvSpPr txBox="1"/>
+          <p:nvPr/>
+        </p:nvSpPr>
+        <p:spPr>
+          <a:xfrm>
+            <a:off x="9929948" y="103706"/>
+            <a:ext cx="2052083" cy="646331"/>
+          </a:xfrm>
+          <a:prstGeom prst="rect">
+            <a:avLst/>
+          </a:prstGeom>
+          <a:noFill/>
+        </p:spPr>
+        <p:txBody>
+          <a:bodyPr wrap="square" rtlCol="0">
+            <a:spAutoFit/>
+          </a:bodyPr>
+          <a:lstStyle/>
+          <a:p>
+            <a:pPr algn="ctr"/>
+            <a:r>
+              <a:rPr lang="en-US" dirty="0"/>
+              <a:t>Useful</a:t>
+            </a:r>
+          </a:p>
+          <a:p>
+            <a:pPr algn="ctr"/>
+            <a:r>
+              <a:rPr lang="en-US" dirty="0"/>
+              <a:t> Energy</a:t>
+            </a:r>
+            <a:endParaRPr lang="en-GB" dirty="0"/>
+          </a:p>
+        </p:txBody>
+      </p:sp>
+      <p:sp>
+        <p:nvSpPr>
+          <p:cNvPr id="2" name="Rectangle: Rounded Corners 1">
+            <a:extLst>
+              <a:ext uri="{FF2B5EF4-FFF2-40B4-BE49-F238E27FC236}">
+                <a16:creationId xmlns:a16="http://schemas.microsoft.com/office/drawing/2014/main" id="{BF39037C-C542-472C-B69B-BD484DA87164}"/>
+              </a:ext>
+            </a:extLst>
+          </p:cNvPr>
+          <p:cNvSpPr/>
+          <p:nvPr/>
+        </p:nvSpPr>
+        <p:spPr>
+          <a:xfrm>
+            <a:off x="2765778" y="3172178"/>
+            <a:ext cx="3894665" cy="3423137"/>
+          </a:xfrm>
+          <a:prstGeom prst="roundRect">
+            <a:avLst>
+              <a:gd name="adj" fmla="val 5125"/>
+            </a:avLst>
+          </a:prstGeom>
+          <a:noFill/>
+          <a:ln w="28575">
+            <a:solidFill>
+              <a:schemeClr val="tx2"/>
+            </a:solidFill>
+            <a:prstDash val="lgDash"/>
+          </a:ln>
+        </p:spPr>
+        <p:style>
+          <a:lnRef idx="2">
+            <a:schemeClr val="accent1">
+              <a:shade val="50000"/>
+            </a:schemeClr>
+          </a:lnRef>
+          <a:fillRef idx="1">
+            <a:schemeClr val="accent1"/>
+          </a:fillRef>
+          <a:effectRef idx="0">
+            <a:schemeClr val="accent1"/>
+          </a:effectRef>
+          <a:fontRef idx="minor">
+            <a:schemeClr val="lt1"/>
+          </a:fontRef>
+        </p:style>
+        <p:txBody>
+          <a:bodyPr rtlCol="0" anchor="ctr"/>
+          <a:lstStyle/>
+          <a:p>
+            <a:pPr algn="ctr"/>
+            <a:endParaRPr lang="en-US"/>
+          </a:p>
+        </p:txBody>
+      </p:sp>
+      <p:sp>
+        <p:nvSpPr>
+          <p:cNvPr id="3" name="TextBox 2">
+            <a:extLst>
+              <a:ext uri="{FF2B5EF4-FFF2-40B4-BE49-F238E27FC236}">
+                <a16:creationId xmlns:a16="http://schemas.microsoft.com/office/drawing/2014/main" id="{6C007D2A-15A1-4D0A-A32E-6F54D36550C4}"/>
+              </a:ext>
+            </a:extLst>
+          </p:cNvPr>
+          <p:cNvSpPr txBox="1"/>
+          <p:nvPr/>
+        </p:nvSpPr>
+        <p:spPr>
+          <a:xfrm>
+            <a:off x="2904985" y="6088543"/>
+            <a:ext cx="1560573" cy="369332"/>
+          </a:xfrm>
+          <a:prstGeom prst="rect">
+            <a:avLst/>
+          </a:prstGeom>
+          <a:noFill/>
+        </p:spPr>
+        <p:txBody>
+          <a:bodyPr wrap="square" rtlCol="0">
+            <a:spAutoFit/>
+          </a:bodyPr>
+          <a:lstStyle/>
+          <a:p>
+            <a:r>
+              <a:rPr lang="en-US" dirty="0">
+                <a:solidFill>
+                  <a:schemeClr val="tx2"/>
+                </a:solidFill>
+              </a:rPr>
+              <a:t>Tutorial Part 2.</a:t>
+            </a:r>
+          </a:p>
+        </p:txBody>
+      </p:sp>
+    </p:spTree>
+    <p:extLst>
+      <p:ext uri="{BB962C8B-B14F-4D97-AF65-F5344CB8AC3E}">
+        <p14:creationId xmlns:p14="http://schemas.microsoft.com/office/powerpoint/2010/main" val="2846403326"/>
       </p:ext>
     </p:extLst>
   </p:cSld>

</xml_diff>